<commit_message>
Updated links and outdated info in tutorials and specifications
git-svn-id: https://subversion.assembla.com/svn/plus/trunk/doc@2226 c04e96f8-ac36-4ff2-8b34-4a5e34ef045f
</commit_message>
<xml_diff>
--- a/overview/PlusOverview.pptx
+++ b/overview/PlusOverview.pptx
@@ -5,7 +5,7 @@
     <p:sldMasterId id="2147483648" r:id="rId1"/>
   </p:sldMasterIdLst>
   <p:notesMasterIdLst>
-    <p:notesMasterId r:id="rId20"/>
+    <p:notesMasterId r:id="rId21"/>
   </p:notesMasterIdLst>
   <p:sldIdLst>
     <p:sldId id="256" r:id="rId2"/>
@@ -26,6 +26,7 @@
     <p:sldId id="280" r:id="rId17"/>
     <p:sldId id="307" r:id="rId18"/>
     <p:sldId id="332" r:id="rId19"/>
+    <p:sldId id="416" r:id="rId20"/>
   </p:sldIdLst>
   <p:sldSz cx="9144000" cy="6858000" type="screen4x3"/>
   <p:notesSz cx="6858000" cy="9144000"/>
@@ -210,7 +211,7 @@
             <a:fld id="{A6E16264-6225-448A-8F6B-37C607BF693C}" type="datetimeFigureOut">
               <a:rPr lang="en-CA" smtClean="0"/>
               <a:pPr/>
-              <a:t>25/10/2012</a:t>
+              <a:t>2012-11-03</a:t>
             </a:fld>
             <a:endParaRPr lang="en-CA"/>
           </a:p>
@@ -661,7 +662,7 @@
             <a:fld id="{E843F943-FC4A-4610-812B-19459293E20B}" type="datetime1">
               <a:rPr lang="en-CA" smtClean="0"/>
               <a:pPr/>
-              <a:t>25/10/2012</a:t>
+              <a:t>2012-11-03</a:t>
             </a:fld>
             <a:endParaRPr lang="en-CA" dirty="0"/>
           </a:p>
@@ -960,7 +961,7 @@
             <a:fld id="{7EC20259-AFA4-42BB-B1F2-1723D3175E09}" type="datetime1">
               <a:rPr lang="en-CA" smtClean="0"/>
               <a:pPr/>
-              <a:t>25/10/2012</a:t>
+              <a:t>2012-11-03</a:t>
             </a:fld>
             <a:endParaRPr lang="en-CA"/>
           </a:p>
@@ -1164,7 +1165,7 @@
             <a:fld id="{7EC20259-AFA4-42BB-B1F2-1723D3175E09}" type="datetime1">
               <a:rPr lang="en-CA" smtClean="0"/>
               <a:pPr/>
-              <a:t>25/10/2012</a:t>
+              <a:t>2012-11-03</a:t>
             </a:fld>
             <a:endParaRPr lang="en-CA"/>
           </a:p>
@@ -1446,7 +1447,7 @@
             <a:fld id="{0B273A97-7724-4AE7-A6F1-5A1F5D1DB72A}" type="datetime1">
               <a:rPr lang="en-CA" smtClean="0"/>
               <a:pPr/>
-              <a:t>25/10/2012</a:t>
+              <a:t>2012-11-03</a:t>
             </a:fld>
             <a:endParaRPr lang="en-CA"/>
           </a:p>
@@ -4389,30 +4390,6 @@
       </p:grpSpPr>
       <p:sp>
         <p:nvSpPr>
-          <p:cNvPr id="4" name="Date Placeholder 3"/>
-          <p:cNvSpPr>
-            <a:spLocks noGrp="1"/>
-          </p:cNvSpPr>
-          <p:nvPr>
-            <p:ph type="dt" sz="half" idx="10"/>
-          </p:nvPr>
-        </p:nvSpPr>
-        <p:spPr/>
-        <p:txBody>
-          <a:bodyPr/>
-          <a:lstStyle/>
-          <a:p>
-            <a:fld id="{7EC20259-AFA4-42BB-B1F2-1723D3175E09}" type="datetime1">
-              <a:rPr lang="en-CA" smtClean="0"/>
-              <a:pPr/>
-              <a:t>25/10/2012</a:t>
-            </a:fld>
-            <a:endParaRPr lang="en-CA"/>
-          </a:p>
-        </p:txBody>
-      </p:sp>
-      <p:sp>
-        <p:nvSpPr>
           <p:cNvPr id="5" name="Footer Placeholder 4"/>
           <p:cNvSpPr>
             <a:spLocks noGrp="1"/>
@@ -4430,30 +4407,6 @@
               <a:rPr lang="en-US" dirty="0" smtClean="0"/>
               <a:t>Laboratory for Percutaneous Surgery (The Perk Lab) – Copyright © Queen’s University, 2012</a:t>
             </a:r>
-          </a:p>
-        </p:txBody>
-      </p:sp>
-      <p:sp>
-        <p:nvSpPr>
-          <p:cNvPr id="6" name="Slide Number Placeholder 5"/>
-          <p:cNvSpPr>
-            <a:spLocks noGrp="1"/>
-          </p:cNvSpPr>
-          <p:nvPr>
-            <p:ph type="sldNum" sz="quarter" idx="12"/>
-          </p:nvPr>
-        </p:nvSpPr>
-        <p:spPr/>
-        <p:txBody>
-          <a:bodyPr/>
-          <a:lstStyle/>
-          <a:p>
-            <a:fld id="{090008EC-8F43-4B00-B358-048442A1BFBF}" type="slidenum">
-              <a:rPr lang="en-CA" smtClean="0"/>
-              <a:pPr/>
-              <a:t>16</a:t>
-            </a:fld>
-            <a:endParaRPr lang="en-CA" dirty="0" smtClean="0"/>
           </a:p>
         </p:txBody>
       </p:sp>
@@ -7588,6 +7541,94 @@
       </p:par>
     </p:tnLst>
   </p:timing>
+</p:sld>
+</file>
+
+<file path=ppt/slides/slide19.xml><?xml version="1.0" encoding="utf-8"?>
+<p:sld xmlns:a="http://schemas.openxmlformats.org/drawingml/2006/main" xmlns:r="http://schemas.openxmlformats.org/officeDocument/2006/relationships" xmlns:p="http://schemas.openxmlformats.org/presentationml/2006/main">
+  <p:cSld>
+    <p:spTree>
+      <p:nvGrpSpPr>
+        <p:cNvPr id="1" name=""/>
+        <p:cNvGrpSpPr/>
+        <p:nvPr/>
+      </p:nvGrpSpPr>
+      <p:grpSpPr>
+        <a:xfrm>
+          <a:off x="0" y="0"/>
+          <a:ext cx="0" cy="0"/>
+          <a:chOff x="0" y="0"/>
+          <a:chExt cx="0" cy="0"/>
+        </a:xfrm>
+      </p:grpSpPr>
+      <p:sp>
+        <p:nvSpPr>
+          <p:cNvPr id="3" name="Content Placeholder 2"/>
+          <p:cNvSpPr>
+            <a:spLocks noGrp="1"/>
+          </p:cNvSpPr>
+          <p:nvPr>
+            <p:ph idx="1"/>
+          </p:nvPr>
+        </p:nvSpPr>
+        <p:spPr>
+          <a:xfrm>
+            <a:off x="457200" y="2564904"/>
+            <a:ext cx="8229600" cy="3561259"/>
+          </a:xfrm>
+        </p:spPr>
+        <p:txBody>
+          <a:bodyPr/>
+          <a:lstStyle/>
+          <a:p>
+            <a:pPr marL="0" indent="0" algn="ctr">
+              <a:buNone/>
+            </a:pPr>
+            <a:r>
+              <a:rPr lang="en-CA" dirty="0"/>
+              <a:t>Source: </a:t>
+            </a:r>
+            <a:r>
+              <a:rPr lang="en-CA" dirty="0" smtClean="0"/>
+              <a:t>doc\overview\PlusOverview.pptx </a:t>
+            </a:r>
+            <a:endParaRPr lang="en-CA" dirty="0"/>
+          </a:p>
+        </p:txBody>
+      </p:sp>
+      <p:sp>
+        <p:nvSpPr>
+          <p:cNvPr id="5" name="Footer Placeholder 4"/>
+          <p:cNvSpPr>
+            <a:spLocks noGrp="1"/>
+          </p:cNvSpPr>
+          <p:nvPr>
+            <p:ph type="ftr" sz="quarter" idx="11"/>
+          </p:nvPr>
+        </p:nvSpPr>
+        <p:spPr/>
+        <p:txBody>
+          <a:bodyPr/>
+          <a:lstStyle/>
+          <a:p>
+            <a:r>
+              <a:rPr lang="en-US" smtClean="0"/>
+              <a:t>Laboratory for Percutaneous Surgery (The Perk Lab) – Copyright © Queen’s University, 2012</a:t>
+            </a:r>
+            <a:endParaRPr lang="en-US" dirty="0" smtClean="0"/>
+          </a:p>
+        </p:txBody>
+      </p:sp>
+    </p:spTree>
+    <p:extLst>
+      <p:ext uri="{BB962C8B-B14F-4D97-AF65-F5344CB8AC3E}">
+        <p14:creationId xmlns:p14="http://schemas.microsoft.com/office/powerpoint/2010/main" val="1172833387"/>
+      </p:ext>
+    </p:extLst>
+  </p:cSld>
+  <p:clrMapOvr>
+    <a:masterClrMapping/>
+  </p:clrMapOvr>
 </p:sld>
 </file>
 

</xml_diff>

<commit_message>
Updated SVN links in presentations
git-svn-id: https://subversion.assembla.com/svn/plus/trunk/doc@2239 c04e96f8-ac36-4ff2-8b34-4a5e34ef045f
</commit_message>
<xml_diff>
--- a/overview/PlusOverview.pptx
+++ b/overview/PlusOverview.pptx
@@ -7589,9 +7589,23 @@
               <a:t>Source: </a:t>
             </a:r>
             <a:r>
-              <a:rPr lang="en-CA" dirty="0" smtClean="0"/>
-              <a:t>doc\overview\PlusOverview.pptx </a:t>
-            </a:r>
+              <a:rPr lang="en-CA" dirty="0">
+                <a:hlinkClick r:id="rId2"/>
+              </a:rPr>
+              <a:t>https://</a:t>
+            </a:r>
+            <a:r>
+              <a:rPr lang="en-CA" dirty="0" smtClean="0">
+                <a:hlinkClick r:id="rId2"/>
+              </a:rPr>
+              <a:t>subversion.assembla.com/svn/plus/trunk/doc/overview/PlusOverview.pptx</a:t>
+            </a:r>
+            <a:endParaRPr lang="en-CA" dirty="0" smtClean="0"/>
+          </a:p>
+          <a:p>
+            <a:pPr marL="0" indent="0" algn="ctr">
+              <a:buNone/>
+            </a:pPr>
             <a:endParaRPr lang="en-CA" dirty="0"/>
           </a:p>
         </p:txBody>

</xml_diff>

<commit_message>
re #745 Minor updates to presentation to represent new architecture
git-svn-id: https://subversion.assembla.com/svn/plus/trunk/doc@2730 c04e96f8-ac36-4ff2-8b34-4a5e34ef045f
</commit_message>
<xml_diff>
--- a/overview/PlusOverview.pptx
+++ b/overview/PlusOverview.pptx
@@ -26,7 +26,7 @@
     <p:sldId id="386" r:id="rId17"/>
     <p:sldId id="280" r:id="rId18"/>
     <p:sldId id="307" r:id="rId19"/>
-    <p:sldId id="332" r:id="rId20"/>
+    <p:sldId id="418" r:id="rId20"/>
     <p:sldId id="416" r:id="rId21"/>
   </p:sldIdLst>
   <p:sldSz cx="9144000" cy="6858000" type="screen4x3"/>
@@ -212,7 +212,7 @@
             <a:fld id="{A6E16264-6225-448A-8F6B-37C607BF693C}" type="datetimeFigureOut">
               <a:rPr lang="en-CA" smtClean="0"/>
               <a:pPr/>
-              <a:t>2012-12-19</a:t>
+              <a:t>30/04/2013</a:t>
             </a:fld>
             <a:endParaRPr lang="en-CA"/>
           </a:p>
@@ -479,6 +479,104 @@
     </a:lvl9pPr>
   </p:notesStyle>
 </p:notesMaster>
+</file>
+
+<file path=ppt/notesSlides/notesSlide1.xml><?xml version="1.0" encoding="utf-8"?>
+<p:notes xmlns:a="http://schemas.openxmlformats.org/drawingml/2006/main" xmlns:r="http://schemas.openxmlformats.org/officeDocument/2006/relationships" xmlns:p="http://schemas.openxmlformats.org/presentationml/2006/main">
+  <p:cSld>
+    <p:spTree>
+      <p:nvGrpSpPr>
+        <p:cNvPr id="1" name=""/>
+        <p:cNvGrpSpPr/>
+        <p:nvPr/>
+      </p:nvGrpSpPr>
+      <p:grpSpPr>
+        <a:xfrm>
+          <a:off x="0" y="0"/>
+          <a:ext cx="0" cy="0"/>
+          <a:chOff x="0" y="0"/>
+          <a:chExt cx="0" cy="0"/>
+        </a:xfrm>
+      </p:grpSpPr>
+      <p:sp>
+        <p:nvSpPr>
+          <p:cNvPr id="2" name="Slide Image Placeholder 1"/>
+          <p:cNvSpPr>
+            <a:spLocks noGrp="1" noRot="1" noChangeAspect="1"/>
+          </p:cNvSpPr>
+          <p:nvPr>
+            <p:ph type="sldImg"/>
+          </p:nvPr>
+        </p:nvSpPr>
+        <p:spPr/>
+      </p:sp>
+      <p:sp>
+        <p:nvSpPr>
+          <p:cNvPr id="3" name="Notes Placeholder 2"/>
+          <p:cNvSpPr>
+            <a:spLocks noGrp="1"/>
+          </p:cNvSpPr>
+          <p:nvPr>
+            <p:ph type="body" idx="1"/>
+          </p:nvPr>
+        </p:nvSpPr>
+        <p:spPr/>
+        <p:txBody>
+          <a:bodyPr/>
+          <a:lstStyle/>
+          <a:p>
+            <a:r>
+              <a:rPr lang="en-US" dirty="0" smtClean="0"/>
+              <a:t>what our research lab is doing</a:t>
+            </a:r>
+            <a:r>
+              <a:rPr lang="en-US" baseline="0" dirty="0" smtClean="0"/>
+              <a:t> from a software development perspective</a:t>
+            </a:r>
+            <a:endParaRPr lang="en-US" dirty="0"/>
+          </a:p>
+        </p:txBody>
+      </p:sp>
+      <p:sp>
+        <p:nvSpPr>
+          <p:cNvPr id="4" name="Slide Number Placeholder 3"/>
+          <p:cNvSpPr>
+            <a:spLocks noGrp="1"/>
+          </p:cNvSpPr>
+          <p:nvPr>
+            <p:ph type="sldNum" sz="quarter" idx="10"/>
+          </p:nvPr>
+        </p:nvSpPr>
+        <p:spPr/>
+        <p:txBody>
+          <a:bodyPr/>
+          <a:lstStyle/>
+          <a:p>
+            <a:pPr>
+              <a:defRPr/>
+            </a:pPr>
+            <a:fld id="{7D5EC535-FC31-4244-9C64-EE05A8ED5E60}" type="slidenum">
+              <a:rPr lang="en-US" smtClean="0"/>
+              <a:pPr>
+                <a:defRPr/>
+              </a:pPr>
+              <a:t>19</a:t>
+            </a:fld>
+            <a:endParaRPr lang="en-US"/>
+          </a:p>
+        </p:txBody>
+      </p:sp>
+    </p:spTree>
+    <p:extLst>
+      <p:ext uri="{BB962C8B-B14F-4D97-AF65-F5344CB8AC3E}">
+        <p14:creationId xmlns:p14="http://schemas.microsoft.com/office/powerpoint/2010/main" val="3077919326"/>
+      </p:ext>
+    </p:extLst>
+  </p:cSld>
+  <p:clrMapOvr>
+    <a:masterClrMapping/>
+  </p:clrMapOvr>
+</p:notes>
 </file>
 
 <file path=ppt/slideLayouts/slideLayout1.xml><?xml version="1.0" encoding="utf-8"?>
@@ -663,7 +761,7 @@
             <a:fld id="{E843F943-FC4A-4610-812B-19459293E20B}" type="datetime1">
               <a:rPr lang="en-CA" smtClean="0"/>
               <a:pPr/>
-              <a:t>2012-12-19</a:t>
+              <a:t>30/04/2013</a:t>
             </a:fld>
             <a:endParaRPr lang="en-CA" dirty="0"/>
           </a:p>
@@ -962,7 +1060,7 @@
             <a:fld id="{7EC20259-AFA4-42BB-B1F2-1723D3175E09}" type="datetime1">
               <a:rPr lang="en-CA" smtClean="0"/>
               <a:pPr/>
-              <a:t>2012-12-19</a:t>
+              <a:t>30/04/2013</a:t>
             </a:fld>
             <a:endParaRPr lang="en-CA"/>
           </a:p>
@@ -1166,7 +1264,7 @@
             <a:fld id="{7EC20259-AFA4-42BB-B1F2-1723D3175E09}" type="datetime1">
               <a:rPr lang="en-CA" smtClean="0"/>
               <a:pPr/>
-              <a:t>2012-12-19</a:t>
+              <a:t>30/04/2013</a:t>
             </a:fld>
             <a:endParaRPr lang="en-CA"/>
           </a:p>
@@ -1448,7 +1546,7 @@
             <a:fld id="{0B273A97-7724-4AE7-A6F1-5A1F5D1DB72A}" type="datetime1">
               <a:rPr lang="en-CA" smtClean="0"/>
               <a:pPr/>
-              <a:t>2012-12-19</a:t>
+              <a:t>30/04/2013</a:t>
             </a:fld>
             <a:endParaRPr lang="en-CA"/>
           </a:p>
@@ -1944,7 +2042,23 @@
                   <a:schemeClr val="tx1"/>
                 </a:solidFill>
               </a:rPr>
-              <a:t>Andras Lasso, Tamas Heffter, Csaba Pinter, Tamas Ungi, and Gabor Fichtinger</a:t>
+              <a:t>Andras Lasso, Tamas Heffter, Csaba Pinter, Tamas Ungi, </a:t>
+            </a:r>
+            <a:r>
+              <a:rPr lang="sv-SE" sz="2400" dirty="0" smtClean="0">
+                <a:solidFill>
+                  <a:schemeClr val="tx1"/>
+                </a:solidFill>
+              </a:rPr>
+              <a:t>Adam Rankin and </a:t>
+            </a:r>
+            <a:r>
+              <a:rPr lang="sv-SE" sz="2400" dirty="0">
+                <a:solidFill>
+                  <a:schemeClr val="tx1"/>
+                </a:solidFill>
+              </a:rPr>
+              <a:t>Gabor Fichtinger</a:t>
             </a:r>
             <a:endParaRPr lang="en-CA" sz="2400" dirty="0" smtClean="0">
               <a:solidFill>
@@ -5281,57 +5395,474 @@
       </p:grpSpPr>
       <p:sp>
         <p:nvSpPr>
-          <p:cNvPr id="38" name="Title 1"/>
+          <p:cNvPr id="120" name="Title 1"/>
+          <p:cNvSpPr txBox="1">
+            <a:spLocks/>
+          </p:cNvSpPr>
+          <p:nvPr/>
+        </p:nvSpPr>
+        <p:spPr bwMode="auto">
+          <a:xfrm>
+            <a:off x="0" y="0"/>
+            <a:ext cx="9144000" cy="1035968"/>
+          </a:xfrm>
+          <a:prstGeom prst="rect">
+            <a:avLst/>
+          </a:prstGeom>
+          <a:noFill/>
+          <a:ln w="9525">
+            <a:noFill/>
+            <a:miter lim="800000"/>
+            <a:headEnd/>
+            <a:tailEnd/>
+          </a:ln>
+        </p:spPr>
+        <p:txBody>
+          <a:bodyPr vert="horz" wrap="square" lIns="91440" tIns="45720" rIns="91440" bIns="45720" numCol="1" anchor="ctr" anchorCtr="0" compatLnSpc="1">
+            <a:prstTxWarp prst="textNoShape">
+              <a:avLst/>
+            </a:prstTxWarp>
+          </a:bodyPr>
+          <a:lstStyle>
+            <a:lvl1pPr algn="ctr" rtl="0" eaLnBrk="0" fontAlgn="base" hangingPunct="0">
+              <a:spcBef>
+                <a:spcPct val="0"/>
+              </a:spcBef>
+              <a:spcAft>
+                <a:spcPct val="0"/>
+              </a:spcAft>
+              <a:defRPr sz="4400" kern="1200">
+                <a:solidFill>
+                  <a:schemeClr val="tx1"/>
+                </a:solidFill>
+                <a:latin typeface="+mj-lt"/>
+                <a:ea typeface="+mj-ea"/>
+                <a:cs typeface="+mj-cs"/>
+              </a:defRPr>
+            </a:lvl1pPr>
+            <a:lvl2pPr algn="ctr" rtl="0" eaLnBrk="0" fontAlgn="base" hangingPunct="0">
+              <a:spcBef>
+                <a:spcPct val="0"/>
+              </a:spcBef>
+              <a:spcAft>
+                <a:spcPct val="0"/>
+              </a:spcAft>
+              <a:defRPr sz="4400">
+                <a:solidFill>
+                  <a:schemeClr val="tx1"/>
+                </a:solidFill>
+                <a:latin typeface="Calibri" pitchFamily="34" charset="0"/>
+              </a:defRPr>
+            </a:lvl2pPr>
+            <a:lvl3pPr algn="ctr" rtl="0" eaLnBrk="0" fontAlgn="base" hangingPunct="0">
+              <a:spcBef>
+                <a:spcPct val="0"/>
+              </a:spcBef>
+              <a:spcAft>
+                <a:spcPct val="0"/>
+              </a:spcAft>
+              <a:defRPr sz="4400">
+                <a:solidFill>
+                  <a:schemeClr val="tx1"/>
+                </a:solidFill>
+                <a:latin typeface="Calibri" pitchFamily="34" charset="0"/>
+              </a:defRPr>
+            </a:lvl3pPr>
+            <a:lvl4pPr algn="ctr" rtl="0" eaLnBrk="0" fontAlgn="base" hangingPunct="0">
+              <a:spcBef>
+                <a:spcPct val="0"/>
+              </a:spcBef>
+              <a:spcAft>
+                <a:spcPct val="0"/>
+              </a:spcAft>
+              <a:defRPr sz="4400">
+                <a:solidFill>
+                  <a:schemeClr val="tx1"/>
+                </a:solidFill>
+                <a:latin typeface="Calibri" pitchFamily="34" charset="0"/>
+              </a:defRPr>
+            </a:lvl4pPr>
+            <a:lvl5pPr algn="ctr" rtl="0" eaLnBrk="0" fontAlgn="base" hangingPunct="0">
+              <a:spcBef>
+                <a:spcPct val="0"/>
+              </a:spcBef>
+              <a:spcAft>
+                <a:spcPct val="0"/>
+              </a:spcAft>
+              <a:defRPr sz="4400">
+                <a:solidFill>
+                  <a:schemeClr val="tx1"/>
+                </a:solidFill>
+                <a:latin typeface="Calibri" pitchFamily="34" charset="0"/>
+              </a:defRPr>
+            </a:lvl5pPr>
+            <a:lvl6pPr marL="457200" algn="ctr" rtl="0" fontAlgn="base">
+              <a:spcBef>
+                <a:spcPct val="0"/>
+              </a:spcBef>
+              <a:spcAft>
+                <a:spcPct val="0"/>
+              </a:spcAft>
+              <a:defRPr sz="4400">
+                <a:solidFill>
+                  <a:schemeClr val="tx1"/>
+                </a:solidFill>
+                <a:latin typeface="Calibri" pitchFamily="34" charset="0"/>
+              </a:defRPr>
+            </a:lvl6pPr>
+            <a:lvl7pPr marL="914400" algn="ctr" rtl="0" fontAlgn="base">
+              <a:spcBef>
+                <a:spcPct val="0"/>
+              </a:spcBef>
+              <a:spcAft>
+                <a:spcPct val="0"/>
+              </a:spcAft>
+              <a:defRPr sz="4400">
+                <a:solidFill>
+                  <a:schemeClr val="tx1"/>
+                </a:solidFill>
+                <a:latin typeface="Calibri" pitchFamily="34" charset="0"/>
+              </a:defRPr>
+            </a:lvl7pPr>
+            <a:lvl8pPr marL="1371600" algn="ctr" rtl="0" fontAlgn="base">
+              <a:spcBef>
+                <a:spcPct val="0"/>
+              </a:spcBef>
+              <a:spcAft>
+                <a:spcPct val="0"/>
+              </a:spcAft>
+              <a:defRPr sz="4400">
+                <a:solidFill>
+                  <a:schemeClr val="tx1"/>
+                </a:solidFill>
+                <a:latin typeface="Calibri" pitchFamily="34" charset="0"/>
+              </a:defRPr>
+            </a:lvl8pPr>
+            <a:lvl9pPr marL="1828800" algn="ctr" rtl="0" fontAlgn="base">
+              <a:spcBef>
+                <a:spcPct val="0"/>
+              </a:spcBef>
+              <a:spcAft>
+                <a:spcPct val="0"/>
+              </a:spcAft>
+              <a:defRPr sz="4400">
+                <a:solidFill>
+                  <a:schemeClr val="tx1"/>
+                </a:solidFill>
+                <a:latin typeface="Calibri" pitchFamily="34" charset="0"/>
+              </a:defRPr>
+            </a:lvl9pPr>
+          </a:lstStyle>
+          <a:p>
+            <a:r>
+              <a:rPr lang="en-CA" b="1" dirty="0">
+                <a:solidFill>
+                  <a:srgbClr val="800000"/>
+                </a:solidFill>
+              </a:rPr>
+              <a:t>System overview</a:t>
+            </a:r>
+            <a:endParaRPr lang="en-CA" b="1" dirty="0">
+              <a:solidFill>
+                <a:srgbClr val="800000"/>
+              </a:solidFill>
+            </a:endParaRPr>
+          </a:p>
+        </p:txBody>
+      </p:sp>
+      <p:sp>
+        <p:nvSpPr>
+          <p:cNvPr id="4" name="Slide Number Placeholder 3"/>
           <p:cNvSpPr>
             <a:spLocks noGrp="1"/>
           </p:cNvSpPr>
           <p:nvPr>
-            <p:ph type="title"/>
+            <p:ph type="sldNum" sz="quarter" idx="10"/>
           </p:nvPr>
         </p:nvSpPr>
-        <p:spPr>
-          <a:xfrm>
-            <a:off x="460375" y="76200"/>
-            <a:ext cx="8229600" cy="990600"/>
-          </a:xfrm>
-        </p:spPr>
+        <p:spPr/>
         <p:txBody>
-          <a:bodyPr>
-            <a:normAutofit/>
-          </a:bodyPr>
+          <a:bodyPr/>
           <a:lstStyle/>
           <a:p>
-            <a:r>
-              <a:rPr lang="en-CA" dirty="0" smtClean="0"/>
-              <a:t>System overview</a:t>
-            </a:r>
-            <a:endParaRPr lang="en-CA" dirty="0"/>
+            <a:pPr algn="ctr">
+              <a:defRPr/>
+            </a:pPr>
+            <a:r>
+              <a:rPr lang="en-US" smtClean="0"/>
+              <a:t>- </a:t>
+            </a:r>
+            <a:fld id="{CF70E430-998E-4908-836F-E9BC2B613AC2}" type="slidenum">
+              <a:rPr lang="en-US" smtClean="0"/>
+              <a:pPr algn="ctr">
+                <a:defRPr/>
+              </a:pPr>
+              <a:t>19</a:t>
+            </a:fld>
+            <a:r>
+              <a:rPr lang="en-US" smtClean="0"/>
+              <a:t> -</a:t>
+            </a:r>
+            <a:endParaRPr lang="en-US" dirty="0"/>
+          </a:p>
+        </p:txBody>
+      </p:sp>
+      <p:sp>
+        <p:nvSpPr>
+          <p:cNvPr id="5" name="Footer Placeholder 4"/>
+          <p:cNvSpPr>
+            <a:spLocks noGrp="1"/>
+          </p:cNvSpPr>
+          <p:nvPr>
+            <p:ph type="ftr" sz="quarter" idx="11"/>
+          </p:nvPr>
+        </p:nvSpPr>
+        <p:spPr/>
+        <p:txBody>
+          <a:bodyPr/>
+          <a:lstStyle/>
+          <a:p>
+            <a:pPr>
+              <a:defRPr/>
+            </a:pPr>
+            <a:r>
+              <a:rPr lang="en-US" smtClean="0"/>
+              <a:t>Laboratory for Percutaneous Surgery – Copyright © Queen’s University, 2013</a:t>
+            </a:r>
+            <a:endParaRPr lang="en-US" dirty="0"/>
           </a:p>
         </p:txBody>
       </p:sp>
       <p:grpSp>
         <p:nvGrpSpPr>
-          <p:cNvPr id="2" name="Group 1"/>
+          <p:cNvPr id="64" name="Group 63"/>
           <p:cNvGrpSpPr/>
           <p:nvPr/>
         </p:nvGrpSpPr>
         <p:grpSpPr>
           <a:xfrm>
-            <a:off x="-27272" y="242342"/>
-            <a:ext cx="8982520" cy="6381965"/>
-            <a:chOff x="-27272" y="242342"/>
-            <a:chExt cx="8982520" cy="6381965"/>
+            <a:off x="54108" y="199134"/>
+            <a:ext cx="8901140" cy="6120373"/>
+            <a:chOff x="54108" y="503934"/>
+            <a:chExt cx="8901140" cy="6120373"/>
           </a:xfrm>
         </p:grpSpPr>
         <p:sp>
           <p:nvSpPr>
-            <p:cNvPr id="72" name="Rectangle 71"/>
+            <p:cNvPr id="115" name="Rectangle 114"/>
             <p:cNvSpPr/>
             <p:nvPr/>
           </p:nvSpPr>
           <p:spPr>
             <a:xfrm>
-              <a:off x="7437496" y="242342"/>
+              <a:off x="4798842" y="6309320"/>
+              <a:ext cx="1574936" cy="314987"/>
+            </a:xfrm>
+            <a:prstGeom prst="rect">
+              <a:avLst/>
+            </a:prstGeom>
+            <a:ln/>
+          </p:spPr>
+          <p:style>
+            <a:lnRef idx="3">
+              <a:schemeClr val="lt1"/>
+            </a:lnRef>
+            <a:fillRef idx="1">
+              <a:schemeClr val="accent5"/>
+            </a:fillRef>
+            <a:effectRef idx="1">
+              <a:schemeClr val="accent5"/>
+            </a:effectRef>
+            <a:fontRef idx="minor">
+              <a:schemeClr val="lt1"/>
+            </a:fontRef>
+          </p:style>
+          <p:txBody>
+            <a:bodyPr rtlCol="0" anchor="ctr"/>
+            <a:lstStyle/>
+            <a:p>
+              <a:pPr algn="ctr"/>
+              <a:r>
+                <a:rPr lang="en-CA" sz="1200" b="1" dirty="0" smtClean="0">
+                  <a:solidFill>
+                    <a:schemeClr val="bg1"/>
+                  </a:solidFill>
+                </a:rPr>
+                <a:t>Custom phantoms</a:t>
+              </a:r>
+              <a:endParaRPr lang="en-CA" sz="1200" b="1" dirty="0">
+                <a:solidFill>
+                  <a:schemeClr val="bg1"/>
+                </a:solidFill>
+              </a:endParaRPr>
+            </a:p>
+          </p:txBody>
+        </p:sp>
+        <p:cxnSp>
+          <p:nvCxnSpPr>
+            <p:cNvPr id="116" name="Straight Connector 115"/>
+            <p:cNvCxnSpPr>
+              <a:stCxn id="115" idx="0"/>
+              <a:endCxn id="74" idx="2"/>
+            </p:cNvCxnSpPr>
+            <p:nvPr/>
+          </p:nvCxnSpPr>
+          <p:spPr>
+            <a:xfrm flipH="1" flipV="1">
+              <a:off x="3257675" y="5949280"/>
+              <a:ext cx="2328635" cy="360040"/>
+            </a:xfrm>
+            <a:prstGeom prst="line">
+              <a:avLst/>
+            </a:prstGeom>
+            <a:ln w="31750">
+              <a:solidFill>
+                <a:schemeClr val="tx1"/>
+              </a:solidFill>
+              <a:prstDash val="solid"/>
+            </a:ln>
+          </p:spPr>
+          <p:style>
+            <a:lnRef idx="1">
+              <a:schemeClr val="accent1"/>
+            </a:lnRef>
+            <a:fillRef idx="0">
+              <a:schemeClr val="accent1"/>
+            </a:fillRef>
+            <a:effectRef idx="0">
+              <a:schemeClr val="accent1"/>
+            </a:effectRef>
+            <a:fontRef idx="minor">
+              <a:schemeClr val="tx1"/>
+            </a:fontRef>
+          </p:style>
+        </p:cxnSp>
+        <p:cxnSp>
+          <p:nvCxnSpPr>
+            <p:cNvPr id="117" name="Straight Connector 116"/>
+            <p:cNvCxnSpPr>
+              <a:stCxn id="115" idx="0"/>
+              <a:endCxn id="106" idx="2"/>
+            </p:cNvCxnSpPr>
+            <p:nvPr/>
+          </p:nvCxnSpPr>
+          <p:spPr>
+            <a:xfrm flipV="1">
+              <a:off x="5586310" y="5949280"/>
+              <a:ext cx="1082436" cy="360040"/>
+            </a:xfrm>
+            <a:prstGeom prst="line">
+              <a:avLst/>
+            </a:prstGeom>
+            <a:ln w="31750">
+              <a:solidFill>
+                <a:schemeClr val="tx1"/>
+              </a:solidFill>
+              <a:prstDash val="solid"/>
+            </a:ln>
+          </p:spPr>
+          <p:style>
+            <a:lnRef idx="1">
+              <a:schemeClr val="accent1"/>
+            </a:lnRef>
+            <a:fillRef idx="0">
+              <a:schemeClr val="accent1"/>
+            </a:fillRef>
+            <a:effectRef idx="0">
+              <a:schemeClr val="accent1"/>
+            </a:effectRef>
+            <a:fontRef idx="minor">
+              <a:schemeClr val="tx1"/>
+            </a:fontRef>
+          </p:style>
+        </p:cxnSp>
+        <p:cxnSp>
+          <p:nvCxnSpPr>
+            <p:cNvPr id="118" name="Straight Connector 117"/>
+            <p:cNvCxnSpPr>
+              <a:stCxn id="115" idx="0"/>
+              <a:endCxn id="76" idx="2"/>
+            </p:cNvCxnSpPr>
+            <p:nvPr/>
+          </p:nvCxnSpPr>
+          <p:spPr>
+            <a:xfrm flipH="1" flipV="1">
+              <a:off x="5093496" y="5949280"/>
+              <a:ext cx="492814" cy="360040"/>
+            </a:xfrm>
+            <a:prstGeom prst="line">
+              <a:avLst/>
+            </a:prstGeom>
+            <a:ln w="31750">
+              <a:solidFill>
+                <a:schemeClr val="tx1"/>
+              </a:solidFill>
+              <a:prstDash val="solid"/>
+            </a:ln>
+          </p:spPr>
+          <p:style>
+            <a:lnRef idx="1">
+              <a:schemeClr val="accent1"/>
+            </a:lnRef>
+            <a:fillRef idx="0">
+              <a:schemeClr val="accent1"/>
+            </a:fillRef>
+            <a:effectRef idx="0">
+              <a:schemeClr val="accent1"/>
+            </a:effectRef>
+            <a:fontRef idx="minor">
+              <a:schemeClr val="tx1"/>
+            </a:fontRef>
+          </p:style>
+        </p:cxnSp>
+        <p:cxnSp>
+          <p:nvCxnSpPr>
+            <p:cNvPr id="119" name="Straight Connector 118"/>
+            <p:cNvCxnSpPr>
+              <a:stCxn id="108" idx="2"/>
+              <a:endCxn id="115" idx="0"/>
+            </p:cNvCxnSpPr>
+            <p:nvPr/>
+          </p:nvCxnSpPr>
+          <p:spPr>
+            <a:xfrm flipH="1">
+              <a:off x="5586310" y="5949280"/>
+              <a:ext cx="2581470" cy="360040"/>
+            </a:xfrm>
+            <a:prstGeom prst="line">
+              <a:avLst/>
+            </a:prstGeom>
+            <a:ln w="31750">
+              <a:solidFill>
+                <a:schemeClr val="tx1"/>
+              </a:solidFill>
+              <a:prstDash val="solid"/>
+            </a:ln>
+          </p:spPr>
+          <p:style>
+            <a:lnRef idx="1">
+              <a:schemeClr val="accent1"/>
+            </a:lnRef>
+            <a:fillRef idx="0">
+              <a:schemeClr val="accent1"/>
+            </a:fillRef>
+            <a:effectRef idx="0">
+              <a:schemeClr val="accent1"/>
+            </a:effectRef>
+            <a:fontRef idx="minor">
+              <a:schemeClr val="tx1"/>
+            </a:fontRef>
+          </p:style>
+        </p:cxnSp>
+        <p:sp>
+          <p:nvSpPr>
+            <p:cNvPr id="65" name="Rectangle 64"/>
+            <p:cNvSpPr/>
+            <p:nvPr/>
+          </p:nvSpPr>
+          <p:spPr>
+            <a:xfrm>
+              <a:off x="7437496" y="503934"/>
               <a:ext cx="1430920" cy="1362394"/>
             </a:xfrm>
             <a:prstGeom prst="rect">
@@ -5373,7 +5904,7 @@
         </p:sp>
         <p:cxnSp>
           <p:nvCxnSpPr>
-            <p:cNvPr id="27" name="Straight Connector 26"/>
+            <p:cNvPr id="66" name="Straight Connector 65"/>
             <p:cNvCxnSpPr/>
             <p:nvPr/>
           </p:nvCxnSpPr>
@@ -5385,7 +5916,7 @@
             <a:prstGeom prst="line">
               <a:avLst/>
             </a:prstGeom>
-            <a:ln w="38100">
+            <a:ln w="31750">
               <a:solidFill>
                 <a:schemeClr val="tx1"/>
               </a:solidFill>
@@ -5409,7 +5940,7 @@
         </p:cxnSp>
         <p:cxnSp>
           <p:nvCxnSpPr>
-            <p:cNvPr id="53" name="Straight Connector 52"/>
+            <p:cNvPr id="67" name="Straight Connector 66"/>
             <p:cNvCxnSpPr/>
             <p:nvPr/>
           </p:nvCxnSpPr>
@@ -5421,7 +5952,7 @@
             <a:prstGeom prst="line">
               <a:avLst/>
             </a:prstGeom>
-            <a:ln w="38100">
+            <a:ln w="31750">
               <a:solidFill>
                 <a:schemeClr val="tx1"/>
               </a:solidFill>
@@ -5445,7 +5976,7 @@
         </p:cxnSp>
         <p:cxnSp>
           <p:nvCxnSpPr>
-            <p:cNvPr id="49" name="Straight Connector 48"/>
+            <p:cNvPr id="68" name="Straight Connector 67"/>
             <p:cNvCxnSpPr/>
             <p:nvPr/>
           </p:nvCxnSpPr>
@@ -5457,7 +5988,7 @@
             <a:prstGeom prst="line">
               <a:avLst/>
             </a:prstGeom>
-            <a:ln w="38100">
+            <a:ln w="31750">
               <a:solidFill>
                 <a:schemeClr val="tx1"/>
               </a:solidFill>
@@ -5481,7 +6012,7 @@
         </p:cxnSp>
         <p:sp>
           <p:nvSpPr>
-            <p:cNvPr id="22" name="Rectangle 21"/>
+            <p:cNvPr id="69" name="Rectangle 68"/>
             <p:cNvSpPr/>
             <p:nvPr/>
           </p:nvSpPr>
@@ -5493,29 +6024,17 @@
             <a:prstGeom prst="rect">
               <a:avLst/>
             </a:prstGeom>
-            <a:solidFill>
-              <a:schemeClr val="accent3">
-                <a:lumMod val="60000"/>
-                <a:lumOff val="40000"/>
-              </a:schemeClr>
-            </a:solidFill>
-            <a:ln>
-              <a:solidFill>
-                <a:schemeClr val="tx1"/>
-              </a:solidFill>
-            </a:ln>
+            <a:ln/>
           </p:spPr>
           <p:style>
-            <a:lnRef idx="2">
-              <a:schemeClr val="accent1">
-                <a:shade val="50000"/>
-              </a:schemeClr>
+            <a:lnRef idx="3">
+              <a:schemeClr val="lt1"/>
             </a:lnRef>
             <a:fillRef idx="1">
-              <a:schemeClr val="accent1"/>
+              <a:schemeClr val="accent5"/>
             </a:fillRef>
-            <a:effectRef idx="0">
-              <a:schemeClr val="accent1"/>
+            <a:effectRef idx="1">
+              <a:schemeClr val="accent5"/>
             </a:effectRef>
             <a:fontRef idx="minor">
               <a:schemeClr val="lt1"/>
@@ -5532,7 +6051,7 @@
         </p:sp>
         <p:sp>
           <p:nvSpPr>
-            <p:cNvPr id="4" name="Rectangle 3"/>
+            <p:cNvPr id="70" name="Rectangle 69"/>
             <p:cNvSpPr/>
             <p:nvPr/>
           </p:nvSpPr>
@@ -5544,29 +6063,17 @@
             <a:prstGeom prst="rect">
               <a:avLst/>
             </a:prstGeom>
-            <a:solidFill>
-              <a:schemeClr val="accent3">
-                <a:lumMod val="60000"/>
-                <a:lumOff val="40000"/>
-              </a:schemeClr>
-            </a:solidFill>
-            <a:ln>
-              <a:solidFill>
-                <a:schemeClr val="tx1"/>
-              </a:solidFill>
-            </a:ln>
+            <a:ln/>
           </p:spPr>
           <p:style>
-            <a:lnRef idx="2">
-              <a:schemeClr val="accent1">
-                <a:shade val="50000"/>
-              </a:schemeClr>
+            <a:lnRef idx="3">
+              <a:schemeClr val="lt1"/>
             </a:lnRef>
             <a:fillRef idx="1">
-              <a:schemeClr val="accent1"/>
+              <a:schemeClr val="accent5"/>
             </a:fillRef>
-            <a:effectRef idx="0">
-              <a:schemeClr val="accent1"/>
+            <a:effectRef idx="1">
+              <a:schemeClr val="accent5"/>
             </a:effectRef>
             <a:fontRef idx="minor">
               <a:schemeClr val="lt1"/>
@@ -5583,13 +6090,13 @@
         </p:sp>
         <p:sp>
           <p:nvSpPr>
-            <p:cNvPr id="5" name="TextBox 4"/>
+            <p:cNvPr id="71" name="TextBox 70"/>
             <p:cNvSpPr txBox="1"/>
             <p:nvPr/>
           </p:nvSpPr>
           <p:spPr>
             <a:xfrm>
-              <a:off x="481100" y="5445547"/>
+              <a:off x="449201" y="5445547"/>
               <a:ext cx="867545" cy="276999"/>
             </a:xfrm>
             <a:prstGeom prst="rect">
@@ -5613,41 +6120,29 @@
         </p:sp>
         <p:sp>
           <p:nvSpPr>
-            <p:cNvPr id="6" name="Rectangle 5"/>
+            <p:cNvPr id="74" name="Rectangle 73"/>
             <p:cNvSpPr/>
             <p:nvPr/>
           </p:nvSpPr>
           <p:spPr>
             <a:xfrm>
-              <a:off x="2600376" y="4883510"/>
-              <a:ext cx="1312448" cy="341236"/>
+              <a:off x="2425210" y="5631474"/>
+              <a:ext cx="1664929" cy="317806"/>
             </a:xfrm>
             <a:prstGeom prst="rect">
               <a:avLst/>
             </a:prstGeom>
-            <a:solidFill>
-              <a:schemeClr val="accent3">
-                <a:lumMod val="40000"/>
-                <a:lumOff val="60000"/>
-              </a:schemeClr>
-            </a:solidFill>
-            <a:ln>
-              <a:solidFill>
-                <a:schemeClr val="tx1"/>
-              </a:solidFill>
-            </a:ln>
+            <a:ln/>
           </p:spPr>
           <p:style>
-            <a:lnRef idx="2">
-              <a:schemeClr val="accent1">
-                <a:shade val="50000"/>
-              </a:schemeClr>
+            <a:lnRef idx="3">
+              <a:schemeClr val="lt1"/>
             </a:lnRef>
             <a:fillRef idx="1">
-              <a:schemeClr val="accent1"/>
+              <a:schemeClr val="accent3"/>
             </a:fillRef>
-            <a:effectRef idx="0">
-              <a:schemeClr val="accent1"/>
+            <a:effectRef idx="1">
+              <a:schemeClr val="accent3"/>
             </a:effectRef>
             <a:fontRef idx="minor">
               <a:schemeClr val="lt1"/>
@@ -5661,22 +6156,22 @@
               <a:r>
                 <a:rPr lang="en-CA" sz="1200" b="1" dirty="0">
                   <a:solidFill>
-                    <a:schemeClr val="tx1"/>
+                    <a:schemeClr val="bg1"/>
                   </a:solidFill>
                 </a:rPr>
-                <a:t>Video </a:t>
+                <a:t>Ultrasound </a:t>
               </a:r>
               <a:r>
                 <a:rPr lang="en-CA" sz="1200" b="1" dirty="0" smtClean="0">
                   <a:solidFill>
-                    <a:schemeClr val="tx1"/>
+                    <a:schemeClr val="bg1"/>
                   </a:solidFill>
                 </a:rPr>
-                <a:t>interface</a:t>
+                <a:t>scanner</a:t>
               </a:r>
               <a:endParaRPr lang="en-CA" sz="1200" b="1" dirty="0">
                 <a:solidFill>
-                  <a:schemeClr val="tx1"/>
+                  <a:schemeClr val="bg1"/>
                 </a:solidFill>
               </a:endParaRPr>
             </a:p>
@@ -5684,41 +6179,399 @@
         </p:sp>
         <p:sp>
           <p:nvSpPr>
-            <p:cNvPr id="7" name="Rectangle 6"/>
+            <p:cNvPr id="75" name="Rectangle 74"/>
             <p:cNvSpPr/>
             <p:nvPr/>
           </p:nvSpPr>
           <p:spPr>
             <a:xfrm>
-              <a:off x="4450752" y="4883510"/>
-              <a:ext cx="1413844" cy="341236"/>
+              <a:off x="4940967" y="4452149"/>
+              <a:ext cx="1154953" cy="341236"/>
             </a:xfrm>
             <a:prstGeom prst="rect">
               <a:avLst/>
             </a:prstGeom>
             <a:solidFill>
-              <a:schemeClr val="accent3">
-                <a:lumMod val="40000"/>
-                <a:lumOff val="60000"/>
-              </a:schemeClr>
+              <a:srgbClr val="78953D"/>
             </a:solidFill>
-            <a:ln>
+            <a:ln/>
+          </p:spPr>
+          <p:style>
+            <a:lnRef idx="3">
+              <a:schemeClr val="lt1"/>
+            </a:lnRef>
+            <a:fillRef idx="1">
+              <a:schemeClr val="accent3"/>
+            </a:fillRef>
+            <a:effectRef idx="1">
+              <a:schemeClr val="accent3"/>
+            </a:effectRef>
+            <a:fontRef idx="minor">
+              <a:schemeClr val="lt1"/>
+            </a:fontRef>
+          </p:style>
+          <p:txBody>
+            <a:bodyPr rtlCol="0" anchor="ctr"/>
+            <a:lstStyle/>
+            <a:p>
+              <a:pPr algn="ctr"/>
+              <a:r>
+                <a:rPr lang="en-CA" sz="1200" b="1" dirty="0" err="1">
+                  <a:solidFill>
+                    <a:schemeClr val="bg1"/>
+                  </a:solidFill>
+                </a:rPr>
+                <a:t>OpenIGTLink</a:t>
+              </a:r>
+              <a:endParaRPr lang="en-CA" sz="1200" b="1" dirty="0">
+                <a:solidFill>
+                  <a:schemeClr val="bg1"/>
+                </a:solidFill>
+              </a:endParaRPr>
+            </a:p>
+          </p:txBody>
+        </p:sp>
+        <p:sp>
+          <p:nvSpPr>
+            <p:cNvPr id="76" name="Rectangle 75"/>
+            <p:cNvSpPr/>
+            <p:nvPr/>
+          </p:nvSpPr>
+          <p:spPr>
+            <a:xfrm>
+              <a:off x="4243356" y="5634293"/>
+              <a:ext cx="1700279" cy="314987"/>
+            </a:xfrm>
+            <a:prstGeom prst="rect">
+              <a:avLst/>
+            </a:prstGeom>
+            <a:ln/>
+          </p:spPr>
+          <p:style>
+            <a:lnRef idx="3">
+              <a:schemeClr val="lt1"/>
+            </a:lnRef>
+            <a:fillRef idx="1">
+              <a:schemeClr val="accent3"/>
+            </a:fillRef>
+            <a:effectRef idx="1">
+              <a:schemeClr val="accent3"/>
+            </a:effectRef>
+            <a:fontRef idx="minor">
+              <a:schemeClr val="lt1"/>
+            </a:fontRef>
+          </p:style>
+          <p:txBody>
+            <a:bodyPr rtlCol="0" anchor="ctr"/>
+            <a:lstStyle/>
+            <a:p>
+              <a:pPr algn="ctr"/>
+              <a:r>
+                <a:rPr lang="en-CA" sz="1200" b="1" dirty="0" smtClean="0">
+                  <a:solidFill>
+                    <a:schemeClr val="bg1"/>
+                  </a:solidFill>
+                </a:rPr>
+                <a:t>Navigation system</a:t>
+              </a:r>
+              <a:endParaRPr lang="en-CA" sz="1200" b="1" dirty="0">
+                <a:solidFill>
+                  <a:schemeClr val="bg1"/>
+                </a:solidFill>
+              </a:endParaRPr>
+            </a:p>
+          </p:txBody>
+        </p:sp>
+        <p:cxnSp>
+          <p:nvCxnSpPr>
+            <p:cNvPr id="77" name="Straight Connector 76"/>
+            <p:cNvCxnSpPr/>
+            <p:nvPr/>
+          </p:nvCxnSpPr>
+          <p:spPr>
+            <a:xfrm>
+              <a:off x="3779912" y="5224746"/>
+              <a:ext cx="0" cy="405054"/>
+            </a:xfrm>
+            <a:prstGeom prst="line">
+              <a:avLst/>
+            </a:prstGeom>
+            <a:ln w="31750">
               <a:solidFill>
                 <a:schemeClr val="tx1"/>
               </a:solidFill>
+              <a:prstDash val="solid"/>
             </a:ln>
           </p:spPr>
           <p:style>
-            <a:lnRef idx="2">
-              <a:schemeClr val="accent1">
-                <a:shade val="50000"/>
-              </a:schemeClr>
+            <a:lnRef idx="1">
+              <a:schemeClr val="accent1"/>
+            </a:lnRef>
+            <a:fillRef idx="0">
+              <a:schemeClr val="accent1"/>
+            </a:fillRef>
+            <a:effectRef idx="0">
+              <a:schemeClr val="accent1"/>
+            </a:effectRef>
+            <a:fontRef idx="minor">
+              <a:schemeClr val="tx1"/>
+            </a:fontRef>
+          </p:style>
+        </p:cxnSp>
+        <p:cxnSp>
+          <p:nvCxnSpPr>
+            <p:cNvPr id="78" name="Straight Connector 77"/>
+            <p:cNvCxnSpPr/>
+            <p:nvPr/>
+          </p:nvCxnSpPr>
+          <p:spPr>
+            <a:xfrm>
+              <a:off x="4499060" y="5224746"/>
+              <a:ext cx="14255" cy="405054"/>
+            </a:xfrm>
+            <a:prstGeom prst="line">
+              <a:avLst/>
+            </a:prstGeom>
+            <a:ln w="31750">
+              <a:solidFill>
+                <a:schemeClr val="tx1"/>
+              </a:solidFill>
+              <a:prstDash val="solid"/>
+            </a:ln>
+          </p:spPr>
+          <p:style>
+            <a:lnRef idx="1">
+              <a:schemeClr val="accent1"/>
+            </a:lnRef>
+            <a:fillRef idx="0">
+              <a:schemeClr val="accent1"/>
+            </a:fillRef>
+            <a:effectRef idx="0">
+              <a:schemeClr val="accent1"/>
+            </a:effectRef>
+            <a:fontRef idx="minor">
+              <a:schemeClr val="tx1"/>
+            </a:fontRef>
+          </p:style>
+        </p:cxnSp>
+        <p:sp>
+          <p:nvSpPr>
+            <p:cNvPr id="79" name="Rectangle 78"/>
+            <p:cNvSpPr/>
+            <p:nvPr/>
+          </p:nvSpPr>
+          <p:spPr>
+            <a:xfrm>
+              <a:off x="2158579" y="2707288"/>
+              <a:ext cx="4147332" cy="1454246"/>
+            </a:xfrm>
+            <a:prstGeom prst="rect">
+              <a:avLst/>
+            </a:prstGeom>
+            <a:ln/>
+          </p:spPr>
+          <p:style>
+            <a:lnRef idx="3">
+              <a:schemeClr val="lt1"/>
             </a:lnRef>
             <a:fillRef idx="1">
+              <a:schemeClr val="accent3"/>
+            </a:fillRef>
+            <a:effectRef idx="1">
+              <a:schemeClr val="accent3"/>
+            </a:effectRef>
+            <a:fontRef idx="minor">
+              <a:schemeClr val="lt1"/>
+            </a:fontRef>
+          </p:style>
+          <p:txBody>
+            <a:bodyPr rtlCol="0" anchor="ctr"/>
+            <a:lstStyle/>
+            <a:p>
+              <a:pPr algn="ctr"/>
+              <a:endParaRPr lang="en-CA" sz="1200">
+                <a:solidFill>
+                  <a:schemeClr val="bg1"/>
+                </a:solidFill>
+              </a:endParaRPr>
+            </a:p>
+          </p:txBody>
+        </p:sp>
+        <p:sp>
+          <p:nvSpPr>
+            <p:cNvPr id="80" name="Rectangle 79"/>
+            <p:cNvSpPr/>
+            <p:nvPr/>
+          </p:nvSpPr>
+          <p:spPr>
+            <a:xfrm>
+              <a:off x="4940967" y="3715301"/>
+              <a:ext cx="1154953" cy="341236"/>
+            </a:xfrm>
+            <a:prstGeom prst="rect">
+              <a:avLst/>
+            </a:prstGeom>
+            <a:solidFill>
+              <a:srgbClr val="78953D"/>
+            </a:solidFill>
+            <a:ln/>
+          </p:spPr>
+          <p:style>
+            <a:lnRef idx="3">
+              <a:schemeClr val="lt1"/>
+            </a:lnRef>
+            <a:fillRef idx="1">
+              <a:schemeClr val="accent3"/>
+            </a:fillRef>
+            <a:effectRef idx="1">
+              <a:schemeClr val="accent3"/>
+            </a:effectRef>
+            <a:fontRef idx="minor">
+              <a:schemeClr val="lt1"/>
+            </a:fontRef>
+          </p:style>
+          <p:txBody>
+            <a:bodyPr rtlCol="0" anchor="ctr"/>
+            <a:lstStyle/>
+            <a:p>
+              <a:pPr algn="ctr"/>
+              <a:r>
+                <a:rPr lang="en-CA" sz="1200" b="1" dirty="0" err="1">
+                  <a:solidFill>
+                    <a:schemeClr val="bg1"/>
+                  </a:solidFill>
+                </a:rPr>
+                <a:t>OpenIGTLink</a:t>
+              </a:r>
+              <a:endParaRPr lang="en-CA" sz="1200" b="1" dirty="0">
+                <a:solidFill>
+                  <a:schemeClr val="bg1"/>
+                </a:solidFill>
+              </a:endParaRPr>
+            </a:p>
+          </p:txBody>
+        </p:sp>
+        <p:cxnSp>
+          <p:nvCxnSpPr>
+            <p:cNvPr id="81" name="Straight Connector 80"/>
+            <p:cNvCxnSpPr>
+              <a:stCxn id="80" idx="2"/>
+              <a:endCxn id="75" idx="0"/>
+            </p:cNvCxnSpPr>
+            <p:nvPr/>
+          </p:nvCxnSpPr>
+          <p:spPr>
+            <a:xfrm>
+              <a:off x="5518444" y="4056537"/>
+              <a:ext cx="0" cy="395612"/>
+            </a:xfrm>
+            <a:prstGeom prst="line">
+              <a:avLst/>
+            </a:prstGeom>
+            <a:ln w="31750">
+              <a:solidFill>
+                <a:schemeClr val="tx1"/>
+              </a:solidFill>
+              <a:prstDash val="solid"/>
+            </a:ln>
+          </p:spPr>
+          <p:style>
+            <a:lnRef idx="1">
+              <a:schemeClr val="accent1"/>
+            </a:lnRef>
+            <a:fillRef idx="0">
               <a:schemeClr val="accent1"/>
             </a:fillRef>
             <a:effectRef idx="0">
               <a:schemeClr val="accent1"/>
+            </a:effectRef>
+            <a:fontRef idx="minor">
+              <a:schemeClr val="tx1"/>
+            </a:fontRef>
+          </p:style>
+        </p:cxnSp>
+        <p:sp>
+          <p:nvSpPr>
+            <p:cNvPr id="82" name="Rectangle 81"/>
+            <p:cNvSpPr/>
+            <p:nvPr/>
+          </p:nvSpPr>
+          <p:spPr>
+            <a:xfrm>
+              <a:off x="3125763" y="2809252"/>
+              <a:ext cx="2235187" cy="341236"/>
+            </a:xfrm>
+            <a:prstGeom prst="rect">
+              <a:avLst/>
+            </a:prstGeom>
+            <a:solidFill>
+              <a:srgbClr val="78953D"/>
+            </a:solidFill>
+            <a:ln/>
+          </p:spPr>
+          <p:style>
+            <a:lnRef idx="3">
+              <a:schemeClr val="lt1"/>
+            </a:lnRef>
+            <a:fillRef idx="1">
+              <a:schemeClr val="accent3"/>
+            </a:fillRef>
+            <a:effectRef idx="1">
+              <a:schemeClr val="accent3"/>
+            </a:effectRef>
+            <a:fontRef idx="minor">
+              <a:schemeClr val="lt1"/>
+            </a:fontRef>
+          </p:style>
+          <p:txBody>
+            <a:bodyPr rtlCol="0" anchor="ctr"/>
+            <a:lstStyle/>
+            <a:p>
+              <a:pPr algn="ctr"/>
+              <a:r>
+                <a:rPr lang="en-CA" sz="1200" b="1" dirty="0" smtClean="0">
+                  <a:solidFill>
+                    <a:schemeClr val="bg1"/>
+                  </a:solidFill>
+                </a:rPr>
+                <a:t>3D Slicer extension manager</a:t>
+              </a:r>
+              <a:endParaRPr lang="en-CA" sz="1200" b="1" dirty="0">
+                <a:solidFill>
+                  <a:schemeClr val="bg1"/>
+                </a:solidFill>
+              </a:endParaRPr>
+            </a:p>
+          </p:txBody>
+        </p:sp>
+        <p:sp>
+          <p:nvSpPr>
+            <p:cNvPr id="83" name="Rectangle 82"/>
+            <p:cNvSpPr/>
+            <p:nvPr/>
+          </p:nvSpPr>
+          <p:spPr>
+            <a:xfrm>
+              <a:off x="2264749" y="3261674"/>
+              <a:ext cx="1054715" cy="341236"/>
+            </a:xfrm>
+            <a:prstGeom prst="rect">
+              <a:avLst/>
+            </a:prstGeom>
+            <a:solidFill>
+              <a:srgbClr val="78953D"/>
+            </a:solidFill>
+            <a:ln/>
+          </p:spPr>
+          <p:style>
+            <a:lnRef idx="3">
+              <a:schemeClr val="lt1"/>
+            </a:lnRef>
+            <a:fillRef idx="1">
+              <a:schemeClr val="accent3"/>
+            </a:fillRef>
+            <a:effectRef idx="1">
+              <a:schemeClr val="accent3"/>
             </a:effectRef>
             <a:fontRef idx="minor">
               <a:schemeClr val="lt1"/>
@@ -5732,63 +6585,42 @@
               <a:r>
                 <a:rPr lang="en-CA" sz="1200" b="1" dirty="0">
                   <a:solidFill>
-                    <a:schemeClr val="tx1"/>
+                    <a:schemeClr val="bg1"/>
                   </a:solidFill>
                 </a:rPr>
-                <a:t>Tracker </a:t>
+                <a:t>Registration</a:t>
               </a:r>
-              <a:r>
-                <a:rPr lang="en-CA" sz="1200" b="1" dirty="0" smtClean="0">
-                  <a:solidFill>
-                    <a:schemeClr val="tx1"/>
-                  </a:solidFill>
-                </a:rPr>
-                <a:t>interface</a:t>
-              </a:r>
-              <a:endParaRPr lang="en-CA" sz="1200" b="1" dirty="0">
-                <a:solidFill>
-                  <a:schemeClr val="tx1"/>
-                </a:solidFill>
-              </a:endParaRPr>
             </a:p>
           </p:txBody>
         </p:sp>
         <p:sp>
           <p:nvSpPr>
-            <p:cNvPr id="9" name="Rectangle 8"/>
+            <p:cNvPr id="84" name="Rectangle 83"/>
             <p:cNvSpPr/>
             <p:nvPr/>
           </p:nvSpPr>
           <p:spPr>
             <a:xfrm>
-              <a:off x="2425210" y="5631474"/>
-              <a:ext cx="1664929" cy="317806"/>
+              <a:off x="3430572" y="3261674"/>
+              <a:ext cx="1142909" cy="341236"/>
             </a:xfrm>
             <a:prstGeom prst="rect">
               <a:avLst/>
             </a:prstGeom>
             <a:solidFill>
-              <a:schemeClr val="bg1">
-                <a:lumMod val="85000"/>
-              </a:schemeClr>
+              <a:srgbClr val="78953D"/>
             </a:solidFill>
-            <a:ln>
-              <a:solidFill>
-                <a:schemeClr val="tx1"/>
-              </a:solidFill>
-            </a:ln>
+            <a:ln/>
           </p:spPr>
           <p:style>
-            <a:lnRef idx="2">
-              <a:schemeClr val="accent1">
-                <a:shade val="50000"/>
-              </a:schemeClr>
+            <a:lnRef idx="3">
+              <a:schemeClr val="lt1"/>
             </a:lnRef>
             <a:fillRef idx="1">
-              <a:schemeClr val="accent1"/>
+              <a:schemeClr val="accent3"/>
             </a:fillRef>
-            <a:effectRef idx="0">
-              <a:schemeClr val="accent1"/>
+            <a:effectRef idx="1">
+              <a:schemeClr val="accent3"/>
             </a:effectRef>
             <a:fontRef idx="minor">
               <a:schemeClr val="lt1"/>
@@ -5802,543 +6634,7 @@
               <a:r>
                 <a:rPr lang="en-CA" sz="1200" b="1" dirty="0">
                   <a:solidFill>
-                    <a:schemeClr val="tx1"/>
-                  </a:solidFill>
-                </a:rPr>
-                <a:t>Ultrasound </a:t>
-              </a:r>
-              <a:r>
-                <a:rPr lang="en-CA" sz="1200" b="1" dirty="0" smtClean="0">
-                  <a:solidFill>
-                    <a:schemeClr val="tx1"/>
-                  </a:solidFill>
-                </a:rPr>
-                <a:t>scanner</a:t>
-              </a:r>
-              <a:endParaRPr lang="en-CA" sz="1200" b="1" dirty="0">
-                <a:solidFill>
-                  <a:schemeClr val="tx1"/>
-                </a:solidFill>
-              </a:endParaRPr>
-            </a:p>
-          </p:txBody>
-        </p:sp>
-        <p:sp>
-          <p:nvSpPr>
-            <p:cNvPr id="10" name="Rectangle 9"/>
-            <p:cNvSpPr/>
-            <p:nvPr/>
-          </p:nvSpPr>
-          <p:spPr>
-            <a:xfrm>
-              <a:off x="4940967" y="4452149"/>
-              <a:ext cx="1154953" cy="341236"/>
-            </a:xfrm>
-            <a:prstGeom prst="rect">
-              <a:avLst/>
-            </a:prstGeom>
-            <a:solidFill>
-              <a:schemeClr val="bg1">
-                <a:lumMod val="95000"/>
-              </a:schemeClr>
-            </a:solidFill>
-            <a:ln>
-              <a:solidFill>
-                <a:schemeClr val="tx1"/>
-              </a:solidFill>
-            </a:ln>
-          </p:spPr>
-          <p:style>
-            <a:lnRef idx="2">
-              <a:schemeClr val="accent1">
-                <a:shade val="50000"/>
-              </a:schemeClr>
-            </a:lnRef>
-            <a:fillRef idx="1">
-              <a:schemeClr val="accent1"/>
-            </a:fillRef>
-            <a:effectRef idx="0">
-              <a:schemeClr val="accent1"/>
-            </a:effectRef>
-            <a:fontRef idx="minor">
-              <a:schemeClr val="lt1"/>
-            </a:fontRef>
-          </p:style>
-          <p:txBody>
-            <a:bodyPr rtlCol="0" anchor="ctr"/>
-            <a:lstStyle/>
-            <a:p>
-              <a:pPr algn="ctr"/>
-              <a:r>
-                <a:rPr lang="en-CA" sz="1200" b="1" dirty="0" err="1">
-                  <a:solidFill>
-                    <a:schemeClr val="tx1"/>
-                  </a:solidFill>
-                </a:rPr>
-                <a:t>OpenIGTLink</a:t>
-              </a:r>
-              <a:endParaRPr lang="en-CA" sz="1200" b="1" dirty="0">
-                <a:solidFill>
-                  <a:schemeClr val="tx1"/>
-                </a:solidFill>
-              </a:endParaRPr>
-            </a:p>
-          </p:txBody>
-        </p:sp>
-        <p:sp>
-          <p:nvSpPr>
-            <p:cNvPr id="11" name="Rectangle 10"/>
-            <p:cNvSpPr/>
-            <p:nvPr/>
-          </p:nvSpPr>
-          <p:spPr>
-            <a:xfrm>
-              <a:off x="4243356" y="5634293"/>
-              <a:ext cx="1700279" cy="314987"/>
-            </a:xfrm>
-            <a:prstGeom prst="rect">
-              <a:avLst/>
-            </a:prstGeom>
-            <a:solidFill>
-              <a:schemeClr val="bg1">
-                <a:lumMod val="85000"/>
-              </a:schemeClr>
-            </a:solidFill>
-            <a:ln>
-              <a:solidFill>
-                <a:schemeClr val="tx1"/>
-              </a:solidFill>
-            </a:ln>
-          </p:spPr>
-          <p:style>
-            <a:lnRef idx="2">
-              <a:schemeClr val="accent1">
-                <a:shade val="50000"/>
-              </a:schemeClr>
-            </a:lnRef>
-            <a:fillRef idx="1">
-              <a:schemeClr val="accent1"/>
-            </a:fillRef>
-            <a:effectRef idx="0">
-              <a:schemeClr val="accent1"/>
-            </a:effectRef>
-            <a:fontRef idx="minor">
-              <a:schemeClr val="lt1"/>
-            </a:fontRef>
-          </p:style>
-          <p:txBody>
-            <a:bodyPr rtlCol="0" anchor="ctr"/>
-            <a:lstStyle/>
-            <a:p>
-              <a:pPr algn="ctr"/>
-              <a:r>
-                <a:rPr lang="en-CA" sz="1200" b="1" dirty="0" smtClean="0">
-                  <a:solidFill>
-                    <a:schemeClr val="tx1"/>
-                  </a:solidFill>
-                </a:rPr>
-                <a:t>Navigation system</a:t>
-              </a:r>
-              <a:endParaRPr lang="en-CA" sz="1200" b="1" dirty="0">
-                <a:solidFill>
-                  <a:schemeClr val="tx1"/>
-                </a:solidFill>
-              </a:endParaRPr>
-            </a:p>
-          </p:txBody>
-        </p:sp>
-        <p:cxnSp>
-          <p:nvCxnSpPr>
-            <p:cNvPr id="12" name="Straight Connector 11"/>
-            <p:cNvCxnSpPr/>
-            <p:nvPr/>
-          </p:nvCxnSpPr>
-          <p:spPr>
-            <a:xfrm>
-              <a:off x="3213088" y="5224746"/>
-              <a:ext cx="1074" cy="406728"/>
-            </a:xfrm>
-            <a:prstGeom prst="line">
-              <a:avLst/>
-            </a:prstGeom>
-            <a:ln w="38100">
-              <a:solidFill>
-                <a:schemeClr val="tx1"/>
-              </a:solidFill>
-              <a:prstDash val="solid"/>
-            </a:ln>
-          </p:spPr>
-          <p:style>
-            <a:lnRef idx="1">
-              <a:schemeClr val="accent1"/>
-            </a:lnRef>
-            <a:fillRef idx="0">
-              <a:schemeClr val="accent1"/>
-            </a:fillRef>
-            <a:effectRef idx="0">
-              <a:schemeClr val="accent1"/>
-            </a:effectRef>
-            <a:fontRef idx="minor">
-              <a:schemeClr val="tx1"/>
-            </a:fontRef>
-          </p:style>
-        </p:cxnSp>
-        <p:cxnSp>
-          <p:nvCxnSpPr>
-            <p:cNvPr id="13" name="Straight Connector 12"/>
-            <p:cNvCxnSpPr/>
-            <p:nvPr/>
-          </p:nvCxnSpPr>
-          <p:spPr>
-            <a:xfrm flipH="1">
-              <a:off x="5112654" y="5224746"/>
-              <a:ext cx="1506" cy="409547"/>
-            </a:xfrm>
-            <a:prstGeom prst="line">
-              <a:avLst/>
-            </a:prstGeom>
-            <a:ln w="38100">
-              <a:solidFill>
-                <a:schemeClr val="tx1"/>
-              </a:solidFill>
-              <a:prstDash val="solid"/>
-            </a:ln>
-          </p:spPr>
-          <p:style>
-            <a:lnRef idx="1">
-              <a:schemeClr val="accent1"/>
-            </a:lnRef>
-            <a:fillRef idx="0">
-              <a:schemeClr val="accent1"/>
-            </a:fillRef>
-            <a:effectRef idx="0">
-              <a:schemeClr val="accent1"/>
-            </a:effectRef>
-            <a:fontRef idx="minor">
-              <a:schemeClr val="tx1"/>
-            </a:fontRef>
-          </p:style>
-        </p:cxnSp>
-        <p:sp>
-          <p:nvSpPr>
-            <p:cNvPr id="14" name="Rectangle 13"/>
-            <p:cNvSpPr/>
-            <p:nvPr/>
-          </p:nvSpPr>
-          <p:spPr>
-            <a:xfrm>
-              <a:off x="2158579" y="2707288"/>
-              <a:ext cx="4147332" cy="1454246"/>
-            </a:xfrm>
-            <a:prstGeom prst="rect">
-              <a:avLst/>
-            </a:prstGeom>
-            <a:solidFill>
-              <a:schemeClr val="bg1">
-                <a:lumMod val="85000"/>
-              </a:schemeClr>
-            </a:solidFill>
-            <a:ln>
-              <a:solidFill>
-                <a:schemeClr val="tx1"/>
-              </a:solidFill>
-            </a:ln>
-          </p:spPr>
-          <p:style>
-            <a:lnRef idx="2">
-              <a:schemeClr val="accent1">
-                <a:shade val="50000"/>
-              </a:schemeClr>
-            </a:lnRef>
-            <a:fillRef idx="1">
-              <a:schemeClr val="accent1"/>
-            </a:fillRef>
-            <a:effectRef idx="0">
-              <a:schemeClr val="accent1"/>
-            </a:effectRef>
-            <a:fontRef idx="minor">
-              <a:schemeClr val="lt1"/>
-            </a:fontRef>
-          </p:style>
-          <p:txBody>
-            <a:bodyPr rtlCol="0" anchor="ctr"/>
-            <a:lstStyle/>
-            <a:p>
-              <a:pPr algn="ctr"/>
-              <a:endParaRPr lang="en-CA" sz="1200"/>
-            </a:p>
-          </p:txBody>
-        </p:sp>
-        <p:sp>
-          <p:nvSpPr>
-            <p:cNvPr id="15" name="Rectangle 14"/>
-            <p:cNvSpPr/>
-            <p:nvPr/>
-          </p:nvSpPr>
-          <p:spPr>
-            <a:xfrm>
-              <a:off x="4940967" y="3715301"/>
-              <a:ext cx="1154953" cy="341236"/>
-            </a:xfrm>
-            <a:prstGeom prst="rect">
-              <a:avLst/>
-            </a:prstGeom>
-            <a:solidFill>
-              <a:schemeClr val="bg1">
-                <a:lumMod val="95000"/>
-              </a:schemeClr>
-            </a:solidFill>
-            <a:ln>
-              <a:solidFill>
-                <a:schemeClr val="tx1"/>
-              </a:solidFill>
-            </a:ln>
-          </p:spPr>
-          <p:style>
-            <a:lnRef idx="2">
-              <a:schemeClr val="accent1">
-                <a:shade val="50000"/>
-              </a:schemeClr>
-            </a:lnRef>
-            <a:fillRef idx="1">
-              <a:schemeClr val="accent1"/>
-            </a:fillRef>
-            <a:effectRef idx="0">
-              <a:schemeClr val="accent1"/>
-            </a:effectRef>
-            <a:fontRef idx="minor">
-              <a:schemeClr val="lt1"/>
-            </a:fontRef>
-          </p:style>
-          <p:txBody>
-            <a:bodyPr rtlCol="0" anchor="ctr"/>
-            <a:lstStyle/>
-            <a:p>
-              <a:pPr algn="ctr"/>
-              <a:r>
-                <a:rPr lang="en-CA" sz="1200" b="1" dirty="0" err="1">
-                  <a:solidFill>
-                    <a:schemeClr val="tx1"/>
-                  </a:solidFill>
-                </a:rPr>
-                <a:t>OpenIGTLink</a:t>
-              </a:r>
-              <a:endParaRPr lang="en-CA" sz="1200" b="1" dirty="0">
-                <a:solidFill>
-                  <a:schemeClr val="tx1"/>
-                </a:solidFill>
-              </a:endParaRPr>
-            </a:p>
-          </p:txBody>
-        </p:sp>
-        <p:cxnSp>
-          <p:nvCxnSpPr>
-            <p:cNvPr id="16" name="Straight Connector 15"/>
-            <p:cNvCxnSpPr>
-              <a:stCxn id="15" idx="2"/>
-              <a:endCxn id="10" idx="0"/>
-            </p:cNvCxnSpPr>
-            <p:nvPr/>
-          </p:nvCxnSpPr>
-          <p:spPr>
-            <a:xfrm>
-              <a:off x="5518443" y="4056538"/>
-              <a:ext cx="0" cy="395611"/>
-            </a:xfrm>
-            <a:prstGeom prst="line">
-              <a:avLst/>
-            </a:prstGeom>
-            <a:ln w="38100">
-              <a:solidFill>
-                <a:schemeClr val="tx1"/>
-              </a:solidFill>
-              <a:prstDash val="solid"/>
-            </a:ln>
-          </p:spPr>
-          <p:style>
-            <a:lnRef idx="1">
-              <a:schemeClr val="accent1"/>
-            </a:lnRef>
-            <a:fillRef idx="0">
-              <a:schemeClr val="accent1"/>
-            </a:fillRef>
-            <a:effectRef idx="0">
-              <a:schemeClr val="accent1"/>
-            </a:effectRef>
-            <a:fontRef idx="minor">
-              <a:schemeClr val="tx1"/>
-            </a:fontRef>
-          </p:style>
-        </p:cxnSp>
-        <p:sp>
-          <p:nvSpPr>
-            <p:cNvPr id="17" name="Rectangle 16"/>
-            <p:cNvSpPr/>
-            <p:nvPr/>
-          </p:nvSpPr>
-          <p:spPr>
-            <a:xfrm>
-              <a:off x="3125763" y="2809252"/>
-              <a:ext cx="2235187" cy="341236"/>
-            </a:xfrm>
-            <a:prstGeom prst="rect">
-              <a:avLst/>
-            </a:prstGeom>
-            <a:solidFill>
-              <a:schemeClr val="bg1">
-                <a:lumMod val="95000"/>
-              </a:schemeClr>
-            </a:solidFill>
-            <a:ln>
-              <a:solidFill>
-                <a:schemeClr val="tx1"/>
-              </a:solidFill>
-            </a:ln>
-          </p:spPr>
-          <p:style>
-            <a:lnRef idx="2">
-              <a:schemeClr val="accent1">
-                <a:shade val="50000"/>
-              </a:schemeClr>
-            </a:lnRef>
-            <a:fillRef idx="1">
-              <a:schemeClr val="accent1"/>
-            </a:fillRef>
-            <a:effectRef idx="0">
-              <a:schemeClr val="accent1"/>
-            </a:effectRef>
-            <a:fontRef idx="minor">
-              <a:schemeClr val="lt1"/>
-            </a:fontRef>
-          </p:style>
-          <p:txBody>
-            <a:bodyPr rtlCol="0" anchor="ctr"/>
-            <a:lstStyle/>
-            <a:p>
-              <a:pPr algn="ctr"/>
-              <a:r>
-                <a:rPr lang="en-CA" sz="1200" b="1" dirty="0" smtClean="0">
-                  <a:solidFill>
-                    <a:schemeClr val="tx1"/>
-                  </a:solidFill>
-                </a:rPr>
-                <a:t>3D Slicer extension manager</a:t>
-              </a:r>
-              <a:endParaRPr lang="en-CA" sz="1200" b="1" dirty="0">
-                <a:solidFill>
-                  <a:schemeClr val="tx1"/>
-                </a:solidFill>
-              </a:endParaRPr>
-            </a:p>
-          </p:txBody>
-        </p:sp>
-        <p:sp>
-          <p:nvSpPr>
-            <p:cNvPr id="19" name="Rectangle 18"/>
-            <p:cNvSpPr/>
-            <p:nvPr/>
-          </p:nvSpPr>
-          <p:spPr>
-            <a:xfrm>
-              <a:off x="2264749" y="3261674"/>
-              <a:ext cx="1054715" cy="341236"/>
-            </a:xfrm>
-            <a:prstGeom prst="rect">
-              <a:avLst/>
-            </a:prstGeom>
-            <a:solidFill>
-              <a:schemeClr val="bg1">
-                <a:lumMod val="95000"/>
-              </a:schemeClr>
-            </a:solidFill>
-            <a:ln>
-              <a:solidFill>
-                <a:schemeClr val="tx1"/>
-              </a:solidFill>
-            </a:ln>
-          </p:spPr>
-          <p:style>
-            <a:lnRef idx="2">
-              <a:schemeClr val="accent1">
-                <a:shade val="50000"/>
-              </a:schemeClr>
-            </a:lnRef>
-            <a:fillRef idx="1">
-              <a:schemeClr val="accent1"/>
-            </a:fillRef>
-            <a:effectRef idx="0">
-              <a:schemeClr val="accent1"/>
-            </a:effectRef>
-            <a:fontRef idx="minor">
-              <a:schemeClr val="lt1"/>
-            </a:fontRef>
-          </p:style>
-          <p:txBody>
-            <a:bodyPr rtlCol="0" anchor="ctr"/>
-            <a:lstStyle/>
-            <a:p>
-              <a:pPr algn="ctr"/>
-              <a:r>
-                <a:rPr lang="en-CA" sz="1200" b="1" dirty="0">
-                  <a:solidFill>
-                    <a:schemeClr val="tx1"/>
-                  </a:solidFill>
-                </a:rPr>
-                <a:t>Registration</a:t>
-              </a:r>
-            </a:p>
-          </p:txBody>
-        </p:sp>
-        <p:sp>
-          <p:nvSpPr>
-            <p:cNvPr id="20" name="Rectangle 19"/>
-            <p:cNvSpPr/>
-            <p:nvPr/>
-          </p:nvSpPr>
-          <p:spPr>
-            <a:xfrm>
-              <a:off x="3430572" y="3261674"/>
-              <a:ext cx="1142909" cy="341236"/>
-            </a:xfrm>
-            <a:prstGeom prst="rect">
-              <a:avLst/>
-            </a:prstGeom>
-            <a:solidFill>
-              <a:schemeClr val="bg1">
-                <a:lumMod val="95000"/>
-              </a:schemeClr>
-            </a:solidFill>
-            <a:ln>
-              <a:solidFill>
-                <a:schemeClr val="tx1"/>
-              </a:solidFill>
-            </a:ln>
-          </p:spPr>
-          <p:style>
-            <a:lnRef idx="2">
-              <a:schemeClr val="accent1">
-                <a:shade val="50000"/>
-              </a:schemeClr>
-            </a:lnRef>
-            <a:fillRef idx="1">
-              <a:schemeClr val="accent1"/>
-            </a:fillRef>
-            <a:effectRef idx="0">
-              <a:schemeClr val="accent1"/>
-            </a:effectRef>
-            <a:fontRef idx="minor">
-              <a:schemeClr val="lt1"/>
-            </a:fontRef>
-          </p:style>
-          <p:txBody>
-            <a:bodyPr rtlCol="0" anchor="ctr"/>
-            <a:lstStyle/>
-            <a:p>
-              <a:pPr algn="ctr"/>
-              <a:r>
-                <a:rPr lang="en-CA" sz="1200" b="1" dirty="0">
-                  <a:solidFill>
-                    <a:schemeClr val="tx1"/>
+                    <a:schemeClr val="bg1"/>
                   </a:solidFill>
                 </a:rPr>
                 <a:t>Segmentation</a:t>
@@ -6348,7 +6644,7 @@
         </p:sp>
         <p:sp>
           <p:nvSpPr>
-            <p:cNvPr id="23" name="TextBox 22"/>
+            <p:cNvPr id="85" name="TextBox 84"/>
             <p:cNvSpPr txBox="1"/>
             <p:nvPr/>
           </p:nvSpPr>
@@ -6381,14 +6677,14 @@
         </p:sp>
         <p:sp>
           <p:nvSpPr>
-            <p:cNvPr id="26" name="TextBox 25"/>
+            <p:cNvPr id="86" name="TextBox 85"/>
             <p:cNvSpPr txBox="1"/>
             <p:nvPr/>
           </p:nvSpPr>
           <p:spPr>
             <a:xfrm>
-              <a:off x="1354544" y="3244416"/>
-              <a:ext cx="833882" cy="307777"/>
+              <a:off x="1319634" y="3244416"/>
+              <a:ext cx="841897" cy="276999"/>
             </a:xfrm>
             <a:prstGeom prst="rect">
               <a:avLst/>
@@ -6403,7 +6699,7 @@
             <a:p>
               <a:pPr algn="r"/>
               <a:r>
-                <a:rPr lang="en-CA" sz="1400" b="1" dirty="0" smtClean="0"/>
+                <a:rPr lang="en-CA" sz="1200" b="1" dirty="0" smtClean="0"/>
                 <a:t>3D Slicer</a:t>
               </a:r>
             </a:p>
@@ -6411,7 +6707,7 @@
         </p:sp>
         <p:sp>
           <p:nvSpPr>
-            <p:cNvPr id="32" name="Rectangle 31"/>
+            <p:cNvPr id="87" name="Rectangle 86"/>
             <p:cNvSpPr/>
             <p:nvPr/>
           </p:nvSpPr>
@@ -6424,28 +6720,19 @@
               <a:avLst/>
             </a:prstGeom>
             <a:solidFill>
-              <a:schemeClr val="accent3">
-                <a:lumMod val="40000"/>
-                <a:lumOff val="60000"/>
-              </a:schemeClr>
+              <a:srgbClr val="33889F"/>
             </a:solidFill>
-            <a:ln>
-              <a:solidFill>
-                <a:schemeClr val="tx1"/>
-              </a:solidFill>
-            </a:ln>
+            <a:ln/>
           </p:spPr>
           <p:style>
-            <a:lnRef idx="2">
-              <a:schemeClr val="accent1">
-                <a:shade val="50000"/>
-              </a:schemeClr>
+            <a:lnRef idx="3">
+              <a:schemeClr val="lt1"/>
             </a:lnRef>
             <a:fillRef idx="1">
-              <a:schemeClr val="accent1"/>
+              <a:schemeClr val="accent5"/>
             </a:fillRef>
-            <a:effectRef idx="0">
-              <a:schemeClr val="accent1"/>
+            <a:effectRef idx="1">
+              <a:schemeClr val="accent5"/>
             </a:effectRef>
             <a:fontRef idx="minor">
               <a:schemeClr val="lt1"/>
@@ -6459,14 +6746,14 @@
               <a:r>
                 <a:rPr lang="en-CA" sz="1200" b="1" dirty="0" smtClean="0">
                   <a:solidFill>
-                    <a:schemeClr val="tx1"/>
+                    <a:schemeClr val="bg1"/>
                   </a:solidFill>
                 </a:rPr>
                 <a:t>Temporal and spatial calibration</a:t>
               </a:r>
               <a:endParaRPr lang="en-CA" sz="1200" b="1" dirty="0">
                 <a:solidFill>
-                  <a:schemeClr val="tx1"/>
+                  <a:schemeClr val="bg1"/>
                 </a:solidFill>
               </a:endParaRPr>
             </a:p>
@@ -6474,7 +6761,7 @@
         </p:sp>
         <p:sp>
           <p:nvSpPr>
-            <p:cNvPr id="28" name="Rectangle 27"/>
+            <p:cNvPr id="88" name="Rectangle 87"/>
             <p:cNvSpPr/>
             <p:nvPr/>
           </p:nvSpPr>
@@ -6487,27 +6774,19 @@
               <a:avLst/>
             </a:prstGeom>
             <a:solidFill>
-              <a:schemeClr val="bg1">
-                <a:lumMod val="95000"/>
-              </a:schemeClr>
+              <a:srgbClr val="78953D"/>
             </a:solidFill>
-            <a:ln>
-              <a:solidFill>
-                <a:schemeClr val="tx1"/>
-              </a:solidFill>
-            </a:ln>
+            <a:ln/>
           </p:spPr>
           <p:style>
-            <a:lnRef idx="2">
-              <a:schemeClr val="accent1">
-                <a:shade val="50000"/>
-              </a:schemeClr>
+            <a:lnRef idx="3">
+              <a:schemeClr val="lt1"/>
             </a:lnRef>
             <a:fillRef idx="1">
-              <a:schemeClr val="accent1"/>
+              <a:schemeClr val="accent3"/>
             </a:fillRef>
-            <a:effectRef idx="0">
-              <a:schemeClr val="accent1"/>
+            <a:effectRef idx="1">
+              <a:schemeClr val="accent3"/>
             </a:effectRef>
             <a:fontRef idx="minor">
               <a:schemeClr val="lt1"/>
@@ -6521,14 +6800,14 @@
               <a:r>
                 <a:rPr lang="en-CA" sz="1200" b="1" dirty="0" smtClean="0">
                   <a:solidFill>
-                    <a:schemeClr val="tx1"/>
+                    <a:schemeClr val="bg1"/>
                   </a:solidFill>
                 </a:rPr>
                 <a:t>Visualization</a:t>
               </a:r>
               <a:endParaRPr lang="en-CA" sz="1200" b="1" dirty="0">
                 <a:solidFill>
-                  <a:schemeClr val="tx1"/>
+                  <a:schemeClr val="bg1"/>
                 </a:solidFill>
               </a:endParaRPr>
             </a:p>
@@ -6536,7 +6815,7 @@
         </p:sp>
         <p:sp>
           <p:nvSpPr>
-            <p:cNvPr id="30" name="Rectangle 29"/>
+            <p:cNvPr id="89" name="Rectangle 88"/>
             <p:cNvSpPr/>
             <p:nvPr/>
           </p:nvSpPr>
@@ -6548,29 +6827,17 @@
             <a:prstGeom prst="rect">
               <a:avLst/>
             </a:prstGeom>
-            <a:solidFill>
-              <a:schemeClr val="accent3">
-                <a:lumMod val="60000"/>
-                <a:lumOff val="40000"/>
-              </a:schemeClr>
-            </a:solidFill>
-            <a:ln>
-              <a:solidFill>
-                <a:schemeClr val="tx1"/>
-              </a:solidFill>
-            </a:ln>
+            <a:ln/>
           </p:spPr>
           <p:style>
-            <a:lnRef idx="2">
-              <a:schemeClr val="accent1">
-                <a:shade val="50000"/>
-              </a:schemeClr>
+            <a:lnRef idx="3">
+              <a:schemeClr val="lt1"/>
             </a:lnRef>
             <a:fillRef idx="1">
-              <a:schemeClr val="accent1"/>
+              <a:schemeClr val="accent5"/>
             </a:fillRef>
-            <a:effectRef idx="0">
-              <a:schemeClr val="accent1"/>
+            <a:effectRef idx="1">
+              <a:schemeClr val="accent5"/>
             </a:effectRef>
             <a:fontRef idx="minor">
               <a:schemeClr val="lt1"/>
@@ -6587,14 +6854,14 @@
         </p:sp>
         <p:sp>
           <p:nvSpPr>
-            <p:cNvPr id="34" name="TextBox 33"/>
+            <p:cNvPr id="90" name="TextBox 89"/>
             <p:cNvSpPr txBox="1"/>
             <p:nvPr/>
           </p:nvSpPr>
           <p:spPr>
             <a:xfrm>
-              <a:off x="-27272" y="2156188"/>
-              <a:ext cx="947097" cy="307777"/>
+              <a:off x="54108" y="2156188"/>
+              <a:ext cx="856056" cy="276999"/>
             </a:xfrm>
             <a:prstGeom prst="rect">
               <a:avLst/>
@@ -6609,50 +6876,41 @@
             <a:p>
               <a:pPr algn="r"/>
               <a:r>
-                <a:rPr lang="en-CA" sz="1400" b="1" dirty="0" smtClean="0"/>
+                <a:rPr lang="en-CA" sz="1200" b="1" dirty="0" smtClean="0"/>
                 <a:t>SlicerIGT</a:t>
               </a:r>
-              <a:endParaRPr lang="en-CA" sz="1400" b="1" dirty="0"/>
+              <a:endParaRPr lang="en-CA" sz="1200" b="1" dirty="0"/>
             </a:p>
           </p:txBody>
         </p:sp>
         <p:sp>
           <p:nvSpPr>
-            <p:cNvPr id="36" name="Rectangle 35"/>
+            <p:cNvPr id="91" name="Rectangle 90"/>
             <p:cNvSpPr/>
             <p:nvPr/>
           </p:nvSpPr>
           <p:spPr>
             <a:xfrm>
-              <a:off x="2654809" y="2114116"/>
+              <a:off x="2654809" y="2141011"/>
               <a:ext cx="1492585" cy="341198"/>
             </a:xfrm>
             <a:prstGeom prst="rect">
               <a:avLst/>
             </a:prstGeom>
             <a:solidFill>
-              <a:schemeClr val="accent3">
-                <a:lumMod val="40000"/>
-                <a:lumOff val="60000"/>
-              </a:schemeClr>
+              <a:srgbClr val="33889F"/>
             </a:solidFill>
-            <a:ln>
-              <a:solidFill>
-                <a:schemeClr val="tx1"/>
-              </a:solidFill>
-            </a:ln>
+            <a:ln/>
           </p:spPr>
           <p:style>
-            <a:lnRef idx="2">
-              <a:schemeClr val="accent1">
-                <a:shade val="50000"/>
-              </a:schemeClr>
+            <a:lnRef idx="3">
+              <a:schemeClr val="lt1"/>
             </a:lnRef>
             <a:fillRef idx="1">
-              <a:schemeClr val="accent1"/>
+              <a:schemeClr val="accent5"/>
             </a:fillRef>
-            <a:effectRef idx="0">
-              <a:schemeClr val="accent1"/>
+            <a:effectRef idx="1">
+              <a:schemeClr val="accent5"/>
             </a:effectRef>
             <a:fontRef idx="minor">
               <a:schemeClr val="lt1"/>
@@ -6666,14 +6924,14 @@
               <a:r>
                 <a:rPr lang="en-US" sz="1200" b="1" dirty="0" smtClean="0">
                   <a:solidFill>
-                    <a:schemeClr val="tx1"/>
+                    <a:schemeClr val="bg1"/>
                   </a:solidFill>
                 </a:rPr>
                 <a:t>Transform recorder</a:t>
               </a:r>
               <a:endParaRPr lang="en-CA" sz="1200" b="1" dirty="0">
                 <a:solidFill>
-                  <a:schemeClr val="tx1"/>
+                  <a:schemeClr val="bg1"/>
                 </a:solidFill>
               </a:endParaRPr>
             </a:p>
@@ -6681,41 +6939,32 @@
         </p:sp>
         <p:sp>
           <p:nvSpPr>
-            <p:cNvPr id="37" name="Rectangle 36"/>
+            <p:cNvPr id="92" name="Rectangle 91"/>
             <p:cNvSpPr/>
             <p:nvPr/>
           </p:nvSpPr>
           <p:spPr>
             <a:xfrm>
-              <a:off x="1016289" y="2114116"/>
+              <a:off x="1016289" y="2141011"/>
               <a:ext cx="1271688" cy="341198"/>
             </a:xfrm>
             <a:prstGeom prst="rect">
               <a:avLst/>
             </a:prstGeom>
             <a:solidFill>
-              <a:schemeClr val="accent3">
-                <a:lumMod val="40000"/>
-                <a:lumOff val="60000"/>
-              </a:schemeClr>
+              <a:srgbClr val="33889F"/>
             </a:solidFill>
-            <a:ln>
-              <a:solidFill>
-                <a:schemeClr val="tx1"/>
-              </a:solidFill>
-            </a:ln>
+            <a:ln/>
           </p:spPr>
           <p:style>
-            <a:lnRef idx="2">
-              <a:schemeClr val="accent1">
-                <a:shade val="50000"/>
-              </a:schemeClr>
+            <a:lnRef idx="3">
+              <a:schemeClr val="lt1"/>
             </a:lnRef>
             <a:fillRef idx="1">
-              <a:schemeClr val="accent1"/>
+              <a:schemeClr val="accent5"/>
             </a:fillRef>
-            <a:effectRef idx="0">
-              <a:schemeClr val="accent1"/>
+            <a:effectRef idx="1">
+              <a:schemeClr val="accent5"/>
             </a:effectRef>
             <a:fontRef idx="minor">
               <a:schemeClr val="lt1"/>
@@ -6729,7 +6978,7 @@
               <a:r>
                 <a:rPr lang="en-US" sz="1200" b="1" dirty="0" smtClean="0">
                   <a:solidFill>
-                    <a:schemeClr val="tx1"/>
+                    <a:schemeClr val="bg1"/>
                   </a:solidFill>
                 </a:rPr>
                 <a:t>Live </a:t>
@@ -6737,7 +6986,7 @@
               <a:r>
                 <a:rPr lang="en-US" sz="1200" b="1" dirty="0">
                   <a:solidFill>
-                    <a:schemeClr val="tx1"/>
+                    <a:schemeClr val="bg1"/>
                   </a:solidFill>
                 </a:rPr>
                 <a:t>u</a:t>
@@ -6745,14 +6994,14 @@
               <a:r>
                 <a:rPr lang="en-US" sz="1200" b="1" dirty="0" smtClean="0">
                   <a:solidFill>
-                    <a:schemeClr val="tx1"/>
+                    <a:schemeClr val="bg1"/>
                   </a:solidFill>
                 </a:rPr>
                 <a:t>ltrasound</a:t>
               </a:r>
               <a:endParaRPr lang="en-CA" sz="1200" b="1" dirty="0">
                 <a:solidFill>
-                  <a:schemeClr val="tx1"/>
+                  <a:schemeClr val="bg1"/>
                 </a:solidFill>
               </a:endParaRPr>
             </a:p>
@@ -6760,14 +7009,14 @@
         </p:sp>
         <p:sp>
           <p:nvSpPr>
-            <p:cNvPr id="39" name="TextBox 38"/>
+            <p:cNvPr id="93" name="TextBox 92"/>
             <p:cNvSpPr txBox="1"/>
             <p:nvPr/>
           </p:nvSpPr>
           <p:spPr>
             <a:xfrm>
-              <a:off x="1475656" y="4648912"/>
-              <a:ext cx="683271" cy="317018"/>
+              <a:off x="1563892" y="4648912"/>
+              <a:ext cx="595035" cy="276999"/>
             </a:xfrm>
             <a:prstGeom prst="rect">
               <a:avLst/>
@@ -6782,16 +7031,16 @@
             <a:p>
               <a:pPr algn="r"/>
               <a:r>
-                <a:rPr lang="en-CA" sz="1400" b="1" dirty="0" smtClean="0"/>
+                <a:rPr lang="en-CA" sz="1200" b="1" dirty="0" smtClean="0"/>
                 <a:t>PLUS</a:t>
               </a:r>
-              <a:endParaRPr lang="en-CA" sz="1400" b="1" dirty="0"/>
+              <a:endParaRPr lang="en-CA" sz="1200" b="1" dirty="0"/>
             </a:p>
           </p:txBody>
         </p:sp>
         <p:cxnSp>
           <p:nvCxnSpPr>
-            <p:cNvPr id="41" name="Straight Connector 40"/>
+            <p:cNvPr id="94" name="Straight Connector 93"/>
             <p:cNvCxnSpPr/>
             <p:nvPr/>
           </p:nvCxnSpPr>
@@ -6824,7 +7073,7 @@
         </p:cxnSp>
         <p:sp>
           <p:nvSpPr>
-            <p:cNvPr id="35" name="TextBox 34"/>
+            <p:cNvPr id="95" name="TextBox 94"/>
             <p:cNvSpPr txBox="1"/>
             <p:nvPr/>
           </p:nvSpPr>
@@ -6854,7 +7103,7 @@
         </p:sp>
         <p:sp>
           <p:nvSpPr>
-            <p:cNvPr id="42" name="Rectangle 41"/>
+            <p:cNvPr id="96" name="Rectangle 95"/>
             <p:cNvSpPr/>
             <p:nvPr/>
           </p:nvSpPr>
@@ -6866,29 +7115,17 @@
             <a:prstGeom prst="rect">
               <a:avLst/>
             </a:prstGeom>
-            <a:solidFill>
-              <a:schemeClr val="accent3">
-                <a:lumMod val="60000"/>
-                <a:lumOff val="40000"/>
-              </a:schemeClr>
-            </a:solidFill>
-            <a:ln>
-              <a:solidFill>
-                <a:schemeClr val="tx1"/>
-              </a:solidFill>
-            </a:ln>
+            <a:ln/>
           </p:spPr>
           <p:style>
-            <a:lnRef idx="2">
-              <a:schemeClr val="accent1">
-                <a:shade val="50000"/>
-              </a:schemeClr>
+            <a:lnRef idx="3">
+              <a:schemeClr val="lt1"/>
             </a:lnRef>
             <a:fillRef idx="1">
-              <a:schemeClr val="accent1"/>
+              <a:schemeClr val="accent5"/>
             </a:fillRef>
-            <a:effectRef idx="0">
-              <a:schemeClr val="accent1"/>
+            <a:effectRef idx="1">
+              <a:schemeClr val="accent5"/>
             </a:effectRef>
             <a:fontRef idx="minor">
               <a:schemeClr val="lt1"/>
@@ -6905,14 +7142,14 @@
         </p:sp>
         <p:sp>
           <p:nvSpPr>
-            <p:cNvPr id="43" name="TextBox 42"/>
+            <p:cNvPr id="97" name="TextBox 96"/>
             <p:cNvSpPr txBox="1"/>
             <p:nvPr/>
           </p:nvSpPr>
           <p:spPr>
             <a:xfrm>
-              <a:off x="7981658" y="2147537"/>
-              <a:ext cx="776046" cy="307777"/>
+              <a:off x="8041104" y="2147537"/>
+              <a:ext cx="739001" cy="276999"/>
             </a:xfrm>
             <a:prstGeom prst="rect">
               <a:avLst/>
@@ -6927,50 +7164,41 @@
             <a:p>
               <a:pPr algn="r"/>
               <a:r>
-                <a:rPr lang="en-CA" sz="1400" b="1" dirty="0" err="1" smtClean="0"/>
+                <a:rPr lang="en-CA" sz="1200" b="1" dirty="0" err="1" smtClean="0"/>
                 <a:t>SlicerRT</a:t>
               </a:r>
-              <a:endParaRPr lang="en-CA" sz="1400" b="1" dirty="0"/>
+              <a:endParaRPr lang="en-CA" sz="1200" b="1" dirty="0"/>
             </a:p>
           </p:txBody>
         </p:sp>
         <p:sp>
           <p:nvSpPr>
-            <p:cNvPr id="44" name="Rectangle 43"/>
+            <p:cNvPr id="98" name="Rectangle 97"/>
             <p:cNvSpPr/>
             <p:nvPr/>
           </p:nvSpPr>
           <p:spPr>
             <a:xfrm>
-              <a:off x="4897346" y="2132856"/>
+              <a:off x="4897346" y="2141821"/>
               <a:ext cx="1340160" cy="341198"/>
             </a:xfrm>
             <a:prstGeom prst="rect">
               <a:avLst/>
             </a:prstGeom>
             <a:solidFill>
-              <a:schemeClr val="accent3">
-                <a:lumMod val="40000"/>
-                <a:lumOff val="60000"/>
-              </a:schemeClr>
+              <a:srgbClr val="33889F"/>
             </a:solidFill>
-            <a:ln>
-              <a:solidFill>
-                <a:schemeClr val="tx1"/>
-              </a:solidFill>
-            </a:ln>
+            <a:ln/>
           </p:spPr>
           <p:style>
-            <a:lnRef idx="2">
-              <a:schemeClr val="accent1">
-                <a:shade val="50000"/>
-              </a:schemeClr>
+            <a:lnRef idx="3">
+              <a:schemeClr val="lt1"/>
             </a:lnRef>
             <a:fillRef idx="1">
-              <a:schemeClr val="accent1"/>
+              <a:schemeClr val="accent5"/>
             </a:fillRef>
-            <a:effectRef idx="0">
-              <a:schemeClr val="accent1"/>
+            <a:effectRef idx="1">
+              <a:schemeClr val="accent5"/>
             </a:effectRef>
             <a:fontRef idx="minor">
               <a:schemeClr val="lt1"/>
@@ -6984,14 +7212,14 @@
               <a:r>
                 <a:rPr lang="en-US" sz="1200" b="1" dirty="0" smtClean="0">
                   <a:solidFill>
-                    <a:schemeClr val="tx1"/>
+                    <a:schemeClr val="bg1"/>
                   </a:solidFill>
                 </a:rPr>
                 <a:t>DICOM-RT import</a:t>
               </a:r>
               <a:endParaRPr lang="en-CA" sz="1200" b="1" dirty="0">
                 <a:solidFill>
-                  <a:schemeClr val="tx1"/>
+                  <a:schemeClr val="bg1"/>
                 </a:solidFill>
               </a:endParaRPr>
             </a:p>
@@ -6999,41 +7227,32 @@
         </p:sp>
         <p:sp>
           <p:nvSpPr>
-            <p:cNvPr id="45" name="Rectangle 44"/>
+            <p:cNvPr id="99" name="Rectangle 98"/>
             <p:cNvSpPr/>
             <p:nvPr/>
           </p:nvSpPr>
           <p:spPr>
             <a:xfrm>
-              <a:off x="6525456" y="2132856"/>
-              <a:ext cx="1340160" cy="341198"/>
+              <a:off x="6569533" y="2141821"/>
+              <a:ext cx="1287867" cy="341198"/>
             </a:xfrm>
             <a:prstGeom prst="rect">
               <a:avLst/>
             </a:prstGeom>
             <a:solidFill>
-              <a:schemeClr val="accent3">
-                <a:lumMod val="40000"/>
-                <a:lumOff val="60000"/>
-              </a:schemeClr>
+              <a:srgbClr val="33889F"/>
             </a:solidFill>
-            <a:ln>
-              <a:solidFill>
-                <a:schemeClr val="tx1"/>
-              </a:solidFill>
-            </a:ln>
+            <a:ln/>
           </p:spPr>
           <p:style>
-            <a:lnRef idx="2">
-              <a:schemeClr val="accent1">
-                <a:shade val="50000"/>
-              </a:schemeClr>
+            <a:lnRef idx="3">
+              <a:schemeClr val="lt1"/>
             </a:lnRef>
             <a:fillRef idx="1">
-              <a:schemeClr val="accent1"/>
+              <a:schemeClr val="accent5"/>
             </a:fillRef>
-            <a:effectRef idx="0">
-              <a:schemeClr val="accent1"/>
+            <a:effectRef idx="1">
+              <a:schemeClr val="accent5"/>
             </a:effectRef>
             <a:fontRef idx="minor">
               <a:schemeClr val="lt1"/>
@@ -7047,14 +7266,14 @@
               <a:r>
                 <a:rPr lang="en-US" sz="1200" b="1" dirty="0" smtClean="0">
                   <a:solidFill>
-                    <a:schemeClr val="tx1"/>
+                    <a:schemeClr val="bg1"/>
                   </a:solidFill>
                 </a:rPr>
                 <a:t>Dose comparison</a:t>
               </a:r>
               <a:endParaRPr lang="en-CA" sz="1200" b="1" dirty="0">
                 <a:solidFill>
-                  <a:schemeClr val="tx1"/>
+                  <a:schemeClr val="bg1"/>
                 </a:solidFill>
               </a:endParaRPr>
             </a:p>
@@ -7062,7 +7281,7 @@
         </p:sp>
         <p:sp>
           <p:nvSpPr>
-            <p:cNvPr id="46" name="Rectangle 45"/>
+            <p:cNvPr id="100" name="Rectangle 99"/>
             <p:cNvSpPr/>
             <p:nvPr/>
           </p:nvSpPr>
@@ -7075,27 +7294,19 @@
               <a:avLst/>
             </a:prstGeom>
             <a:solidFill>
-              <a:schemeClr val="bg1">
-                <a:lumMod val="95000"/>
-              </a:schemeClr>
+              <a:srgbClr val="78953D"/>
             </a:solidFill>
-            <a:ln>
-              <a:solidFill>
-                <a:schemeClr val="tx1"/>
-              </a:solidFill>
-            </a:ln>
+            <a:ln/>
           </p:spPr>
           <p:style>
-            <a:lnRef idx="2">
-              <a:schemeClr val="accent1">
-                <a:shade val="50000"/>
-              </a:schemeClr>
+            <a:lnRef idx="3">
+              <a:schemeClr val="lt1"/>
             </a:lnRef>
             <a:fillRef idx="1">
-              <a:schemeClr val="accent1"/>
+              <a:schemeClr val="accent3"/>
             </a:fillRef>
-            <a:effectRef idx="0">
-              <a:schemeClr val="accent1"/>
+            <a:effectRef idx="1">
+              <a:schemeClr val="accent3"/>
             </a:effectRef>
             <a:fontRef idx="minor">
               <a:schemeClr val="lt1"/>
@@ -7109,14 +7320,14 @@
               <a:r>
                 <a:rPr lang="en-CA" sz="1200" b="1" dirty="0" smtClean="0">
                   <a:solidFill>
-                    <a:schemeClr val="tx1"/>
+                    <a:schemeClr val="bg1"/>
                   </a:solidFill>
                 </a:rPr>
                 <a:t>VTK, ITK, CTK, QT, DCMTK, …</a:t>
               </a:r>
               <a:endParaRPr lang="en-CA" sz="1200" b="1" dirty="0">
                 <a:solidFill>
-                  <a:schemeClr val="tx1"/>
+                  <a:schemeClr val="bg1"/>
                 </a:solidFill>
               </a:endParaRPr>
             </a:p>
@@ -7124,7 +7335,7 @@
         </p:sp>
         <p:sp>
           <p:nvSpPr>
-            <p:cNvPr id="47" name="TextBox 46"/>
+            <p:cNvPr id="101" name="TextBox 100"/>
             <p:cNvSpPr txBox="1"/>
             <p:nvPr/>
           </p:nvSpPr>
@@ -7157,13 +7368,13 @@
         </p:sp>
         <p:sp>
           <p:nvSpPr>
-            <p:cNvPr id="48" name="TextBox 47"/>
+            <p:cNvPr id="102" name="TextBox 101"/>
             <p:cNvSpPr txBox="1"/>
             <p:nvPr/>
           </p:nvSpPr>
           <p:spPr>
             <a:xfrm>
-              <a:off x="6181458" y="2060848"/>
+              <a:off x="6217318" y="2060848"/>
               <a:ext cx="377026" cy="369332"/>
             </a:xfrm>
             <a:prstGeom prst="rect">
@@ -7190,7 +7401,7 @@
         </p:sp>
         <p:sp>
           <p:nvSpPr>
-            <p:cNvPr id="51" name="Rectangle 50"/>
+            <p:cNvPr id="103" name="Rectangle 102"/>
             <p:cNvSpPr/>
             <p:nvPr/>
           </p:nvSpPr>
@@ -7202,29 +7413,17 @@
             <a:prstGeom prst="rect">
               <a:avLst/>
             </a:prstGeom>
-            <a:solidFill>
-              <a:schemeClr val="accent3">
-                <a:lumMod val="60000"/>
-                <a:lumOff val="40000"/>
-              </a:schemeClr>
-            </a:solidFill>
-            <a:ln>
-              <a:solidFill>
-                <a:schemeClr val="tx1"/>
-              </a:solidFill>
-            </a:ln>
+            <a:ln/>
           </p:spPr>
           <p:style>
-            <a:lnRef idx="2">
-              <a:schemeClr val="accent1">
-                <a:shade val="50000"/>
-              </a:schemeClr>
+            <a:lnRef idx="3">
+              <a:schemeClr val="lt1"/>
             </a:lnRef>
             <a:fillRef idx="1">
-              <a:schemeClr val="accent1"/>
+              <a:schemeClr val="accent5"/>
             </a:fillRef>
-            <a:effectRef idx="0">
-              <a:schemeClr val="accent1"/>
+            <a:effectRef idx="1">
+              <a:schemeClr val="accent5"/>
             </a:effectRef>
             <a:fontRef idx="minor">
               <a:schemeClr val="lt1"/>
@@ -7241,25 +7440,36 @@
         </p:sp>
         <p:sp>
           <p:nvSpPr>
-            <p:cNvPr id="24" name="TextBox 23"/>
+            <p:cNvPr id="104" name="TextBox 103"/>
             <p:cNvSpPr txBox="1"/>
             <p:nvPr/>
           </p:nvSpPr>
           <p:spPr>
             <a:xfrm>
-              <a:off x="3912824" y="1459281"/>
-              <a:ext cx="1172472" cy="307777"/>
+              <a:off x="3973603" y="1504106"/>
+              <a:ext cx="1050914" cy="276999"/>
             </a:xfrm>
             <a:prstGeom prst="rect">
               <a:avLst/>
             </a:prstGeom>
             <a:solidFill>
-              <a:schemeClr val="accent3">
-                <a:lumMod val="60000"/>
-                <a:lumOff val="40000"/>
-              </a:schemeClr>
+              <a:srgbClr val="33889F"/>
             </a:solidFill>
           </p:spPr>
+          <p:style>
+            <a:lnRef idx="3">
+              <a:schemeClr val="lt1"/>
+            </a:lnRef>
+            <a:fillRef idx="1">
+              <a:schemeClr val="accent5"/>
+            </a:fillRef>
+            <a:effectRef idx="1">
+              <a:schemeClr val="accent5"/>
+            </a:effectRef>
+            <a:fontRef idx="minor">
+              <a:schemeClr val="lt1"/>
+            </a:fontRef>
+          </p:style>
           <p:txBody>
             <a:bodyPr wrap="square" rtlCol="0">
               <a:spAutoFit/>
@@ -7268,23 +7478,23 @@
             <a:p>
               <a:pPr algn="ctr"/>
               <a:r>
-                <a:rPr lang="en-CA" sz="1400" b="1" dirty="0" err="1" smtClean="0"/>
+                <a:rPr lang="en-CA" sz="1200" b="1" dirty="0" err="1" smtClean="0"/>
                 <a:t>ProstateNav</a:t>
               </a:r>
-              <a:endParaRPr lang="en-CA" sz="1400" b="1" dirty="0"/>
+              <a:endParaRPr lang="en-CA" sz="1200" b="1" dirty="0"/>
             </a:p>
           </p:txBody>
         </p:sp>
         <p:sp>
           <p:nvSpPr>
-            <p:cNvPr id="54" name="TextBox 53"/>
+            <p:cNvPr id="105" name="TextBox 104"/>
             <p:cNvSpPr txBox="1"/>
             <p:nvPr/>
           </p:nvSpPr>
           <p:spPr>
             <a:xfrm>
-              <a:off x="1979712" y="1459281"/>
-              <a:ext cx="958887" cy="307777"/>
+              <a:off x="1979712" y="1486176"/>
+              <a:ext cx="958887" cy="276999"/>
             </a:xfrm>
             <a:prstGeom prst="rect">
               <a:avLst/>
@@ -7299,16 +7509,24 @@
             <a:p>
               <a:pPr algn="r"/>
               <a:r>
-                <a:rPr lang="en-CA" sz="1400" b="1" dirty="0" smtClean="0"/>
+                <a:rPr lang="en-CA" sz="1200" b="1" dirty="0" smtClean="0">
+                  <a:solidFill>
+                    <a:schemeClr val="bg1"/>
+                  </a:solidFill>
+                </a:rPr>
                 <a:t>Perk Tutor</a:t>
               </a:r>
-              <a:endParaRPr lang="en-CA" sz="1400" b="1" dirty="0"/>
+              <a:endParaRPr lang="en-CA" sz="1200" b="1" dirty="0">
+                <a:solidFill>
+                  <a:schemeClr val="bg1"/>
+                </a:solidFill>
+              </a:endParaRPr>
             </a:p>
           </p:txBody>
         </p:sp>
         <p:sp>
           <p:nvSpPr>
-            <p:cNvPr id="55" name="Rectangle 54"/>
+            <p:cNvPr id="106" name="Rectangle 105"/>
             <p:cNvSpPr/>
             <p:nvPr/>
           </p:nvSpPr>
@@ -7320,28 +7538,17 @@
             <a:prstGeom prst="rect">
               <a:avLst/>
             </a:prstGeom>
-            <a:solidFill>
-              <a:schemeClr val="bg1">
-                <a:lumMod val="85000"/>
-              </a:schemeClr>
-            </a:solidFill>
-            <a:ln>
-              <a:solidFill>
-                <a:schemeClr val="tx1"/>
-              </a:solidFill>
-            </a:ln>
+            <a:ln/>
           </p:spPr>
           <p:style>
-            <a:lnRef idx="2">
-              <a:schemeClr val="accent1">
-                <a:shade val="50000"/>
-              </a:schemeClr>
+            <a:lnRef idx="3">
+              <a:schemeClr val="lt1"/>
             </a:lnRef>
             <a:fillRef idx="1">
-              <a:schemeClr val="accent1"/>
+              <a:schemeClr val="accent3"/>
             </a:fillRef>
-            <a:effectRef idx="0">
-              <a:schemeClr val="accent1"/>
+            <a:effectRef idx="1">
+              <a:schemeClr val="accent3"/>
             </a:effectRef>
             <a:fontRef idx="minor">
               <a:schemeClr val="lt1"/>
@@ -7355,14 +7562,14 @@
               <a:r>
                 <a:rPr lang="en-CA" sz="1200" b="1" dirty="0" smtClean="0">
                   <a:solidFill>
-                    <a:schemeClr val="tx1"/>
+                    <a:schemeClr val="bg1"/>
                   </a:solidFill>
                 </a:rPr>
                 <a:t>MRI scanner</a:t>
               </a:r>
               <a:endParaRPr lang="en-CA" sz="1200" b="1" dirty="0">
                 <a:solidFill>
-                  <a:schemeClr val="tx1"/>
+                  <a:schemeClr val="bg1"/>
                 </a:solidFill>
               </a:endParaRPr>
             </a:p>
@@ -7370,9 +7577,9 @@
         </p:sp>
         <p:cxnSp>
           <p:nvCxnSpPr>
-            <p:cNvPr id="56" name="Straight Connector 55"/>
+            <p:cNvPr id="107" name="Straight Connector 106"/>
             <p:cNvCxnSpPr>
-              <a:stCxn id="15" idx="3"/>
+              <a:stCxn id="80" idx="3"/>
             </p:cNvCxnSpPr>
             <p:nvPr/>
           </p:nvCxnSpPr>
@@ -7384,7 +7591,7 @@
             <a:prstGeom prst="line">
               <a:avLst/>
             </a:prstGeom>
-            <a:ln w="38100">
+            <a:ln w="31750">
               <a:solidFill>
                 <a:schemeClr val="tx1"/>
               </a:solidFill>
@@ -7408,7 +7615,7 @@
         </p:cxnSp>
         <p:sp>
           <p:nvSpPr>
-            <p:cNvPr id="57" name="Rectangle 56"/>
+            <p:cNvPr id="108" name="Rectangle 107"/>
             <p:cNvSpPr/>
             <p:nvPr/>
           </p:nvSpPr>
@@ -7420,29 +7627,17 @@
             <a:prstGeom prst="rect">
               <a:avLst/>
             </a:prstGeom>
-            <a:solidFill>
-              <a:schemeClr val="accent3">
-                <a:lumMod val="60000"/>
-                <a:lumOff val="40000"/>
-              </a:schemeClr>
-            </a:solidFill>
-            <a:ln>
-              <a:solidFill>
-                <a:schemeClr val="tx1"/>
-              </a:solidFill>
-            </a:ln>
+            <a:ln/>
           </p:spPr>
           <p:style>
-            <a:lnRef idx="2">
-              <a:schemeClr val="accent1">
-                <a:shade val="50000"/>
-              </a:schemeClr>
+            <a:lnRef idx="3">
+              <a:schemeClr val="lt1"/>
             </a:lnRef>
             <a:fillRef idx="1">
-              <a:schemeClr val="accent1"/>
+              <a:schemeClr val="accent5"/>
             </a:fillRef>
-            <a:effectRef idx="0">
-              <a:schemeClr val="accent1"/>
+            <a:effectRef idx="1">
+              <a:schemeClr val="accent5"/>
             </a:effectRef>
             <a:fontRef idx="minor">
               <a:schemeClr val="lt1"/>
@@ -7456,14 +7651,14 @@
               <a:r>
                 <a:rPr lang="en-CA" sz="1200" b="1" dirty="0" smtClean="0">
                   <a:solidFill>
-                    <a:schemeClr val="tx1"/>
+                    <a:schemeClr val="bg1"/>
                   </a:solidFill>
                 </a:rPr>
                 <a:t>Custom needle guide</a:t>
               </a:r>
               <a:endParaRPr lang="en-CA" sz="1200" b="1" dirty="0">
                 <a:solidFill>
-                  <a:schemeClr val="tx1"/>
+                  <a:schemeClr val="bg1"/>
                 </a:solidFill>
               </a:endParaRPr>
             </a:p>
@@ -7471,9 +7666,9 @@
         </p:sp>
         <p:cxnSp>
           <p:nvCxnSpPr>
-            <p:cNvPr id="59" name="Straight Connector 58"/>
+            <p:cNvPr id="109" name="Straight Connector 108"/>
             <p:cNvCxnSpPr>
-              <a:stCxn id="55" idx="0"/>
+              <a:stCxn id="106" idx="0"/>
             </p:cNvCxnSpPr>
             <p:nvPr/>
           </p:nvCxnSpPr>
@@ -7485,7 +7680,7 @@
             <a:prstGeom prst="line">
               <a:avLst/>
             </a:prstGeom>
-            <a:ln w="38100">
+            <a:ln w="31750">
               <a:solidFill>
                 <a:schemeClr val="tx1"/>
               </a:solidFill>
@@ -7509,7 +7704,7 @@
         </p:cxnSp>
         <p:cxnSp>
           <p:nvCxnSpPr>
-            <p:cNvPr id="62" name="Straight Connector 61"/>
+            <p:cNvPr id="110" name="Straight Connector 109"/>
             <p:cNvCxnSpPr/>
             <p:nvPr/>
           </p:nvCxnSpPr>
@@ -7521,7 +7716,7 @@
             <a:prstGeom prst="line">
               <a:avLst/>
             </a:prstGeom>
-            <a:ln w="38100">
+            <a:ln w="31750">
               <a:solidFill>
                 <a:schemeClr val="tx1"/>
               </a:solidFill>
@@ -7545,41 +7740,29 @@
         </p:cxnSp>
         <p:sp>
           <p:nvSpPr>
-            <p:cNvPr id="66" name="Rectangle 65"/>
+            <p:cNvPr id="111" name="Rectangle 110"/>
             <p:cNvSpPr/>
             <p:nvPr/>
           </p:nvSpPr>
           <p:spPr>
             <a:xfrm>
-              <a:off x="7537154" y="314350"/>
+              <a:off x="7537154" y="562789"/>
               <a:ext cx="1240058" cy="569114"/>
             </a:xfrm>
             <a:prstGeom prst="rect">
               <a:avLst/>
             </a:prstGeom>
-            <a:solidFill>
-              <a:schemeClr val="accent3">
-                <a:lumMod val="60000"/>
-                <a:lumOff val="40000"/>
-              </a:schemeClr>
-            </a:solidFill>
-            <a:ln>
-              <a:solidFill>
-                <a:schemeClr val="tx1"/>
-              </a:solidFill>
-            </a:ln>
+            <a:ln/>
           </p:spPr>
           <p:style>
-            <a:lnRef idx="2">
-              <a:schemeClr val="accent1">
-                <a:shade val="50000"/>
-              </a:schemeClr>
+            <a:lnRef idx="3">
+              <a:schemeClr val="lt1"/>
             </a:lnRef>
             <a:fillRef idx="1">
-              <a:schemeClr val="accent1"/>
+              <a:schemeClr val="accent5"/>
             </a:fillRef>
-            <a:effectRef idx="0">
-              <a:schemeClr val="accent1"/>
+            <a:effectRef idx="1">
+              <a:schemeClr val="accent5"/>
             </a:effectRef>
             <a:fontRef idx="minor">
               <a:schemeClr val="lt1"/>
@@ -7596,14 +7779,14 @@
         </p:sp>
         <p:sp>
           <p:nvSpPr>
-            <p:cNvPr id="67" name="TextBox 66"/>
+            <p:cNvPr id="112" name="TextBox 111"/>
             <p:cNvSpPr txBox="1"/>
             <p:nvPr/>
           </p:nvSpPr>
           <p:spPr>
             <a:xfrm>
-              <a:off x="7537153" y="343356"/>
-              <a:ext cx="1246902" cy="523220"/>
+              <a:off x="7537153" y="618690"/>
+              <a:ext cx="1246902" cy="461665"/>
             </a:xfrm>
             <a:prstGeom prst="rect">
               <a:avLst/>
@@ -7618,53 +7801,54 @@
             <a:p>
               <a:pPr algn="ctr"/>
               <a:r>
-                <a:rPr lang="en-CA" sz="1400" b="1" i="1" dirty="0" smtClean="0"/>
+                <a:rPr lang="en-CA" sz="1200" b="1" i="1" dirty="0" smtClean="0">
+                  <a:solidFill>
+                    <a:schemeClr val="bg1"/>
+                  </a:solidFill>
+                </a:rPr>
                 <a:t>Developed in the </a:t>
               </a:r>
               <a:r>
-                <a:rPr lang="en-CA" sz="1400" b="1" i="1" dirty="0" err="1" smtClean="0"/>
+                <a:rPr lang="en-CA" sz="1200" b="1" i="1" dirty="0" err="1" smtClean="0">
+                  <a:solidFill>
+                    <a:schemeClr val="bg1"/>
+                  </a:solidFill>
+                </a:rPr>
                 <a:t>PerkLab</a:t>
               </a:r>
-              <a:endParaRPr lang="en-CA" sz="1400" b="1" i="1" dirty="0"/>
+              <a:endParaRPr lang="en-CA" sz="1200" b="1" i="1" dirty="0">
+                <a:solidFill>
+                  <a:schemeClr val="bg1"/>
+                </a:solidFill>
+              </a:endParaRPr>
             </a:p>
           </p:txBody>
         </p:sp>
         <p:sp>
           <p:nvSpPr>
-            <p:cNvPr id="68" name="Rectangle 67"/>
+            <p:cNvPr id="113" name="Rectangle 112"/>
             <p:cNvSpPr/>
             <p:nvPr/>
           </p:nvSpPr>
           <p:spPr>
             <a:xfrm>
-              <a:off x="7537153" y="965897"/>
+              <a:off x="7537153" y="1214336"/>
               <a:ext cx="1246902" cy="569114"/>
             </a:xfrm>
             <a:prstGeom prst="rect">
               <a:avLst/>
             </a:prstGeom>
-            <a:solidFill>
-              <a:schemeClr val="bg1">
-                <a:lumMod val="85000"/>
-              </a:schemeClr>
-            </a:solidFill>
-            <a:ln>
-              <a:solidFill>
-                <a:schemeClr val="tx1"/>
-              </a:solidFill>
-            </a:ln>
+            <a:ln/>
           </p:spPr>
           <p:style>
-            <a:lnRef idx="2">
-              <a:schemeClr val="accent1">
-                <a:shade val="50000"/>
-              </a:schemeClr>
+            <a:lnRef idx="3">
+              <a:schemeClr val="lt1"/>
             </a:lnRef>
             <a:fillRef idx="1">
-              <a:schemeClr val="accent1"/>
+              <a:schemeClr val="accent3"/>
             </a:fillRef>
-            <a:effectRef idx="0">
-              <a:schemeClr val="accent1"/>
+            <a:effectRef idx="1">
+              <a:schemeClr val="accent3"/>
             </a:effectRef>
             <a:fontRef idx="minor">
               <a:schemeClr val="lt1"/>
@@ -7675,20 +7859,24 @@
             <a:lstStyle/>
             <a:p>
               <a:pPr algn="ctr"/>
-              <a:endParaRPr lang="en-CA" sz="1200" dirty="0"/>
+              <a:endParaRPr lang="en-CA" sz="1200" dirty="0">
+                <a:solidFill>
+                  <a:schemeClr val="bg1"/>
+                </a:solidFill>
+              </a:endParaRPr>
             </a:p>
           </p:txBody>
         </p:sp>
         <p:sp>
           <p:nvSpPr>
-            <p:cNvPr id="69" name="TextBox 68"/>
+            <p:cNvPr id="114" name="TextBox 113"/>
             <p:cNvSpPr txBox="1"/>
             <p:nvPr/>
           </p:nvSpPr>
           <p:spPr>
             <a:xfrm>
-              <a:off x="7545192" y="994903"/>
-              <a:ext cx="1238863" cy="523220"/>
+              <a:off x="7545192" y="1261272"/>
+              <a:ext cx="1238863" cy="461665"/>
             </a:xfrm>
             <a:prstGeom prst="rect">
               <a:avLst/>
@@ -7703,50 +7891,49 @@
             <a:p>
               <a:pPr algn="ctr"/>
               <a:r>
-                <a:rPr lang="en-CA" sz="1400" b="1" i="1" dirty="0" smtClean="0"/>
+                <a:rPr lang="en-CA" sz="1200" b="1" i="1" dirty="0" smtClean="0">
+                  <a:solidFill>
+                    <a:schemeClr val="bg1"/>
+                  </a:solidFill>
+                </a:rPr>
                 <a:t>Developed by collaborators</a:t>
               </a:r>
-              <a:endParaRPr lang="en-CA" sz="1400" b="1" i="1" dirty="0"/>
+              <a:endParaRPr lang="en-CA" sz="1200" b="1" i="1" dirty="0">
+                <a:solidFill>
+                  <a:schemeClr val="bg1"/>
+                </a:solidFill>
+              </a:endParaRPr>
             </a:p>
           </p:txBody>
         </p:sp>
         <p:sp>
           <p:nvSpPr>
-            <p:cNvPr id="60" name="Rectangle 59"/>
+            <p:cNvPr id="72" name="Rectangle 71"/>
             <p:cNvSpPr/>
             <p:nvPr/>
           </p:nvSpPr>
           <p:spPr>
             <a:xfrm>
-              <a:off x="4798842" y="6309320"/>
-              <a:ext cx="1574936" cy="314987"/>
+              <a:off x="3475576" y="4883510"/>
+              <a:ext cx="1312448" cy="341236"/>
             </a:xfrm>
             <a:prstGeom prst="rect">
               <a:avLst/>
             </a:prstGeom>
             <a:solidFill>
-              <a:schemeClr val="accent3">
-                <a:lumMod val="60000"/>
-                <a:lumOff val="40000"/>
-              </a:schemeClr>
+              <a:srgbClr val="33889F"/>
             </a:solidFill>
-            <a:ln>
-              <a:solidFill>
-                <a:schemeClr val="tx1"/>
-              </a:solidFill>
-            </a:ln>
+            <a:ln/>
           </p:spPr>
           <p:style>
-            <a:lnRef idx="2">
-              <a:schemeClr val="accent1">
-                <a:shade val="50000"/>
-              </a:schemeClr>
+            <a:lnRef idx="3">
+              <a:schemeClr val="lt1"/>
             </a:lnRef>
             <a:fillRef idx="1">
-              <a:schemeClr val="accent1"/>
+              <a:schemeClr val="accent5"/>
             </a:fillRef>
-            <a:effectRef idx="0">
-              <a:schemeClr val="accent1"/>
+            <a:effectRef idx="1">
+              <a:schemeClr val="accent5"/>
             </a:effectRef>
             <a:fontRef idx="minor">
               <a:schemeClr val="lt1"/>
@@ -7760,186 +7947,46 @@
               <a:r>
                 <a:rPr lang="en-CA" sz="1200" b="1" dirty="0" smtClean="0">
                   <a:solidFill>
-                    <a:schemeClr val="tx1"/>
+                    <a:schemeClr val="bg1"/>
                   </a:solidFill>
                 </a:rPr>
-                <a:t>Custom phantoms</a:t>
+                <a:t>Device </a:t>
+              </a:r>
+              <a:r>
+                <a:rPr lang="en-CA" sz="1200" b="1" dirty="0" smtClean="0">
+                  <a:solidFill>
+                    <a:schemeClr val="bg1"/>
+                  </a:solidFill>
+                </a:rPr>
+                <a:t>interface</a:t>
               </a:r>
               <a:endParaRPr lang="en-CA" sz="1200" b="1" dirty="0">
                 <a:solidFill>
-                  <a:schemeClr val="tx1"/>
+                  <a:schemeClr val="bg1"/>
                 </a:solidFill>
               </a:endParaRPr>
             </a:p>
           </p:txBody>
         </p:sp>
-        <p:cxnSp>
-          <p:nvCxnSpPr>
-            <p:cNvPr id="61" name="Straight Connector 60"/>
-            <p:cNvCxnSpPr>
-              <a:stCxn id="60" idx="0"/>
-              <a:endCxn id="9" idx="2"/>
-            </p:cNvCxnSpPr>
-            <p:nvPr/>
-          </p:nvCxnSpPr>
-          <p:spPr>
-            <a:xfrm flipH="1" flipV="1">
-              <a:off x="3257675" y="5949280"/>
-              <a:ext cx="2328635" cy="360040"/>
-            </a:xfrm>
-            <a:prstGeom prst="line">
-              <a:avLst/>
-            </a:prstGeom>
-            <a:ln w="38100">
-              <a:solidFill>
-                <a:schemeClr val="tx1"/>
-              </a:solidFill>
-              <a:prstDash val="solid"/>
-            </a:ln>
-          </p:spPr>
-          <p:style>
-            <a:lnRef idx="1">
-              <a:schemeClr val="accent1"/>
-            </a:lnRef>
-            <a:fillRef idx="0">
-              <a:schemeClr val="accent1"/>
-            </a:fillRef>
-            <a:effectRef idx="0">
-              <a:schemeClr val="accent1"/>
-            </a:effectRef>
-            <a:fontRef idx="minor">
-              <a:schemeClr val="tx1"/>
-            </a:fontRef>
-          </p:style>
-        </p:cxnSp>
-        <p:cxnSp>
-          <p:nvCxnSpPr>
-            <p:cNvPr id="63" name="Straight Connector 62"/>
-            <p:cNvCxnSpPr>
-              <a:stCxn id="60" idx="0"/>
-              <a:endCxn id="55" idx="2"/>
-            </p:cNvCxnSpPr>
-            <p:nvPr/>
-          </p:nvCxnSpPr>
-          <p:spPr>
-            <a:xfrm flipV="1">
-              <a:off x="5586310" y="5949280"/>
-              <a:ext cx="1082436" cy="360040"/>
-            </a:xfrm>
-            <a:prstGeom prst="line">
-              <a:avLst/>
-            </a:prstGeom>
-            <a:ln w="38100">
-              <a:solidFill>
-                <a:schemeClr val="tx1"/>
-              </a:solidFill>
-              <a:prstDash val="solid"/>
-            </a:ln>
-          </p:spPr>
-          <p:style>
-            <a:lnRef idx="1">
-              <a:schemeClr val="accent1"/>
-            </a:lnRef>
-            <a:fillRef idx="0">
-              <a:schemeClr val="accent1"/>
-            </a:fillRef>
-            <a:effectRef idx="0">
-              <a:schemeClr val="accent1"/>
-            </a:effectRef>
-            <a:fontRef idx="minor">
-              <a:schemeClr val="tx1"/>
-            </a:fontRef>
-          </p:style>
-        </p:cxnSp>
-        <p:cxnSp>
-          <p:nvCxnSpPr>
-            <p:cNvPr id="64" name="Straight Connector 63"/>
-            <p:cNvCxnSpPr>
-              <a:stCxn id="60" idx="0"/>
-              <a:endCxn id="11" idx="2"/>
-            </p:cNvCxnSpPr>
-            <p:nvPr/>
-          </p:nvCxnSpPr>
-          <p:spPr>
-            <a:xfrm flipH="1" flipV="1">
-              <a:off x="5093496" y="5949280"/>
-              <a:ext cx="492814" cy="360040"/>
-            </a:xfrm>
-            <a:prstGeom prst="line">
-              <a:avLst/>
-            </a:prstGeom>
-            <a:ln w="38100">
-              <a:solidFill>
-                <a:schemeClr val="tx1"/>
-              </a:solidFill>
-              <a:prstDash val="solid"/>
-            </a:ln>
-          </p:spPr>
-          <p:style>
-            <a:lnRef idx="1">
-              <a:schemeClr val="accent1"/>
-            </a:lnRef>
-            <a:fillRef idx="0">
-              <a:schemeClr val="accent1"/>
-            </a:fillRef>
-            <a:effectRef idx="0">
-              <a:schemeClr val="accent1"/>
-            </a:effectRef>
-            <a:fontRef idx="minor">
-              <a:schemeClr val="tx1"/>
-            </a:fontRef>
-          </p:style>
-        </p:cxnSp>
-        <p:cxnSp>
-          <p:nvCxnSpPr>
-            <p:cNvPr id="65" name="Straight Connector 64"/>
-            <p:cNvCxnSpPr>
-              <a:stCxn id="57" idx="2"/>
-              <a:endCxn id="60" idx="0"/>
-            </p:cNvCxnSpPr>
-            <p:nvPr/>
-          </p:nvCxnSpPr>
-          <p:spPr>
-            <a:xfrm flipH="1">
-              <a:off x="5586310" y="5949280"/>
-              <a:ext cx="2581470" cy="360040"/>
-            </a:xfrm>
-            <a:prstGeom prst="line">
-              <a:avLst/>
-            </a:prstGeom>
-            <a:ln w="38100">
-              <a:solidFill>
-                <a:schemeClr val="tx1"/>
-              </a:solidFill>
-              <a:prstDash val="solid"/>
-            </a:ln>
-          </p:spPr>
-          <p:style>
-            <a:lnRef idx="1">
-              <a:schemeClr val="accent1"/>
-            </a:lnRef>
-            <a:fillRef idx="0">
-              <a:schemeClr val="accent1"/>
-            </a:fillRef>
-            <a:effectRef idx="0">
-              <a:schemeClr val="accent1"/>
-            </a:effectRef>
-            <a:fontRef idx="minor">
-              <a:schemeClr val="tx1"/>
-            </a:fontRef>
-          </p:style>
-        </p:cxnSp>
       </p:grpSp>
     </p:spTree>
     <p:extLst>
       <p:ext uri="{BB962C8B-B14F-4D97-AF65-F5344CB8AC3E}">
-        <p14:creationId xmlns:p14="http://schemas.microsoft.com/office/powerpoint/2010/main" val="2540664509"/>
+        <p14:creationId xmlns:p14="http://schemas.microsoft.com/office/powerpoint/2010/main" val="874480236"/>
       </p:ext>
     </p:extLst>
   </p:cSld>
   <p:clrMapOvr>
     <a:masterClrMapping/>
   </p:clrMapOvr>
+  <mc:AlternateContent xmlns:mc="http://schemas.openxmlformats.org/markup-compatibility/2006" xmlns:p14="http://schemas.microsoft.com/office/powerpoint/2010/main">
+    <mc:Choice Requires="p14">
+      <p:transition spd="slow" p14:dur="2000" advTm="3263"/>
+    </mc:Choice>
+    <mc:Fallback xmlns="">
+      <p:transition spd="slow" advTm="3263"/>
+    </mc:Fallback>
+  </mc:AlternateContent>
   <p:timing>
     <p:tnLst>
       <p:par>
@@ -10336,13 +10383,8 @@
           <a:p>
             <a:r>
               <a:rPr lang="en-US" dirty="0" smtClean="0"/>
-              <a:t>Data </a:t>
-            </a:r>
-            <a:r>
-              <a:rPr lang="en-US" dirty="0" smtClean="0"/>
-              <a:t>acquisition - tracking</a:t>
-            </a:r>
-            <a:endParaRPr lang="en-US" dirty="0" smtClean="0"/>
+              <a:t>Data acquisition - tracking</a:t>
+            </a:r>
           </a:p>
         </p:txBody>
       </p:sp>
@@ -10801,11 +10843,7 @@
             </a:pPr>
             <a:r>
               <a:rPr lang="en-US" dirty="0" smtClean="0"/>
-              <a:t>Ascension </a:t>
-            </a:r>
-            <a:r>
-              <a:rPr lang="en-US" dirty="0" smtClean="0"/>
-              <a:t>EM tracker</a:t>
+              <a:t>Ascension EM tracker</a:t>
             </a:r>
           </a:p>
           <a:p>
@@ -10833,20 +10871,12 @@
               <a:rPr lang="en-US" dirty="0" smtClean="0"/>
               <a:t> </a:t>
             </a:r>
-            <a:r>
-              <a:rPr lang="en-US" dirty="0" smtClean="0"/>
-              <a:t/>
-            </a:r>
             <a:br>
               <a:rPr lang="en-US" dirty="0" smtClean="0"/>
             </a:br>
             <a:r>
               <a:rPr lang="en-US" dirty="0" smtClean="0"/>
-              <a:t>optical and electromagnetic </a:t>
-            </a:r>
-            <a:r>
-              <a:rPr lang="en-US" dirty="0" smtClean="0"/>
-              <a:t>trackers</a:t>
+              <a:t>optical and electromagnetic trackers</a:t>
             </a:r>
           </a:p>
           <a:p>
@@ -10908,20 +10938,12 @@
               <a:rPr lang="en-US" dirty="0" smtClean="0"/>
               <a:t>, </a:t>
             </a:r>
-            <a:r>
-              <a:rPr lang="en-US" dirty="0" smtClean="0"/>
-              <a:t/>
-            </a:r>
             <a:br>
               <a:rPr lang="en-US" dirty="0" smtClean="0"/>
             </a:br>
             <a:r>
               <a:rPr lang="en-US" dirty="0" smtClean="0"/>
-              <a:t>Burdette </a:t>
-            </a:r>
-            <a:r>
-              <a:rPr lang="en-US" dirty="0" smtClean="0"/>
-              <a:t>Medical systems, CIVCO)</a:t>
+              <a:t>Burdette Medical systems, CIVCO)</a:t>
             </a:r>
           </a:p>
           <a:p>
@@ -11053,19 +11075,7 @@
             </a:pPr>
             <a:r>
               <a:rPr lang="en-US" dirty="0" smtClean="0"/>
-              <a:t>Software </a:t>
-            </a:r>
-            <a:r>
-              <a:rPr lang="en-US" dirty="0" smtClean="0"/>
-              <a:t>devices</a:t>
-            </a:r>
-            <a:r>
-              <a:rPr lang="en-US" dirty="0" smtClean="0"/>
-              <a:t>: </a:t>
-            </a:r>
-            <a:r>
-              <a:rPr lang="en-US" dirty="0" smtClean="0"/>
-              <a:t>file source, US simulator</a:t>
+              <a:t>Software devices: file source, US simulator</a:t>
             </a:r>
             <a:endParaRPr lang="en-US" dirty="0"/>
           </a:p>
@@ -11168,13 +11178,8 @@
           <a:p>
             <a:r>
               <a:rPr lang="en-US" dirty="0" smtClean="0"/>
-              <a:t>Data </a:t>
-            </a:r>
-            <a:r>
-              <a:rPr lang="en-US" dirty="0" smtClean="0"/>
-              <a:t>acquisition - imaging</a:t>
-            </a:r>
-            <a:endParaRPr lang="en-US" dirty="0" smtClean="0"/>
+              <a:t>Data acquisition - imaging</a:t>
+            </a:r>
           </a:p>
         </p:txBody>
       </p:sp>
@@ -11220,20 +11225,12 @@
               <a:rPr lang="en-US" sz="2400" dirty="0" smtClean="0"/>
               <a:t>: B-mode &amp; RF </a:t>
             </a:r>
-            <a:r>
-              <a:rPr lang="en-US" sz="2400" dirty="0" smtClean="0"/>
-              <a:t/>
-            </a:r>
             <a:br>
               <a:rPr lang="en-US" sz="2400" dirty="0" smtClean="0"/>
             </a:br>
             <a:r>
               <a:rPr lang="en-US" sz="2400" dirty="0" smtClean="0"/>
-              <a:t>(</a:t>
-            </a:r>
-            <a:r>
-              <a:rPr lang="en-US" sz="2400" dirty="0" smtClean="0"/>
-              <a:t>through research interface)</a:t>
+              <a:t>(through research interface)</a:t>
             </a:r>
           </a:p>
           <a:p>
@@ -11274,11 +11271,7 @@
             </a:br>
             <a:r>
               <a:rPr lang="en-US" sz="2400" dirty="0" smtClean="0"/>
-              <a:t>(</a:t>
-            </a:r>
-            <a:r>
-              <a:rPr lang="en-US" sz="2400" dirty="0" smtClean="0"/>
-              <a:t>through research interface)</a:t>
+              <a:t>(through research interface)</a:t>
             </a:r>
           </a:p>
           <a:p>
@@ -11350,11 +11343,7 @@
             </a:pPr>
             <a:r>
               <a:rPr lang="en-US" sz="2400" dirty="0" smtClean="0"/>
-              <a:t>Video for Windows </a:t>
-            </a:r>
-            <a:r>
-              <a:rPr lang="en-US" sz="2400" dirty="0" smtClean="0"/>
-              <a:t>devices</a:t>
+              <a:t>Video for Windows devices</a:t>
             </a:r>
           </a:p>
           <a:p>
@@ -11398,15 +11387,7 @@
             </a:pPr>
             <a:r>
               <a:rPr lang="en-US" sz="2400" dirty="0" smtClean="0"/>
-              <a:t>Other software devices:</a:t>
-            </a:r>
-            <a:r>
-              <a:rPr lang="en-US" sz="2400" dirty="0" smtClean="0"/>
-              <a:t> file </a:t>
-            </a:r>
-            <a:r>
-              <a:rPr lang="en-US" sz="2400" dirty="0" smtClean="0"/>
-              <a:t>source, US simulator</a:t>
+              <a:t>Other software devices: file source, US simulator</a:t>
             </a:r>
             <a:endParaRPr lang="en-US" sz="2400" dirty="0"/>
           </a:p>

</xml_diff>

<commit_message>
re #712 refinements to general overview
git-svn-id: https://subversion.assembla.com/svn/plus/trunk/doc@2739 c04e96f8-ac36-4ff2-8b34-4a5e34ef045f
</commit_message>
<xml_diff>
--- a/overview/PlusOverview.pptx
+++ b/overview/PlusOverview.pptx
@@ -27,7 +27,7 @@
     <p:sldId id="280" r:id="rId18"/>
     <p:sldId id="307" r:id="rId19"/>
     <p:sldId id="418" r:id="rId20"/>
-    <p:sldId id="419" r:id="rId21"/>
+    <p:sldId id="421" r:id="rId21"/>
     <p:sldId id="420" r:id="rId22"/>
     <p:sldId id="416" r:id="rId23"/>
   </p:sldIdLst>
@@ -625,7 +625,20 @@
           <a:bodyPr/>
           <a:lstStyle/>
           <a:p>
-            <a:endParaRPr lang="en-US" dirty="0"/>
+            <a:r>
+              <a:rPr lang="en-US" dirty="0" smtClean="0"/>
+              <a:t>This shows a layered approach</a:t>
+            </a:r>
+            <a:r>
+              <a:rPr lang="en-US" baseline="0" dirty="0" smtClean="0"/>
+              <a:t> to what depends on what</a:t>
+            </a:r>
+          </a:p>
+          <a:p>
+            <a:r>
+              <a:rPr lang="en-US" baseline="0" dirty="0" smtClean="0"/>
+              <a:t>SDK – software development kit, functions to interact with a specific piece of hardware</a:t>
+            </a:r>
           </a:p>
         </p:txBody>
       </p:sp>
@@ -10410,7 +10423,7 @@
         <p:spPr bwMode="auto">
           <a:xfrm>
             <a:off x="0" y="0"/>
-            <a:ext cx="7812359" cy="1035968"/>
+            <a:ext cx="9144000" cy="1035968"/>
           </a:xfrm>
           <a:prstGeom prst="rect">
             <a:avLst/>
@@ -10566,15 +10579,7 @@
                   <a:srgbClr val="800000"/>
                 </a:solidFill>
               </a:rPr>
-              <a:t>PLUS </a:t>
-            </a:r>
-            <a:r>
-              <a:rPr lang="en-CA" b="1" dirty="0" smtClean="0">
-                <a:solidFill>
-                  <a:srgbClr val="800000"/>
-                </a:solidFill>
-              </a:rPr>
-              <a:t>Architecture Overview</a:t>
+              <a:t>PLUS Architecture Overview</a:t>
             </a:r>
             <a:endParaRPr lang="en-CA" b="1" dirty="0">
               <a:solidFill>
@@ -10655,10 +10660,10 @@
         </p:nvGrpSpPr>
         <p:grpSpPr>
           <a:xfrm>
-            <a:off x="413610" y="1088491"/>
-            <a:ext cx="8308503" cy="4618425"/>
-            <a:chOff x="449201" y="774077"/>
-            <a:chExt cx="8308503" cy="5175203"/>
+            <a:off x="1115616" y="1035969"/>
+            <a:ext cx="5437017" cy="4913311"/>
+            <a:chOff x="1151207" y="443641"/>
+            <a:chExt cx="5437017" cy="5505639"/>
           </a:xfrm>
         </p:grpSpPr>
         <p:sp>
@@ -10669,8 +10674,8 @@
           </p:nvSpPr>
           <p:spPr>
             <a:xfrm>
-              <a:off x="2375343" y="774077"/>
-              <a:ext cx="4212881" cy="4437413"/>
+              <a:off x="2375343" y="443641"/>
+              <a:ext cx="4212881" cy="4767851"/>
             </a:xfrm>
             <a:prstGeom prst="rect">
               <a:avLst/>
@@ -10702,103 +10707,14 @@
         </p:sp>
         <p:sp>
           <p:nvSpPr>
-            <p:cNvPr id="71" name="TextBox 70"/>
-            <p:cNvSpPr txBox="1"/>
-            <p:nvPr/>
-          </p:nvSpPr>
-          <p:spPr>
-            <a:xfrm>
-              <a:off x="449201" y="5445547"/>
-              <a:ext cx="867545" cy="276999"/>
-            </a:xfrm>
-            <a:prstGeom prst="rect">
-              <a:avLst/>
-            </a:prstGeom>
-            <a:noFill/>
-          </p:spPr>
-          <p:txBody>
-            <a:bodyPr wrap="none" rtlCol="0">
-              <a:spAutoFit/>
-            </a:bodyPr>
-            <a:lstStyle/>
-            <a:p>
-              <a:r>
-                <a:rPr lang="en-CA" sz="1200" b="1" dirty="0" smtClean="0"/>
-                <a:t>hardware</a:t>
-              </a:r>
-              <a:endParaRPr lang="en-CA" sz="1200" b="1" dirty="0"/>
-            </a:p>
-          </p:txBody>
-        </p:sp>
-        <p:sp>
-          <p:nvSpPr>
             <p:cNvPr id="74" name="Rectangle 73"/>
             <p:cNvSpPr/>
             <p:nvPr/>
           </p:nvSpPr>
           <p:spPr>
             <a:xfrm>
-              <a:off x="2582622" y="5631474"/>
-              <a:ext cx="1664929" cy="317806"/>
-            </a:xfrm>
-            <a:prstGeom prst="rect">
-              <a:avLst/>
-            </a:prstGeom>
-            <a:ln/>
-          </p:spPr>
-          <p:style>
-            <a:lnRef idx="3">
-              <a:schemeClr val="lt1"/>
-            </a:lnRef>
-            <a:fillRef idx="1">
-              <a:schemeClr val="accent3"/>
-            </a:fillRef>
-            <a:effectRef idx="1">
-              <a:schemeClr val="accent3"/>
-            </a:effectRef>
-            <a:fontRef idx="minor">
-              <a:schemeClr val="lt1"/>
-            </a:fontRef>
-          </p:style>
-          <p:txBody>
-            <a:bodyPr rtlCol="0" anchor="ctr"/>
-            <a:lstStyle/>
-            <a:p>
-              <a:pPr algn="ctr"/>
-              <a:r>
-                <a:rPr lang="en-CA" sz="1200" b="1" dirty="0">
-                  <a:solidFill>
-                    <a:schemeClr val="bg1"/>
-                  </a:solidFill>
-                </a:rPr>
-                <a:t>Ultrasound </a:t>
-              </a:r>
-              <a:r>
-                <a:rPr lang="en-CA" sz="1200" b="1" dirty="0" smtClean="0">
-                  <a:solidFill>
-                    <a:schemeClr val="bg1"/>
-                  </a:solidFill>
-                </a:rPr>
-                <a:t>scanner</a:t>
-              </a:r>
-              <a:endParaRPr lang="en-CA" sz="1200" b="1" dirty="0">
-                <a:solidFill>
-                  <a:schemeClr val="bg1"/>
-                </a:solidFill>
-              </a:endParaRPr>
-            </a:p>
-          </p:txBody>
-        </p:sp>
-        <p:sp>
-          <p:nvSpPr>
-            <p:cNvPr id="76" name="Rectangle 75"/>
-            <p:cNvSpPr/>
-            <p:nvPr/>
-          </p:nvSpPr>
-          <p:spPr>
-            <a:xfrm>
-              <a:off x="4635504" y="5634293"/>
-              <a:ext cx="1700279" cy="314987"/>
+              <a:off x="3848117" y="5631474"/>
+              <a:ext cx="1224136" cy="317806"/>
             </a:xfrm>
             <a:prstGeom prst="rect">
               <a:avLst/>
@@ -10830,94 +10746,11 @@
                     <a:schemeClr val="bg1"/>
                   </a:solidFill>
                 </a:rPr>
-                <a:t>Navigation system</a:t>
+                <a:t>Hardware</a:t>
               </a:r>
-              <a:endParaRPr lang="en-CA" sz="1200" b="1" dirty="0">
-                <a:solidFill>
-                  <a:schemeClr val="bg1"/>
-                </a:solidFill>
-              </a:endParaRPr>
             </a:p>
           </p:txBody>
         </p:sp>
-        <p:cxnSp>
-          <p:nvCxnSpPr>
-            <p:cNvPr id="77" name="Straight Connector 76"/>
-            <p:cNvCxnSpPr>
-              <a:stCxn id="72" idx="2"/>
-              <a:endCxn id="74" idx="0"/>
-            </p:cNvCxnSpPr>
-            <p:nvPr/>
-          </p:nvCxnSpPr>
-          <p:spPr>
-            <a:xfrm flipH="1">
-              <a:off x="3415087" y="4948319"/>
-              <a:ext cx="1040336" cy="683155"/>
-            </a:xfrm>
-            <a:prstGeom prst="line">
-              <a:avLst/>
-            </a:prstGeom>
-            <a:ln w="31750">
-              <a:solidFill>
-                <a:schemeClr val="tx1"/>
-              </a:solidFill>
-              <a:prstDash val="solid"/>
-            </a:ln>
-          </p:spPr>
-          <p:style>
-            <a:lnRef idx="1">
-              <a:schemeClr val="accent1"/>
-            </a:lnRef>
-            <a:fillRef idx="0">
-              <a:schemeClr val="accent1"/>
-            </a:fillRef>
-            <a:effectRef idx="0">
-              <a:schemeClr val="accent1"/>
-            </a:effectRef>
-            <a:fontRef idx="minor">
-              <a:schemeClr val="tx1"/>
-            </a:fontRef>
-          </p:style>
-        </p:cxnSp>
-        <p:cxnSp>
-          <p:nvCxnSpPr>
-            <p:cNvPr id="78" name="Straight Connector 77"/>
-            <p:cNvCxnSpPr>
-              <a:stCxn id="72" idx="2"/>
-              <a:endCxn id="76" idx="0"/>
-            </p:cNvCxnSpPr>
-            <p:nvPr/>
-          </p:nvCxnSpPr>
-          <p:spPr>
-            <a:xfrm>
-              <a:off x="4455423" y="4948319"/>
-              <a:ext cx="1030221" cy="685974"/>
-            </a:xfrm>
-            <a:prstGeom prst="line">
-              <a:avLst/>
-            </a:prstGeom>
-            <a:ln w="31750">
-              <a:solidFill>
-                <a:schemeClr val="tx1"/>
-              </a:solidFill>
-              <a:prstDash val="solid"/>
-            </a:ln>
-          </p:spPr>
-          <p:style>
-            <a:lnRef idx="1">
-              <a:schemeClr val="accent1"/>
-            </a:lnRef>
-            <a:fillRef idx="0">
-              <a:schemeClr val="accent1"/>
-            </a:fillRef>
-            <a:effectRef idx="0">
-              <a:schemeClr val="accent1"/>
-            </a:effectRef>
-            <a:fontRef idx="minor">
-              <a:schemeClr val="tx1"/>
-            </a:fontRef>
-          </p:style>
-        </p:cxnSp>
         <p:sp>
           <p:nvSpPr>
             <p:cNvPr id="87" name="Rectangle 86"/>
@@ -10926,8 +10759,8 @@
           </p:nvSpPr>
           <p:spPr>
             <a:xfrm>
-              <a:off x="2735382" y="895388"/>
-              <a:ext cx="1584177" cy="390138"/>
+              <a:off x="2735382" y="1414491"/>
+              <a:ext cx="1584177" cy="258274"/>
             </a:xfrm>
             <a:prstGeom prst="rect">
               <a:avLst/>
@@ -11005,20 +10838,26 @@
         </p:sp>
         <p:cxnSp>
           <p:nvCxnSpPr>
-            <p:cNvPr id="94" name="Straight Connector 93"/>
-            <p:cNvCxnSpPr/>
+            <p:cNvPr id="77" name="Straight Connector 76"/>
+            <p:cNvCxnSpPr>
+              <a:stCxn id="40" idx="2"/>
+              <a:endCxn id="74" idx="0"/>
+            </p:cNvCxnSpPr>
             <p:nvPr/>
           </p:nvCxnSpPr>
           <p:spPr>
             <a:xfrm>
-              <a:off x="545629" y="5494661"/>
-              <a:ext cx="8212075" cy="0"/>
+              <a:off x="4460185" y="4981012"/>
+              <a:ext cx="0" cy="650461"/>
             </a:xfrm>
             <a:prstGeom prst="line">
               <a:avLst/>
             </a:prstGeom>
-            <a:ln w="28575">
-              <a:prstDash val="lgDash"/>
+            <a:ln w="31750">
+              <a:solidFill>
+                <a:schemeClr val="tx1"/>
+              </a:solidFill>
+              <a:prstDash val="solid"/>
             </a:ln>
           </p:spPr>
           <p:style>
@@ -11036,90 +10875,6 @@
             </a:fontRef>
           </p:style>
         </p:cxnSp>
-        <p:sp>
-          <p:nvSpPr>
-            <p:cNvPr id="95" name="TextBox 94"/>
-            <p:cNvSpPr txBox="1"/>
-            <p:nvPr/>
-          </p:nvSpPr>
-          <p:spPr>
-            <a:xfrm>
-              <a:off x="476784" y="5211491"/>
-              <a:ext cx="816249" cy="276999"/>
-            </a:xfrm>
-            <a:prstGeom prst="rect">
-              <a:avLst/>
-            </a:prstGeom>
-            <a:noFill/>
-          </p:spPr>
-          <p:txBody>
-            <a:bodyPr wrap="none" rtlCol="0">
-              <a:spAutoFit/>
-            </a:bodyPr>
-            <a:lstStyle/>
-            <a:p>
-              <a:r>
-                <a:rPr lang="en-CA" sz="1200" b="1" dirty="0" smtClean="0"/>
-                <a:t>software</a:t>
-              </a:r>
-              <a:endParaRPr lang="en-CA" sz="1200" b="1" dirty="0"/>
-            </a:p>
-          </p:txBody>
-        </p:sp>
-        <p:sp>
-          <p:nvSpPr>
-            <p:cNvPr id="72" name="Rectangle 71"/>
-            <p:cNvSpPr/>
-            <p:nvPr/>
-          </p:nvSpPr>
-          <p:spPr>
-            <a:xfrm>
-              <a:off x="3799199" y="4607083"/>
-              <a:ext cx="1312448" cy="341236"/>
-            </a:xfrm>
-            <a:prstGeom prst="rect">
-              <a:avLst/>
-            </a:prstGeom>
-            <a:solidFill>
-              <a:srgbClr val="33889F"/>
-            </a:solidFill>
-            <a:ln/>
-          </p:spPr>
-          <p:style>
-            <a:lnRef idx="3">
-              <a:schemeClr val="lt1"/>
-            </a:lnRef>
-            <a:fillRef idx="1">
-              <a:schemeClr val="accent5"/>
-            </a:fillRef>
-            <a:effectRef idx="1">
-              <a:schemeClr val="accent5"/>
-            </a:effectRef>
-            <a:fontRef idx="minor">
-              <a:schemeClr val="lt1"/>
-            </a:fontRef>
-          </p:style>
-          <p:txBody>
-            <a:bodyPr rtlCol="0" anchor="ctr"/>
-            <a:lstStyle/>
-            <a:p>
-              <a:pPr algn="ctr"/>
-              <a:r>
-                <a:rPr lang="en-CA" sz="1200" b="1" dirty="0" smtClean="0">
-                  <a:solidFill>
-                    <a:schemeClr val="bg1"/>
-                  </a:solidFill>
-                </a:rPr>
-                <a:t>Interface</a:t>
-              </a:r>
-              <a:endParaRPr lang="en-CA" sz="1200" b="1" dirty="0">
-                <a:solidFill>
-                  <a:schemeClr val="bg1"/>
-                </a:solidFill>
-              </a:endParaRPr>
-            </a:p>
-          </p:txBody>
-        </p:sp>
       </p:grpSp>
       <p:sp>
         <p:nvSpPr>
@@ -11129,7 +10884,7 @@
         </p:nvSpPr>
         <p:spPr>
           <a:xfrm>
-            <a:off x="971600" y="1783849"/>
+            <a:off x="971600" y="2287905"/>
             <a:ext cx="886909" cy="276999"/>
           </a:xfrm>
           <a:prstGeom prst="rect">
@@ -11159,8 +10914,8 @@
         </p:nvSpPr>
         <p:spPr>
           <a:xfrm>
-            <a:off x="4427984" y="1196751"/>
-            <a:ext cx="1656184" cy="348165"/>
+            <a:off x="4427984" y="1916832"/>
+            <a:ext cx="1656184" cy="226389"/>
           </a:xfrm>
           <a:prstGeom prst="rect">
             <a:avLst/>
@@ -11213,8 +10968,8 @@
         </p:nvSpPr>
         <p:spPr>
           <a:xfrm>
-            <a:off x="4427984" y="1683886"/>
-            <a:ext cx="1656184" cy="376962"/>
+            <a:off x="4427984" y="2215896"/>
+            <a:ext cx="1656184" cy="277000"/>
           </a:xfrm>
           <a:prstGeom prst="rect">
             <a:avLst/>
@@ -11267,8 +11022,8 @@
         </p:nvSpPr>
         <p:spPr>
           <a:xfrm>
-            <a:off x="2699792" y="1700378"/>
-            <a:ext cx="1584177" cy="360470"/>
+            <a:off x="2699792" y="2215897"/>
+            <a:ext cx="1584177" cy="276999"/>
           </a:xfrm>
           <a:prstGeom prst="rect">
             <a:avLst/>
@@ -11321,8 +11076,8 @@
         </p:nvSpPr>
         <p:spPr>
           <a:xfrm>
-            <a:off x="2699791" y="2188372"/>
-            <a:ext cx="1584177" cy="376532"/>
+            <a:off x="2699791" y="2564903"/>
+            <a:ext cx="1584177" cy="238265"/>
           </a:xfrm>
           <a:prstGeom prst="rect">
             <a:avLst/>
@@ -11375,7 +11130,7 @@
         </p:nvCxnSpPr>
         <p:spPr>
           <a:xfrm>
-            <a:off x="536389" y="2708920"/>
+            <a:off x="536389" y="2947185"/>
             <a:ext cx="8212075" cy="0"/>
           </a:xfrm>
           <a:prstGeom prst="line">
@@ -11408,7 +11163,7 @@
         </p:nvSpPr>
         <p:spPr>
           <a:xfrm>
-            <a:off x="1187624" y="2852936"/>
+            <a:off x="1187624" y="3091201"/>
             <a:ext cx="483146" cy="276999"/>
           </a:xfrm>
           <a:prstGeom prst="rect">
@@ -11438,7 +11193,7 @@
         </p:nvSpPr>
         <p:spPr>
           <a:xfrm>
-            <a:off x="3635894" y="2780928"/>
+            <a:off x="3635894" y="3019193"/>
             <a:ext cx="1584177" cy="376532"/>
           </a:xfrm>
           <a:prstGeom prst="rect">
@@ -11492,7 +11247,7 @@
         </p:nvCxnSpPr>
         <p:spPr>
           <a:xfrm>
-            <a:off x="539552" y="3284984"/>
+            <a:off x="539552" y="3523249"/>
             <a:ext cx="8212075" cy="0"/>
           </a:xfrm>
           <a:prstGeom prst="line">
@@ -11525,7 +11280,7 @@
         </p:nvSpPr>
         <p:spPr>
           <a:xfrm>
-            <a:off x="3786692" y="3501008"/>
+            <a:off x="3786692" y="3739273"/>
             <a:ext cx="1289363" cy="337799"/>
           </a:xfrm>
           <a:prstGeom prst="rect">
@@ -11574,7 +11329,7 @@
         </p:nvSpPr>
         <p:spPr>
           <a:xfrm>
-            <a:off x="3786692" y="4027305"/>
+            <a:off x="3786692" y="4243329"/>
             <a:ext cx="1289363" cy="308027"/>
           </a:xfrm>
           <a:prstGeom prst="rect">
@@ -11623,7 +11378,7 @@
         </p:nvSpPr>
         <p:spPr>
           <a:xfrm>
-            <a:off x="5142426" y="2238138"/>
+            <a:off x="5142426" y="2564904"/>
             <a:ext cx="293670" cy="276999"/>
           </a:xfrm>
           <a:prstGeom prst="rect">
@@ -11647,66 +11402,21 @@
       </p:sp>
       <p:sp>
         <p:nvSpPr>
-          <p:cNvPr id="38" name="Rectangle 37"/>
+          <p:cNvPr id="40" name="Rectangle 39"/>
           <p:cNvSpPr/>
           <p:nvPr/>
         </p:nvSpPr>
         <p:spPr>
           <a:xfrm>
-            <a:off x="7437496" y="199134"/>
-            <a:ext cx="1430920" cy="1362394"/>
+            <a:off x="3707904" y="4747385"/>
+            <a:ext cx="1433380" cy="337799"/>
           </a:xfrm>
           <a:prstGeom prst="rect">
             <a:avLst/>
           </a:prstGeom>
           <a:solidFill>
-            <a:schemeClr val="bg1"/>
+            <a:srgbClr val="33889F"/>
           </a:solidFill>
-          <a:ln>
-            <a:solidFill>
-              <a:srgbClr val="800000"/>
-            </a:solidFill>
-          </a:ln>
-        </p:spPr>
-        <p:style>
-          <a:lnRef idx="2">
-            <a:schemeClr val="accent1">
-              <a:shade val="50000"/>
-            </a:schemeClr>
-          </a:lnRef>
-          <a:fillRef idx="1">
-            <a:schemeClr val="accent1"/>
-          </a:fillRef>
-          <a:effectRef idx="0">
-            <a:schemeClr val="accent1"/>
-          </a:effectRef>
-          <a:fontRef idx="minor">
-            <a:schemeClr val="lt1"/>
-          </a:fontRef>
-        </p:style>
-        <p:txBody>
-          <a:bodyPr rtlCol="0" anchor="ctr"/>
-          <a:lstStyle/>
-          <a:p>
-            <a:pPr algn="ctr"/>
-            <a:endParaRPr lang="en-CA"/>
-          </a:p>
-        </p:txBody>
-      </p:sp>
-      <p:sp>
-        <p:nvSpPr>
-          <p:cNvPr id="39" name="Rectangle 38"/>
-          <p:cNvSpPr/>
-          <p:nvPr/>
-        </p:nvSpPr>
-        <p:spPr>
-          <a:xfrm>
-            <a:off x="7537154" y="257989"/>
-            <a:ext cx="1240058" cy="569114"/>
-          </a:xfrm>
-          <a:prstGeom prst="rect">
-            <a:avLst/>
-          </a:prstGeom>
           <a:ln/>
         </p:spPr>
         <p:style>
@@ -11728,20 +11438,65 @@
           <a:lstStyle/>
           <a:p>
             <a:pPr algn="ctr"/>
-            <a:endParaRPr lang="en-CA" sz="1200" i="1" dirty="0"/>
+            <a:r>
+              <a:rPr lang="en-CA" sz="1200" b="1" dirty="0" smtClean="0">
+                <a:solidFill>
+                  <a:schemeClr val="bg1"/>
+                </a:solidFill>
+              </a:rPr>
+              <a:t>Device Specific SDK</a:t>
+            </a:r>
+            <a:endParaRPr lang="en-CA" sz="1200" b="1" dirty="0" smtClean="0">
+              <a:solidFill>
+                <a:schemeClr val="bg1"/>
+              </a:solidFill>
+            </a:endParaRPr>
           </a:p>
         </p:txBody>
       </p:sp>
+      <p:cxnSp>
+        <p:nvCxnSpPr>
+          <p:cNvPr id="47" name="Straight Connector 46"/>
+          <p:cNvCxnSpPr/>
+          <p:nvPr/>
+        </p:nvCxnSpPr>
+        <p:spPr>
+          <a:xfrm>
+            <a:off x="539552" y="1772816"/>
+            <a:ext cx="8212075" cy="0"/>
+          </a:xfrm>
+          <a:prstGeom prst="line">
+            <a:avLst/>
+          </a:prstGeom>
+          <a:ln w="28575">
+            <a:prstDash val="lgDash"/>
+          </a:ln>
+        </p:spPr>
+        <p:style>
+          <a:lnRef idx="1">
+            <a:schemeClr val="accent1"/>
+          </a:lnRef>
+          <a:fillRef idx="0">
+            <a:schemeClr val="accent1"/>
+          </a:fillRef>
+          <a:effectRef idx="0">
+            <a:schemeClr val="accent1"/>
+          </a:effectRef>
+          <a:fontRef idx="minor">
+            <a:schemeClr val="tx1"/>
+          </a:fontRef>
+        </p:style>
+      </p:cxnSp>
       <p:sp>
         <p:nvSpPr>
-          <p:cNvPr id="40" name="TextBox 39"/>
+          <p:cNvPr id="50" name="TextBox 49"/>
           <p:cNvSpPr txBox="1"/>
           <p:nvPr/>
         </p:nvSpPr>
         <p:spPr>
           <a:xfrm>
-            <a:off x="7537153" y="313890"/>
-            <a:ext cx="1246902" cy="461665"/>
+            <a:off x="940473" y="1268760"/>
+            <a:ext cx="977447" cy="276999"/>
           </a:xfrm>
           <a:prstGeom prst="rect">
             <a:avLst/>
@@ -11749,89 +11504,37 @@
           <a:noFill/>
         </p:spPr>
         <p:txBody>
-          <a:bodyPr wrap="square" rtlCol="0">
+          <a:bodyPr wrap="none" rtlCol="0">
             <a:spAutoFit/>
           </a:bodyPr>
           <a:lstStyle/>
           <a:p>
-            <a:pPr algn="ctr"/>
-            <a:r>
-              <a:rPr lang="en-CA" sz="1200" b="1" i="1" dirty="0" smtClean="0">
-                <a:solidFill>
-                  <a:schemeClr val="bg1"/>
-                </a:solidFill>
-              </a:rPr>
-              <a:t>Developed in the </a:t>
-            </a:r>
-            <a:r>
-              <a:rPr lang="en-CA" sz="1200" b="1" i="1" dirty="0" err="1" smtClean="0">
-                <a:solidFill>
-                  <a:schemeClr val="bg1"/>
-                </a:solidFill>
-              </a:rPr>
-              <a:t>PerkLab</a:t>
-            </a:r>
-            <a:endParaRPr lang="en-CA" sz="1200" b="1" i="1" dirty="0">
-              <a:solidFill>
-                <a:schemeClr val="bg1"/>
-              </a:solidFill>
-            </a:endParaRPr>
+            <a:pPr algn="r"/>
+            <a:r>
+              <a:rPr lang="en-CA" sz="1200" b="1" dirty="0" smtClean="0"/>
+              <a:t>Applications</a:t>
+            </a:r>
+            <a:endParaRPr lang="en-CA" sz="1200" b="1" dirty="0" smtClean="0"/>
           </a:p>
         </p:txBody>
       </p:sp>
       <p:sp>
         <p:nvSpPr>
-          <p:cNvPr id="41" name="TextBox 40"/>
-          <p:cNvSpPr txBox="1"/>
-          <p:nvPr/>
-        </p:nvSpPr>
-        <p:spPr>
-          <a:xfrm>
-            <a:off x="7545192" y="956472"/>
-            <a:ext cx="1238863" cy="461665"/>
-          </a:xfrm>
-          <a:prstGeom prst="rect">
-            <a:avLst/>
-          </a:prstGeom>
-          <a:noFill/>
-        </p:spPr>
-        <p:txBody>
-          <a:bodyPr wrap="square" rtlCol="0">
-            <a:spAutoFit/>
-          </a:bodyPr>
-          <a:lstStyle/>
-          <a:p>
-            <a:pPr algn="ctr"/>
-            <a:r>
-              <a:rPr lang="en-CA" sz="1200" b="1" i="1" dirty="0" smtClean="0">
-                <a:solidFill>
-                  <a:schemeClr val="bg1"/>
-                </a:solidFill>
-              </a:rPr>
-              <a:t>Developed by collaborators</a:t>
-            </a:r>
-            <a:endParaRPr lang="en-CA" sz="1200" b="1" i="1" dirty="0">
-              <a:solidFill>
-                <a:schemeClr val="bg1"/>
-              </a:solidFill>
-            </a:endParaRPr>
-          </a:p>
-        </p:txBody>
-      </p:sp>
-      <p:sp>
-        <p:nvSpPr>
-          <p:cNvPr id="43" name="Rectangle 42"/>
+          <p:cNvPr id="51" name="Rectangle 50"/>
           <p:cNvSpPr/>
           <p:nvPr/>
         </p:nvSpPr>
         <p:spPr>
           <a:xfrm>
-            <a:off x="7537153" y="909536"/>
-            <a:ext cx="1246902" cy="569114"/>
+            <a:off x="2699793" y="1254297"/>
+            <a:ext cx="720080" cy="230487"/>
           </a:xfrm>
           <a:prstGeom prst="rect">
             <a:avLst/>
           </a:prstGeom>
+          <a:solidFill>
+            <a:srgbClr val="33889F"/>
+          </a:solidFill>
           <a:ln/>
         </p:spPr>
         <p:style>
@@ -11839,10 +11542,10 @@
             <a:schemeClr val="lt1"/>
           </a:lnRef>
           <a:fillRef idx="1">
-            <a:schemeClr val="accent3"/>
+            <a:schemeClr val="accent5"/>
           </a:fillRef>
           <a:effectRef idx="1">
-            <a:schemeClr val="accent3"/>
+            <a:schemeClr val="accent5"/>
           </a:effectRef>
           <a:fontRef idx="minor">
             <a:schemeClr val="lt1"/>
@@ -11853,7 +11556,15 @@
           <a:lstStyle/>
           <a:p>
             <a:pPr algn="ctr"/>
-            <a:endParaRPr lang="en-CA" sz="1200" dirty="0">
+            <a:r>
+              <a:rPr lang="en-CA" sz="1200" b="1" dirty="0" err="1" smtClean="0">
+                <a:solidFill>
+                  <a:schemeClr val="bg1"/>
+                </a:solidFill>
+              </a:rPr>
+              <a:t>fCal</a:t>
+            </a:r>
+            <a:endParaRPr lang="en-CA" sz="1200" b="1" dirty="0">
               <a:solidFill>
                 <a:schemeClr val="bg1"/>
               </a:solidFill>
@@ -11863,14 +11574,122 @@
       </p:sp>
       <p:sp>
         <p:nvSpPr>
-          <p:cNvPr id="42" name="TextBox 41"/>
+          <p:cNvPr id="52" name="Rectangle 51"/>
+          <p:cNvSpPr/>
+          <p:nvPr/>
+        </p:nvSpPr>
+        <p:spPr>
+          <a:xfrm>
+            <a:off x="3563887" y="1254298"/>
+            <a:ext cx="867485" cy="230486"/>
+          </a:xfrm>
+          <a:prstGeom prst="rect">
+            <a:avLst/>
+          </a:prstGeom>
+          <a:solidFill>
+            <a:srgbClr val="33889F"/>
+          </a:solidFill>
+          <a:ln/>
+        </p:spPr>
+        <p:style>
+          <a:lnRef idx="3">
+            <a:schemeClr val="lt1"/>
+          </a:lnRef>
+          <a:fillRef idx="1">
+            <a:schemeClr val="accent5"/>
+          </a:fillRef>
+          <a:effectRef idx="1">
+            <a:schemeClr val="accent5"/>
+          </a:effectRef>
+          <a:fontRef idx="minor">
+            <a:schemeClr val="lt1"/>
+          </a:fontRef>
+        </p:style>
+        <p:txBody>
+          <a:bodyPr rtlCol="0" anchor="ctr"/>
+          <a:lstStyle/>
+          <a:p>
+            <a:pPr algn="ctr"/>
+            <a:r>
+              <a:rPr lang="en-CA" sz="1200" b="1" dirty="0" err="1" smtClean="0">
+                <a:solidFill>
+                  <a:schemeClr val="bg1"/>
+                </a:solidFill>
+              </a:rPr>
+              <a:t>PlusServer</a:t>
+            </a:r>
+            <a:endParaRPr lang="en-CA" sz="1200" b="1" dirty="0">
+              <a:solidFill>
+                <a:schemeClr val="bg1"/>
+              </a:solidFill>
+            </a:endParaRPr>
+          </a:p>
+        </p:txBody>
+      </p:sp>
+      <p:sp>
+        <p:nvSpPr>
+          <p:cNvPr id="53" name="Rectangle 52"/>
+          <p:cNvSpPr/>
+          <p:nvPr/>
+        </p:nvSpPr>
+        <p:spPr>
+          <a:xfrm>
+            <a:off x="4568611" y="1254297"/>
+            <a:ext cx="573815" cy="230487"/>
+          </a:xfrm>
+          <a:prstGeom prst="rect">
+            <a:avLst/>
+          </a:prstGeom>
+          <a:solidFill>
+            <a:srgbClr val="33889F"/>
+          </a:solidFill>
+          <a:ln/>
+        </p:spPr>
+        <p:style>
+          <a:lnRef idx="3">
+            <a:schemeClr val="lt1"/>
+          </a:lnRef>
+          <a:fillRef idx="1">
+            <a:schemeClr val="accent5"/>
+          </a:fillRef>
+          <a:effectRef idx="1">
+            <a:schemeClr val="accent5"/>
+          </a:effectRef>
+          <a:fontRef idx="minor">
+            <a:schemeClr val="lt1"/>
+          </a:fontRef>
+        </p:style>
+        <p:txBody>
+          <a:bodyPr rtlCol="0" anchor="ctr"/>
+          <a:lstStyle/>
+          <a:p>
+            <a:pPr algn="ctr"/>
+            <a:r>
+              <a:rPr lang="en-CA" sz="1200" b="1" dirty="0" smtClean="0">
+                <a:solidFill>
+                  <a:schemeClr val="bg1"/>
+                </a:solidFill>
+              </a:rPr>
+              <a:t>iCal</a:t>
+            </a:r>
+            <a:endParaRPr lang="en-CA" sz="1200" b="1" dirty="0">
+              <a:solidFill>
+                <a:schemeClr val="bg1"/>
+              </a:solidFill>
+            </a:endParaRPr>
+          </a:p>
+        </p:txBody>
+      </p:sp>
+      <p:sp>
+        <p:nvSpPr>
+          <p:cNvPr id="54" name="TextBox 53"/>
           <p:cNvSpPr txBox="1"/>
           <p:nvPr/>
         </p:nvSpPr>
         <p:spPr>
           <a:xfrm>
-            <a:off x="7524328" y="951111"/>
-            <a:ext cx="1238863" cy="461665"/>
+            <a:off x="5574474" y="1279793"/>
+            <a:ext cx="293670" cy="276999"/>
           </a:xfrm>
           <a:prstGeom prst="rect">
             <a:avLst/>
@@ -11878,32 +11697,23 @@
           <a:noFill/>
         </p:spPr>
         <p:txBody>
-          <a:bodyPr wrap="square" rtlCol="0">
+          <a:bodyPr wrap="none" rtlCol="0">
             <a:spAutoFit/>
           </a:bodyPr>
           <a:lstStyle/>
           <a:p>
-            <a:pPr algn="ctr"/>
-            <a:r>
-              <a:rPr lang="en-CA" sz="1200" b="1" i="1" dirty="0" smtClean="0">
-                <a:solidFill>
-                  <a:schemeClr val="bg1"/>
-                </a:solidFill>
-              </a:rPr>
-              <a:t>Developed by collaborators</a:t>
-            </a:r>
-            <a:endParaRPr lang="en-CA" sz="1200" b="1" i="1" dirty="0">
-              <a:solidFill>
-                <a:schemeClr val="bg1"/>
-              </a:solidFill>
-            </a:endParaRPr>
+            <a:pPr algn="r"/>
+            <a:r>
+              <a:rPr lang="en-CA" sz="1200" b="1" dirty="0" smtClean="0"/>
+              <a:t>…</a:t>
+            </a:r>
           </a:p>
         </p:txBody>
       </p:sp>
     </p:spTree>
     <p:extLst>
       <p:ext uri="{BB962C8B-B14F-4D97-AF65-F5344CB8AC3E}">
-        <p14:creationId xmlns:p14="http://schemas.microsoft.com/office/powerpoint/2010/main" val="4088347736"/>
+        <p14:creationId xmlns:p14="http://schemas.microsoft.com/office/powerpoint/2010/main" val="723058536"/>
       </p:ext>
     </p:extLst>
   </p:cSld>

</xml_diff>

<commit_message>
re #712 added details to plusserver slide
git-svn-id: https://subversion.assembla.com/svn/plus/trunk/doc@2740 c04e96f8-ac36-4ff2-8b34-4a5e34ef045f
</commit_message>
<xml_diff>
--- a/overview/PlusOverview.pptx
+++ b/overview/PlusOverview.pptx
@@ -4321,9 +4321,57 @@
             </a:br>
             <a:r>
               <a:rPr lang="en-US" dirty="0" smtClean="0"/>
-              <a:t>(e.g., to 3D Slicer)</a:t>
-            </a:r>
-            <a:endParaRPr lang="en-US" sz="2800" dirty="0" smtClean="0"/>
+              <a:t>(e.g., to 3D Slicer</a:t>
+            </a:r>
+            <a:r>
+              <a:rPr lang="en-US" dirty="0" smtClean="0"/>
+              <a:t>)</a:t>
+            </a:r>
+          </a:p>
+          <a:p>
+            <a:pPr>
+              <a:spcBef>
+                <a:spcPts val="0"/>
+              </a:spcBef>
+              <a:spcAft>
+                <a:spcPts val="0"/>
+              </a:spcAft>
+              <a:defRPr/>
+            </a:pPr>
+            <a:r>
+              <a:rPr lang="en-US" dirty="0" smtClean="0"/>
+              <a:t>Remote control access</a:t>
+            </a:r>
+          </a:p>
+          <a:p>
+            <a:pPr lvl="1">
+              <a:spcBef>
+                <a:spcPts val="0"/>
+              </a:spcBef>
+              <a:spcAft>
+                <a:spcPts val="0"/>
+              </a:spcAft>
+              <a:defRPr/>
+            </a:pPr>
+            <a:r>
+              <a:rPr lang="en-US" dirty="0" smtClean="0"/>
+              <a:t>Control data recording</a:t>
+            </a:r>
+          </a:p>
+          <a:p>
+            <a:pPr lvl="1">
+              <a:spcBef>
+                <a:spcPts val="0"/>
+              </a:spcBef>
+              <a:spcAft>
+                <a:spcPts val="0"/>
+              </a:spcAft>
+              <a:defRPr/>
+            </a:pPr>
+            <a:r>
+              <a:rPr lang="en-US" dirty="0" smtClean="0"/>
+              <a:t>Request volume reconstruction</a:t>
+            </a:r>
           </a:p>
         </p:txBody>
       </p:sp>
@@ -4344,8 +4392,8 @@
         </p:blipFill>
         <p:spPr bwMode="auto">
           <a:xfrm>
-            <a:off x="3491880" y="2563633"/>
-            <a:ext cx="5328592" cy="3745687"/>
+            <a:off x="4932040" y="2632041"/>
+            <a:ext cx="4104456" cy="2885191"/>
           </a:xfrm>
           <a:prstGeom prst="rect">
             <a:avLst/>
@@ -11446,11 +11494,6 @@
               </a:rPr>
               <a:t>Device Specific SDK</a:t>
             </a:r>
-            <a:endParaRPr lang="en-CA" sz="1200" b="1" dirty="0" smtClean="0">
-              <a:solidFill>
-                <a:schemeClr val="bg1"/>
-              </a:solidFill>
-            </a:endParaRPr>
           </a:p>
         </p:txBody>
       </p:sp>
@@ -11514,7 +11557,6 @@
               <a:rPr lang="en-CA" sz="1200" b="1" dirty="0" smtClean="0"/>
               <a:t>Applications</a:t>
             </a:r>
-            <a:endParaRPr lang="en-CA" sz="1200" b="1" dirty="0" smtClean="0"/>
           </a:p>
         </p:txBody>
       </p:sp>

</xml_diff>

<commit_message>
re #712 adjusting plus overview slide
git-svn-id: https://subversion.assembla.com/svn/plus/trunk/doc@2743 c04e96f8-ac36-4ff2-8b34-4a5e34ef045f
</commit_message>
<xml_diff>
--- a/overview/PlusOverview.pptx
+++ b/overview/PlusOverview.pptx
@@ -8102,7 +8102,7 @@
           </p:nvSpPr>
           <p:spPr>
             <a:xfrm>
-              <a:off x="2735382" y="1414491"/>
+              <a:off x="2519359" y="1414491"/>
               <a:ext cx="1584177" cy="258274"/>
             </a:xfrm>
             <a:prstGeom prst="rect">
@@ -8257,7 +8257,7 @@
         </p:nvSpPr>
         <p:spPr>
           <a:xfrm>
-            <a:off x="4427984" y="1916832"/>
+            <a:off x="4211961" y="1916832"/>
             <a:ext cx="1656184" cy="226389"/>
           </a:xfrm>
           <a:prstGeom prst="rect">
@@ -8311,7 +8311,7 @@
         </p:nvSpPr>
         <p:spPr>
           <a:xfrm>
-            <a:off x="4427984" y="2215896"/>
+            <a:off x="4211961" y="2215896"/>
             <a:ext cx="1656184" cy="277000"/>
           </a:xfrm>
           <a:prstGeom prst="rect">
@@ -8365,7 +8365,7 @@
         </p:nvSpPr>
         <p:spPr>
           <a:xfrm>
-            <a:off x="2699792" y="2215897"/>
+            <a:off x="2483769" y="2215897"/>
             <a:ext cx="1584177" cy="276999"/>
           </a:xfrm>
           <a:prstGeom prst="rect">
@@ -8419,7 +8419,7 @@
         </p:nvSpPr>
         <p:spPr>
           <a:xfrm>
-            <a:off x="2699791" y="2564903"/>
+            <a:off x="2483768" y="2564903"/>
             <a:ext cx="1584177" cy="238265"/>
           </a:xfrm>
           <a:prstGeom prst="rect">
@@ -8801,7 +8801,7 @@
         <p:spPr>
           <a:xfrm>
             <a:off x="539552" y="1772816"/>
-            <a:ext cx="8212075" cy="0"/>
+            <a:ext cx="5472608" cy="0"/>
           </a:xfrm>
           <a:prstGeom prst="line">
             <a:avLst/>
@@ -9047,6 +9047,39 @@
           </a:p>
         </p:txBody>
       </p:sp>
+      <p:cxnSp>
+        <p:nvCxnSpPr>
+          <p:cNvPr id="31" name="Straight Connector 30"/>
+          <p:cNvCxnSpPr/>
+          <p:nvPr/>
+        </p:nvCxnSpPr>
+        <p:spPr>
+          <a:xfrm flipV="1">
+            <a:off x="6012160" y="1772816"/>
+            <a:ext cx="0" cy="1174370"/>
+          </a:xfrm>
+          <a:prstGeom prst="line">
+            <a:avLst/>
+          </a:prstGeom>
+          <a:ln w="28575">
+            <a:prstDash val="lgDash"/>
+          </a:ln>
+        </p:spPr>
+        <p:style>
+          <a:lnRef idx="1">
+            <a:schemeClr val="accent1"/>
+          </a:lnRef>
+          <a:fillRef idx="0">
+            <a:schemeClr val="accent1"/>
+          </a:fillRef>
+          <a:effectRef idx="0">
+            <a:schemeClr val="accent1"/>
+          </a:effectRef>
+          <a:fontRef idx="minor">
+            <a:schemeClr val="tx1"/>
+          </a:fontRef>
+        </p:style>
+      </p:cxnSp>
     </p:spTree>
     <p:extLst>
       <p:ext uri="{BB962C8B-B14F-4D97-AF65-F5344CB8AC3E}">

</xml_diff>

<commit_message>
re #832: Updated Plus overview with Matlab interface details
git-svn-id: https://subversion.assembla.com/svn/plus/trunk/doc@3035 c04e96f8-ac36-4ff2-8b34-4a5e34ef045f
</commit_message>
<xml_diff>
--- a/overview/PlusOverview.pptx
+++ b/overview/PlusOverview.pptx
@@ -214,7 +214,7 @@
             <a:fld id="{A6E16264-6225-448A-8F6B-37C607BF693C}" type="datetimeFigureOut">
               <a:rPr lang="en-CA" smtClean="0"/>
               <a:pPr/>
-              <a:t>03/05/2013</a:t>
+              <a:t>2013-12-09</a:t>
             </a:fld>
             <a:endParaRPr lang="en-CA"/>
           </a:p>
@@ -956,7 +956,7 @@
             <a:fld id="{E843F943-FC4A-4610-812B-19459293E20B}" type="datetime1">
               <a:rPr lang="en-CA" smtClean="0"/>
               <a:pPr/>
-              <a:t>03/05/2013</a:t>
+              <a:t>2013-12-09</a:t>
             </a:fld>
             <a:endParaRPr lang="en-CA" dirty="0"/>
           </a:p>
@@ -1255,7 +1255,7 @@
             <a:fld id="{7EC20259-AFA4-42BB-B1F2-1723D3175E09}" type="datetime1">
               <a:rPr lang="en-CA" smtClean="0"/>
               <a:pPr/>
-              <a:t>03/05/2013</a:t>
+              <a:t>2013-12-09</a:t>
             </a:fld>
             <a:endParaRPr lang="en-CA"/>
           </a:p>
@@ -1459,7 +1459,7 @@
             <a:fld id="{7EC20259-AFA4-42BB-B1F2-1723D3175E09}" type="datetime1">
               <a:rPr lang="en-CA" smtClean="0"/>
               <a:pPr/>
-              <a:t>03/05/2013</a:t>
+              <a:t>2013-12-09</a:t>
             </a:fld>
             <a:endParaRPr lang="en-CA"/>
           </a:p>
@@ -1741,7 +1741,7 @@
             <a:fld id="{0B273A97-7724-4AE7-A6F1-5A1F5D1DB72A}" type="datetime1">
               <a:rPr lang="en-CA" smtClean="0"/>
               <a:pPr/>
-              <a:t>03/05/2013</a:t>
+              <a:t>2013-12-09</a:t>
             </a:fld>
             <a:endParaRPr lang="en-CA"/>
           </a:p>
@@ -4321,7 +4321,15 @@
             </a:br>
             <a:r>
               <a:rPr lang="en-US" dirty="0" smtClean="0"/>
-              <a:t>(e.g., to 3D Slicer)</a:t>
+              <a:t>(3D Slicer, </a:t>
+            </a:r>
+            <a:r>
+              <a:rPr lang="en-US" dirty="0" err="1" smtClean="0"/>
+              <a:t>Matlab</a:t>
+            </a:r>
+            <a:r>
+              <a:rPr lang="en-US" dirty="0" smtClean="0"/>
+              <a:t>, etc.)</a:t>
             </a:r>
           </a:p>
           <a:p>
@@ -4367,6 +4375,21 @@
             <a:r>
               <a:rPr lang="en-US" dirty="0" smtClean="0"/>
               <a:t>Request volume reconstruction</a:t>
+            </a:r>
+          </a:p>
+          <a:p>
+            <a:pPr lvl="1">
+              <a:spcBef>
+                <a:spcPts val="0"/>
+              </a:spcBef>
+              <a:spcAft>
+                <a:spcPts val="0"/>
+              </a:spcAft>
+              <a:defRPr/>
+            </a:pPr>
+            <a:r>
+              <a:rPr lang="en-US" dirty="0" smtClean="0"/>
+              <a:t>Update transforms</a:t>
             </a:r>
           </a:p>
         </p:txBody>
@@ -15015,8 +15038,38 @@
             </a:pPr>
             <a:r>
               <a:rPr lang="en-CA" sz="2400" dirty="0" smtClean="0"/>
-              <a:t>Used by all applications of Plus</a:t>
-            </a:r>
+              <a:t>Used by all applications of </a:t>
+            </a:r>
+            <a:r>
+              <a:rPr lang="en-CA" sz="2400" dirty="0" smtClean="0"/>
+              <a:t>Plus</a:t>
+            </a:r>
+          </a:p>
+          <a:p>
+            <a:pPr>
+              <a:lnSpc>
+                <a:spcPct val="120000"/>
+              </a:lnSpc>
+              <a:spcBef>
+                <a:spcPts val="0"/>
+              </a:spcBef>
+              <a:spcAft>
+                <a:spcPts val="0"/>
+              </a:spcAft>
+            </a:pPr>
+            <a:r>
+              <a:rPr lang="en-CA" sz="2400" dirty="0" err="1" smtClean="0"/>
+              <a:t>Matlab</a:t>
+            </a:r>
+            <a:r>
+              <a:rPr lang="en-CA" sz="2400" dirty="0" smtClean="0"/>
+              <a:t> reader/writers </a:t>
+            </a:r>
+            <a:r>
+              <a:rPr lang="en-CA" sz="2400" smtClean="0"/>
+              <a:t>are provided</a:t>
+            </a:r>
+            <a:endParaRPr lang="en-CA" sz="2400" dirty="0" smtClean="0"/>
           </a:p>
         </p:txBody>
       </p:sp>

</xml_diff>

<commit_message>
re #864: Added sample Interson configuration file to Plus overview doc
git-svn-id: https://subversion.assembla.com/svn/plus/trunk/doc@3181 c04e96f8-ac36-4ff2-8b34-4a5e34ef045f
</commit_message>
<xml_diff>
--- a/overview/PlusOverview.pptx
+++ b/overview/PlusOverview.pptx
@@ -214,7 +214,7 @@
             <a:fld id="{A6E16264-6225-448A-8F6B-37C607BF693C}" type="datetimeFigureOut">
               <a:rPr lang="en-CA" smtClean="0"/>
               <a:pPr/>
-              <a:t>2013-12-09</a:t>
+              <a:t>2014-02-22</a:t>
             </a:fld>
             <a:endParaRPr lang="en-CA"/>
           </a:p>
@@ -956,7 +956,7 @@
             <a:fld id="{E843F943-FC4A-4610-812B-19459293E20B}" type="datetime1">
               <a:rPr lang="en-CA" smtClean="0"/>
               <a:pPr/>
-              <a:t>2013-12-09</a:t>
+              <a:t>2014-02-22</a:t>
             </a:fld>
             <a:endParaRPr lang="en-CA" dirty="0"/>
           </a:p>
@@ -1255,7 +1255,7 @@
             <a:fld id="{7EC20259-AFA4-42BB-B1F2-1723D3175E09}" type="datetime1">
               <a:rPr lang="en-CA" smtClean="0"/>
               <a:pPr/>
-              <a:t>2013-12-09</a:t>
+              <a:t>2014-02-22</a:t>
             </a:fld>
             <a:endParaRPr lang="en-CA"/>
           </a:p>
@@ -1459,7 +1459,7 @@
             <a:fld id="{7EC20259-AFA4-42BB-B1F2-1723D3175E09}" type="datetime1">
               <a:rPr lang="en-CA" smtClean="0"/>
               <a:pPr/>
-              <a:t>2013-12-09</a:t>
+              <a:t>2014-02-22</a:t>
             </a:fld>
             <a:endParaRPr lang="en-CA"/>
           </a:p>
@@ -1741,7 +1741,7 @@
             <a:fld id="{0B273A97-7724-4AE7-A6F1-5A1F5D1DB72A}" type="datetime1">
               <a:rPr lang="en-CA" smtClean="0"/>
               <a:pPr/>
-              <a:t>2013-12-09</a:t>
+              <a:t>2014-02-22</a:t>
             </a:fld>
             <a:endParaRPr lang="en-CA"/>
           </a:p>
@@ -14314,7 +14314,7 @@
         </p:spPr>
         <p:txBody>
           <a:bodyPr>
-            <a:normAutofit/>
+            <a:normAutofit lnSpcReduction="10000"/>
           </a:bodyPr>
           <a:lstStyle/>
           <a:p>
@@ -14384,7 +14384,37 @@
             </a:br>
             <a:r>
               <a:rPr lang="en-US" sz="2400" dirty="0" smtClean="0"/>
-              <a:t>(through research interface)</a:t>
+              <a:t>(through research interface</a:t>
+            </a:r>
+            <a:r>
+              <a:rPr lang="en-US" sz="2400" dirty="0" smtClean="0"/>
+              <a:t>)</a:t>
+            </a:r>
+          </a:p>
+          <a:p>
+            <a:pPr>
+              <a:lnSpc>
+                <a:spcPct val="120000"/>
+              </a:lnSpc>
+              <a:spcBef>
+                <a:spcPts val="0"/>
+              </a:spcBef>
+              <a:spcAft>
+                <a:spcPts val="0"/>
+              </a:spcAft>
+              <a:defRPr/>
+            </a:pPr>
+            <a:r>
+              <a:rPr lang="en-US" sz="2400" dirty="0" err="1" smtClean="0"/>
+              <a:t>Interson</a:t>
+            </a:r>
+            <a:r>
+              <a:rPr lang="en-US" sz="2400" dirty="0" smtClean="0"/>
+              <a:t> </a:t>
+            </a:r>
+            <a:r>
+              <a:rPr lang="en-US" sz="2400" smtClean="0"/>
+              <a:t>USB ultrasound probes</a:t>
             </a:r>
           </a:p>
           <a:p>
@@ -15038,11 +15068,7 @@
             </a:pPr>
             <a:r>
               <a:rPr lang="en-CA" sz="2400" dirty="0" smtClean="0"/>
-              <a:t>Used by all applications of </a:t>
-            </a:r>
-            <a:r>
-              <a:rPr lang="en-CA" sz="2400" dirty="0" smtClean="0"/>
-              <a:t>Plus</a:t>
+              <a:t>Used by all applications of Plus</a:t>
             </a:r>
           </a:p>
           <a:p>

</xml_diff>

<commit_message>
re #712: Updated Plus overview slides
git-svn-id: https://subversion.assembla.com/svn/plus/trunk/doc@3277 c04e96f8-ac36-4ff2-8b34-4a5e34ef045f
</commit_message>
<xml_diff>
--- a/overview/PlusOverview.pptx
+++ b/overview/PlusOverview.pptx
@@ -214,7 +214,7 @@
             <a:fld id="{A6E16264-6225-448A-8F6B-37C607BF693C}" type="datetimeFigureOut">
               <a:rPr lang="en-CA" smtClean="0"/>
               <a:pPr/>
-              <a:t>2014-02-22</a:t>
+              <a:t>2014-04-14</a:t>
             </a:fld>
             <a:endParaRPr lang="en-CA"/>
           </a:p>
@@ -956,7 +956,7 @@
             <a:fld id="{E843F943-FC4A-4610-812B-19459293E20B}" type="datetime1">
               <a:rPr lang="en-CA" smtClean="0"/>
               <a:pPr/>
-              <a:t>2014-02-22</a:t>
+              <a:t>2014-04-14</a:t>
             </a:fld>
             <a:endParaRPr lang="en-CA" dirty="0"/>
           </a:p>
@@ -1255,7 +1255,7 @@
             <a:fld id="{7EC20259-AFA4-42BB-B1F2-1723D3175E09}" type="datetime1">
               <a:rPr lang="en-CA" smtClean="0"/>
               <a:pPr/>
-              <a:t>2014-02-22</a:t>
+              <a:t>2014-04-14</a:t>
             </a:fld>
             <a:endParaRPr lang="en-CA"/>
           </a:p>
@@ -1459,7 +1459,7 @@
             <a:fld id="{7EC20259-AFA4-42BB-B1F2-1723D3175E09}" type="datetime1">
               <a:rPr lang="en-CA" smtClean="0"/>
               <a:pPr/>
-              <a:t>2014-02-22</a:t>
+              <a:t>2014-04-14</a:t>
             </a:fld>
             <a:endParaRPr lang="en-CA"/>
           </a:p>
@@ -1741,7 +1741,7 @@
             <a:fld id="{0B273A97-7724-4AE7-A6F1-5A1F5D1DB72A}" type="datetime1">
               <a:rPr lang="en-CA" smtClean="0"/>
               <a:pPr/>
-              <a:t>2014-02-22</a:t>
+              <a:t>2014-04-14</a:t>
             </a:fld>
             <a:endParaRPr lang="en-CA"/>
           </a:p>
@@ -4155,6 +4155,47 @@
           <a:chExt cx="0" cy="0"/>
         </a:xfrm>
       </p:grpSpPr>
+      <p:pic>
+        <p:nvPicPr>
+          <p:cNvPr id="1028" name="Picture 4" descr="C:\Users\lasso\AppData\Local\Temp\SNAGHTML11501c9.PNG"/>
+          <p:cNvPicPr>
+            <a:picLocks noChangeAspect="1" noChangeArrowheads="1"/>
+          </p:cNvPicPr>
+          <p:nvPr/>
+        </p:nvPicPr>
+        <p:blipFill>
+          <a:blip r:embed="rId2">
+            <a:extLst>
+              <a:ext uri="{28A0092B-C50C-407E-A947-70E740481C1C}">
+                <a14:useLocalDpi xmlns:a14="http://schemas.microsoft.com/office/drawing/2010/main" val="0"/>
+              </a:ext>
+            </a:extLst>
+          </a:blip>
+          <a:srcRect/>
+          <a:stretch>
+            <a:fillRect/>
+          </a:stretch>
+        </p:blipFill>
+        <p:spPr bwMode="auto">
+          <a:xfrm>
+            <a:off x="4932040" y="1134035"/>
+            <a:ext cx="2880320" cy="2078941"/>
+          </a:xfrm>
+          <a:prstGeom prst="rect">
+            <a:avLst/>
+          </a:prstGeom>
+          <a:noFill/>
+          <a:extLst>
+            <a:ext uri="{909E8E84-426E-40DD-AFC4-6F175D3DCCD1}">
+              <a14:hiddenFill xmlns:a14="http://schemas.microsoft.com/office/drawing/2010/main">
+                <a:solidFill>
+                  <a:srgbClr val="FFFFFF"/>
+                </a:solidFill>
+              </a14:hiddenFill>
+            </a:ext>
+          </a:extLst>
+        </p:spPr>
+      </p:pic>
       <p:sp>
         <p:nvSpPr>
           <p:cNvPr id="22530" name="Title 1"/>
@@ -4284,8 +4325,9 @@
             </a:pPr>
             <a:r>
               <a:rPr lang="en-US" sz="2800" dirty="0" smtClean="0"/>
-              <a:t>Console application (no GUI)</a:t>
-            </a:r>
+              <a:t>GUI and console application</a:t>
+            </a:r>
+            <a:endParaRPr lang="en-US" sz="2800" dirty="0" smtClean="0"/>
           </a:p>
           <a:p>
             <a:pPr>
@@ -4299,8 +4341,20 @@
             </a:pPr>
             <a:r>
               <a:rPr lang="en-US" dirty="0" smtClean="0"/>
-              <a:t>Typically runs on the ultrasound computer</a:t>
-            </a:r>
+              <a:t>Typically runs on the </a:t>
+            </a:r>
+            <a:r>
+              <a:rPr lang="en-US" dirty="0" smtClean="0"/>
+              <a:t>data</a:t>
+            </a:r>
+            <a:br>
+              <a:rPr lang="en-US" dirty="0" smtClean="0"/>
+            </a:br>
+            <a:r>
+              <a:rPr lang="en-US" dirty="0" smtClean="0"/>
+              <a:t>collection computer</a:t>
+            </a:r>
+            <a:endParaRPr lang="en-US" dirty="0" smtClean="0"/>
           </a:p>
           <a:p>
             <a:pPr>
@@ -4314,7 +4368,22 @@
             </a:pPr>
             <a:r>
               <a:rPr lang="en-US" dirty="0" smtClean="0"/>
-              <a:t>Broadcasts data through OpenIGTLink</a:t>
+              <a:t>Broadcasts data </a:t>
+            </a:r>
+            <a:r>
+              <a:rPr lang="en-US" dirty="0" smtClean="0"/>
+              <a:t>through</a:t>
+            </a:r>
+            <a:br>
+              <a:rPr lang="en-US" dirty="0" smtClean="0"/>
+            </a:br>
+            <a:r>
+              <a:rPr lang="en-US" dirty="0" smtClean="0"/>
+              <a:t>OpenIGTLink</a:t>
+            </a:r>
+            <a:r>
+              <a:rPr lang="en-US" dirty="0" smtClean="0"/>
+              <a:t/>
             </a:r>
             <a:br>
               <a:rPr lang="en-US" dirty="0" smtClean="0"/>
@@ -4374,8 +4443,20 @@
             </a:pPr>
             <a:r>
               <a:rPr lang="en-US" dirty="0" smtClean="0"/>
-              <a:t>Request volume reconstruction</a:t>
-            </a:r>
+              <a:t>Request </a:t>
+            </a:r>
+            <a:r>
+              <a:rPr lang="en-US" dirty="0" smtClean="0"/>
+              <a:t>volume</a:t>
+            </a:r>
+            <a:br>
+              <a:rPr lang="en-US" dirty="0" smtClean="0"/>
+            </a:br>
+            <a:r>
+              <a:rPr lang="en-US" dirty="0" smtClean="0"/>
+              <a:t>reconstruction</a:t>
+            </a:r>
+            <a:endParaRPr lang="en-US" dirty="0" smtClean="0"/>
           </a:p>
           <a:p>
             <a:pPr lvl="1">
@@ -4389,7 +4470,11 @@
             </a:pPr>
             <a:r>
               <a:rPr lang="en-US" dirty="0" smtClean="0"/>
-              <a:t>Update transforms</a:t>
+              <a:t>Update </a:t>
+            </a:r>
+            <a:r>
+              <a:rPr lang="en-US" dirty="0" smtClean="0"/>
+              <a:t>transforms</a:t>
             </a:r>
           </a:p>
         </p:txBody>
@@ -4403,7 +4488,7 @@
           <p:nvPr/>
         </p:nvPicPr>
         <p:blipFill>
-          <a:blip r:embed="rId2" cstate="print"/>
+          <a:blip r:embed="rId3" cstate="print"/>
           <a:srcRect r="15000"/>
           <a:stretch>
             <a:fillRect/>
@@ -4411,7 +4496,7 @@
         </p:blipFill>
         <p:spPr bwMode="auto">
           <a:xfrm>
-            <a:off x="4932040" y="2632041"/>
+            <a:off x="4572000" y="3352121"/>
             <a:ext cx="4104456" cy="2885191"/>
           </a:xfrm>
           <a:prstGeom prst="rect">
@@ -4428,6 +4513,42 @@
           </a:ln>
         </p:spPr>
       </p:pic>
+      <p:cxnSp>
+        <p:nvCxnSpPr>
+          <p:cNvPr id="6" name="Elbow Connector 5"/>
+          <p:cNvCxnSpPr>
+            <a:stCxn id="1028" idx="3"/>
+          </p:cNvCxnSpPr>
+          <p:nvPr/>
+        </p:nvCxnSpPr>
+        <p:spPr>
+          <a:xfrm>
+            <a:off x="7812360" y="2173506"/>
+            <a:ext cx="504056" cy="1178615"/>
+          </a:xfrm>
+          <a:prstGeom prst="bentConnector2">
+            <a:avLst/>
+          </a:prstGeom>
+          <a:ln w="57150">
+            <a:headEnd type="arrow"/>
+            <a:tailEnd type="arrow"/>
+          </a:ln>
+        </p:spPr>
+        <p:style>
+          <a:lnRef idx="1">
+            <a:schemeClr val="accent1"/>
+          </a:lnRef>
+          <a:fillRef idx="0">
+            <a:schemeClr val="accent1"/>
+          </a:fillRef>
+          <a:effectRef idx="0">
+            <a:schemeClr val="accent1"/>
+          </a:effectRef>
+          <a:fontRef idx="minor">
+            <a:schemeClr val="tx1"/>
+          </a:fontRef>
+        </p:style>
+      </p:cxnSp>
     </p:spTree>
     <p:extLst>
       <p:ext uri="{BB962C8B-B14F-4D97-AF65-F5344CB8AC3E}">
@@ -4575,7 +4696,7 @@
         </p:spPr>
         <p:txBody>
           <a:bodyPr>
-            <a:normAutofit/>
+            <a:normAutofit lnSpcReduction="10000"/>
           </a:bodyPr>
           <a:lstStyle/>
           <a:p>
@@ -4620,12 +4741,14 @@
               <a:t>lag measurements </a:t>
             </a:r>
             <a:r>
-              <a:rPr lang="en-US" dirty="0" smtClean="0"/>
-              <a:t>is </a:t>
+              <a:rPr lang="en-US" dirty="0" smtClean="0">
+                <a:sym typeface="Symbol"/>
+              </a:rPr>
+              <a:t>3</a:t>
             </a:r>
             <a:r>
               <a:rPr lang="en-US" sz="2400" dirty="0" smtClean="0"/>
-              <a:t>a couple of </a:t>
+              <a:t> </a:t>
             </a:r>
             <a:r>
               <a:rPr lang="en-US" sz="2400" dirty="0" err="1" smtClean="0"/>
@@ -4661,7 +4784,21 @@
             </a:r>
             <a:r>
               <a:rPr lang="en-US" dirty="0" smtClean="0"/>
-              <a:t> mean error is about 0.5mm (</a:t>
+              <a:t> mean error </a:t>
+            </a:r>
+            <a:r>
+              <a:rPr lang="en-US" dirty="0" smtClean="0">
+                <a:sym typeface="Symbol"/>
+              </a:rPr>
+              <a:t></a:t>
+            </a:r>
+            <a:r>
+              <a:rPr lang="en-US" dirty="0" smtClean="0"/>
+              <a:t>0.5mm </a:t>
+            </a:r>
+            <a:r>
+              <a:rPr lang="en-US" dirty="0" smtClean="0"/>
+              <a:t>(</a:t>
             </a:r>
             <a:r>
               <a:rPr lang="en-US" dirty="0" err="1" smtClean="0"/>
@@ -4677,7 +4814,17 @@
             </a:r>
             <a:r>
               <a:rPr lang="en-US" dirty="0" smtClean="0"/>
-              <a:t>), total error is about 1mm</a:t>
+              <a:t>), total error </a:t>
+            </a:r>
+            <a:r>
+              <a:rPr lang="en-US" dirty="0" smtClean="0">
+                <a:sym typeface="Symbol"/>
+              </a:rPr>
+              <a:t></a:t>
+            </a:r>
+            <a:r>
+              <a:rPr lang="en-US" dirty="0" smtClean="0"/>
+              <a:t>1mm</a:t>
             </a:r>
             <a:endParaRPr lang="en-US" sz="2400" dirty="0" smtClean="0"/>
           </a:p>
@@ -4716,31 +4863,19 @@
             </a:pPr>
             <a:r>
               <a:rPr lang="en-US" dirty="0" smtClean="0"/>
-              <a:t>OpenIGTLink broadcasting: 10-20 fps</a:t>
-            </a:r>
-          </a:p>
-          <a:p>
-            <a:pPr>
-              <a:spcBef>
-                <a:spcPts val="0"/>
-              </a:spcBef>
-              <a:spcAft>
-                <a:spcPts val="0"/>
-              </a:spcAft>
-              <a:defRPr/>
-            </a:pPr>
+              <a:t>OpenIGTLink </a:t>
+            </a:r>
             <a:r>
               <a:rPr lang="en-US" dirty="0" smtClean="0"/>
-              <a:t>Visualization in 3D Slicer: 10 fps (due to default </a:t>
-            </a:r>
-            <a:r>
-              <a:rPr lang="en-US" dirty="0" err="1" smtClean="0"/>
-              <a:t>OpenIGTLinkIF</a:t>
-            </a:r>
-            <a:r>
-              <a:rPr lang="en-US" dirty="0" smtClean="0"/>
-              <a:t> refresh rate)</a:t>
-            </a:r>
+              <a:t>broadcasting and visualization in 3D Slicer at 10-30 fps, total system latency </a:t>
+            </a:r>
+            <a:r>
+              <a:rPr lang="en-US" dirty="0" smtClean="0">
+                <a:sym typeface="Symbol"/>
+              </a:rPr>
+              <a:t>150ms for video input (latency of ultrasound imaging is typically an additional 80ms)</a:t>
+            </a:r>
+            <a:endParaRPr lang="en-US" dirty="0" smtClean="0"/>
           </a:p>
         </p:txBody>
       </p:sp>
@@ -4986,18 +5121,7 @@
               <a:rPr lang="en-US" sz="2400" dirty="0" err="1" smtClean="0"/>
               <a:t>Sikuli</a:t>
             </a:r>
-            <a:r>
-              <a:rPr lang="en-US" sz="2400" dirty="0" smtClean="0"/>
-              <a:t> (=&gt; </a:t>
-            </a:r>
-            <a:r>
-              <a:rPr lang="en-US" sz="2400" dirty="0" err="1" smtClean="0"/>
-              <a:t>QtTest</a:t>
-            </a:r>
-            <a:r>
-              <a:rPr lang="en-US" sz="2400" dirty="0" smtClean="0"/>
-              <a:t>?)</a:t>
-            </a:r>
+            <a:endParaRPr lang="en-US" sz="2400" dirty="0" smtClean="0"/>
           </a:p>
         </p:txBody>
       </p:sp>
@@ -13055,7 +13179,15 @@
             </a:r>
             <a:r>
               <a:rPr lang="en-US" sz="2400" dirty="0" smtClean="0"/>
-              <a:t>	Andras Lasso (lasso@cs.queensu.ca)</a:t>
+              <a:t>	Andras Lasso (</a:t>
+            </a:r>
+            <a:r>
+              <a:rPr lang="en-US" sz="2400" dirty="0" smtClean="0"/>
+              <a:t>lasso@queensu.ca</a:t>
+            </a:r>
+            <a:r>
+              <a:rPr lang="en-US" sz="2400" dirty="0" smtClean="0"/>
+              <a:t>)</a:t>
             </a:r>
             <a:br>
               <a:rPr lang="en-US" sz="2400" dirty="0" smtClean="0"/>
@@ -13938,7 +14070,7 @@
         </p:spPr>
         <p:txBody>
           <a:bodyPr>
-            <a:normAutofit fontScale="85000" lnSpcReduction="20000"/>
+            <a:normAutofit fontScale="77500" lnSpcReduction="20000"/>
           </a:bodyPr>
           <a:lstStyle/>
           <a:p>
@@ -14073,13 +14205,18 @@
               <a:defRPr/>
             </a:pPr>
             <a:r>
+              <a:rPr lang="en-US" dirty="0" smtClean="0"/>
+              <a:t>Medtroni</a:t>
+            </a:r>
+            <a:r>
+              <a:rPr lang="en-US" dirty="0" smtClean="0"/>
+              <a:t>c </a:t>
+            </a:r>
+            <a:r>
               <a:rPr lang="en-US" dirty="0" err="1" smtClean="0"/>
-              <a:t>PhidgetSpatial</a:t>
-            </a:r>
-            <a:r>
-              <a:rPr lang="en-US" dirty="0" smtClean="0"/>
-              <a:t> inertial measurement device</a:t>
-            </a:r>
+              <a:t>StealthStation</a:t>
+            </a:r>
+            <a:endParaRPr lang="en-US" dirty="0" smtClean="0"/>
           </a:p>
           <a:p>
             <a:pPr>
@@ -14095,24 +14232,16 @@
               <a:defRPr/>
             </a:pPr>
             <a:r>
-              <a:rPr lang="en-US" dirty="0" err="1"/>
-              <a:t>CHRobotics</a:t>
-            </a:r>
-            <a:r>
-              <a:rPr lang="en-US" dirty="0"/>
+              <a:rPr lang="en-US" dirty="0" err="1" smtClean="0"/>
+              <a:t>PhidgetSpatial</a:t>
+            </a:r>
+            <a:r>
+              <a:rPr lang="en-US" dirty="0" smtClean="0"/>
               <a:t> </a:t>
             </a:r>
             <a:r>
               <a:rPr lang="en-US" dirty="0" smtClean="0"/>
-              <a:t>inertial </a:t>
-            </a:r>
-            <a:r>
-              <a:rPr lang="en-US" dirty="0"/>
-              <a:t>measurement </a:t>
-            </a:r>
-            <a:r>
-              <a:rPr lang="en-US" dirty="0" smtClean="0"/>
-              <a:t>device</a:t>
+              <a:t>inertial measurement device</a:t>
             </a:r>
           </a:p>
           <a:p>
@@ -14129,22 +14258,25 @@
               <a:defRPr/>
             </a:pPr>
             <a:r>
+              <a:rPr lang="en-US" dirty="0" err="1"/>
+              <a:t>CHRobotics</a:t>
+            </a:r>
+            <a:r>
               <a:rPr lang="en-US" dirty="0"/>
-              <a:t>3dConnexion </a:t>
-            </a:r>
-            <a:r>
-              <a:rPr lang="en-US" dirty="0" err="1"/>
-              <a:t>SpaceNavigator</a:t>
+              <a:t> </a:t>
+            </a:r>
+            <a:r>
+              <a:rPr lang="en-US" dirty="0" smtClean="0"/>
+              <a:t>inertial </a:t>
             </a:r>
             <a:r>
               <a:rPr lang="en-US" dirty="0"/>
-              <a:t> 3D </a:t>
+              <a:t>measurement </a:t>
             </a:r>
             <a:r>
               <a:rPr lang="en-US" dirty="0" smtClean="0"/>
-              <a:t>mouse</a:t>
-            </a:r>
-            <a:endParaRPr lang="en-US" dirty="0"/>
+              <a:t>device</a:t>
+            </a:r>
           </a:p>
           <a:p>
             <a:pPr>
@@ -14160,6 +14292,37 @@
               <a:defRPr/>
             </a:pPr>
             <a:r>
+              <a:rPr lang="en-US" dirty="0"/>
+              <a:t>3dConnexion </a:t>
+            </a:r>
+            <a:r>
+              <a:rPr lang="en-US" dirty="0" err="1"/>
+              <a:t>SpaceNavigator</a:t>
+            </a:r>
+            <a:r>
+              <a:rPr lang="en-US" dirty="0"/>
+              <a:t> 3D </a:t>
+            </a:r>
+            <a:r>
+              <a:rPr lang="en-US" dirty="0" smtClean="0"/>
+              <a:t>mouse</a:t>
+            </a:r>
+            <a:endParaRPr lang="en-US" dirty="0"/>
+          </a:p>
+          <a:p>
+            <a:pPr>
+              <a:lnSpc>
+                <a:spcPct val="120000"/>
+              </a:lnSpc>
+              <a:spcBef>
+                <a:spcPts val="0"/>
+              </a:spcBef>
+              <a:spcAft>
+                <a:spcPts val="0"/>
+              </a:spcAft>
+              <a:defRPr/>
+            </a:pPr>
+            <a:r>
               <a:rPr lang="en-US" dirty="0" smtClean="0"/>
               <a:t>OpenIGTLink (for </a:t>
             </a:r>
@@ -14169,7 +14332,23 @@
             </a:r>
             <a:r>
               <a:rPr lang="en-US" dirty="0" smtClean="0"/>
-              <a:t>, Siemens MRI scanners, and other compatible devices)</a:t>
+              <a:t>, Siemens MRI scanners, </a:t>
+            </a:r>
+            <a:r>
+              <a:rPr lang="en-US" dirty="0" err="1" smtClean="0"/>
+              <a:t>Matlab</a:t>
+            </a:r>
+            <a:r>
+              <a:rPr lang="en-US" dirty="0" smtClean="0"/>
+              <a:t>, and </a:t>
+            </a:r>
+            <a:r>
+              <a:rPr lang="en-US" dirty="0" smtClean="0"/>
+              <a:t>other compatible </a:t>
+            </a:r>
+            <a:r>
+              <a:rPr lang="en-US" dirty="0" smtClean="0"/>
+              <a:t>devices and software)</a:t>
             </a:r>
             <a:endParaRPr lang="en-US" dirty="0"/>
           </a:p>
@@ -14254,7 +14433,7 @@
         </p:blipFill>
         <p:spPr bwMode="auto">
           <a:xfrm>
-            <a:off x="7276219" y="4437112"/>
+            <a:off x="7418963" y="4821968"/>
             <a:ext cx="1545525" cy="1055304"/>
           </a:xfrm>
           <a:prstGeom prst="rect">
@@ -14309,12 +14488,12 @@
         <p:spPr>
           <a:xfrm>
             <a:off x="457200" y="980728"/>
-            <a:ext cx="6020365" cy="5270934"/>
+            <a:ext cx="6419056" cy="5400600"/>
           </a:xfrm>
         </p:spPr>
         <p:txBody>
           <a:bodyPr>
-            <a:normAutofit lnSpcReduction="10000"/>
+            <a:normAutofit fontScale="92500"/>
           </a:bodyPr>
           <a:lstStyle/>
           <a:p>
@@ -14384,11 +14563,7 @@
             </a:br>
             <a:r>
               <a:rPr lang="en-US" sz="2400" dirty="0" smtClean="0"/>
-              <a:t>(through research interface</a:t>
-            </a:r>
-            <a:r>
-              <a:rPr lang="en-US" sz="2400" dirty="0" smtClean="0"/>
-              <a:t>)</a:t>
+              <a:t>(through research interface)</a:t>
             </a:r>
           </a:p>
           <a:p>
@@ -14410,11 +14585,7 @@
             </a:r>
             <a:r>
               <a:rPr lang="en-US" sz="2400" dirty="0" smtClean="0"/>
-              <a:t> </a:t>
-            </a:r>
-            <a:r>
-              <a:rPr lang="en-US" sz="2400" smtClean="0"/>
-              <a:t>USB ultrasound probes</a:t>
+              <a:t> USB ultrasound probes</a:t>
             </a:r>
           </a:p>
           <a:p>
@@ -14486,7 +14657,7 @@
             </a:pPr>
             <a:r>
               <a:rPr lang="en-US" sz="2400" dirty="0" smtClean="0"/>
-              <a:t>Video for Windows devices</a:t>
+              <a:t>Microsoft Media Foundation compatible devices</a:t>
             </a:r>
           </a:p>
           <a:p>
@@ -14504,7 +14675,42 @@
             </a:pPr>
             <a:r>
               <a:rPr lang="en-US" sz="2400" dirty="0" smtClean="0"/>
-              <a:t>OpenIGTLink (for </a:t>
+              <a:t>Video </a:t>
+            </a:r>
+            <a:r>
+              <a:rPr lang="en-US" sz="2400" dirty="0" smtClean="0"/>
+              <a:t>for Windows </a:t>
+            </a:r>
+            <a:r>
+              <a:rPr lang="en-US" sz="2400" dirty="0" smtClean="0"/>
+              <a:t>compatible devices</a:t>
+            </a:r>
+            <a:endParaRPr lang="en-US" sz="2400" dirty="0" smtClean="0"/>
+          </a:p>
+          <a:p>
+            <a:pPr>
+              <a:lnSpc>
+                <a:spcPct val="120000"/>
+              </a:lnSpc>
+              <a:spcBef>
+                <a:spcPts val="0"/>
+              </a:spcBef>
+              <a:spcAft>
+                <a:spcPts val="0"/>
+              </a:spcAft>
+              <a:defRPr/>
+            </a:pPr>
+            <a:r>
+              <a:rPr lang="en-US" sz="2400" dirty="0" smtClean="0"/>
+              <a:t>OpenIGTLink (</a:t>
+            </a:r>
+            <a:r>
+              <a:rPr lang="en-US" sz="2400" dirty="0" smtClean="0"/>
+              <a:t>for Siemens </a:t>
+            </a:r>
+            <a:r>
+              <a:rPr lang="en-US" sz="2400" dirty="0" smtClean="0"/>
+              <a:t>MRI scanners, </a:t>
             </a:r>
             <a:r>
               <a:rPr lang="en-US" sz="2400" dirty="0" err="1" smtClean="0"/>
@@ -14512,8 +14718,21 @@
             </a:r>
             <a:r>
               <a:rPr lang="en-US" sz="2400" dirty="0" smtClean="0"/>
-              <a:t>, Siemens MRI scanners, and other compatible devices)</a:t>
-            </a:r>
+              <a:t>, </a:t>
+            </a:r>
+            <a:r>
+              <a:rPr lang="en-US" sz="2400" dirty="0"/>
+              <a:t>and </a:t>
+            </a:r>
+            <a:r>
+              <a:rPr lang="en-US" sz="2400" dirty="0" smtClean="0"/>
+              <a:t>other compatible </a:t>
+            </a:r>
+            <a:r>
+              <a:rPr lang="en-US" sz="2400" dirty="0" smtClean="0"/>
+              <a:t>devices &amp; software)</a:t>
+            </a:r>
+            <a:endParaRPr lang="en-US" sz="2400" dirty="0" smtClean="0"/>
           </a:p>
           <a:p>
             <a:pPr>
@@ -14623,7 +14842,7 @@
         </p:blipFill>
         <p:spPr bwMode="auto">
           <a:xfrm>
-            <a:off x="4972013" y="1052736"/>
+            <a:off x="4932040" y="836712"/>
             <a:ext cx="1904243" cy="3038686"/>
           </a:xfrm>
           <a:prstGeom prst="rect">
@@ -14734,7 +14953,7 @@
         </p:blipFill>
         <p:spPr bwMode="auto">
           <a:xfrm>
-            <a:off x="6353841" y="5479504"/>
+            <a:off x="6497857" y="5551512"/>
             <a:ext cx="954463" cy="685800"/>
           </a:xfrm>
           <a:prstGeom prst="rect">
@@ -14810,7 +15029,7 @@
         </p:blipFill>
         <p:spPr bwMode="auto">
           <a:xfrm>
-            <a:off x="6116253" y="4212877"/>
+            <a:off x="6476293" y="4212877"/>
             <a:ext cx="1192051" cy="944315"/>
           </a:xfrm>
           <a:prstGeom prst="rect">

</xml_diff>

<commit_message>
re #712: Added notes that Plus can acquire data from Zeiss Pentero surgical microscopes
git-svn-id: https://subversion.assembla.com/svn/plus/trunk/doc@4076 c04e96f8-ac36-4ff2-8b34-4a5e34ef045f
</commit_message>
<xml_diff>
--- a/overview/PlusOverview.pptx
+++ b/overview/PlusOverview.pptx
@@ -128,6 +128,22 @@
       </a:defRPr>
     </a:lvl9pPr>
   </p:defaultTextStyle>
+  <p:extLst>
+    <p:ext uri="{EFAFB233-063F-42B5-8137-9DF3F51BA10A}">
+      <p15:sldGuideLst xmlns:p15="http://schemas.microsoft.com/office/powerpoint/2012/main">
+        <p15:guide id="1" orient="horz" pos="2160">
+          <p15:clr>
+            <a:srgbClr val="A4A3A4"/>
+          </p15:clr>
+        </p15:guide>
+        <p15:guide id="2" pos="2880">
+          <p15:clr>
+            <a:srgbClr val="A4A3A4"/>
+          </p15:clr>
+        </p15:guide>
+      </p15:sldGuideLst>
+    </p:ext>
+  </p:extLst>
 </p:presentation>
 </file>
 
@@ -214,7 +230,7 @@
             <a:fld id="{A6E16264-6225-448A-8F6B-37C607BF693C}" type="datetimeFigureOut">
               <a:rPr lang="en-CA" smtClean="0"/>
               <a:pPr/>
-              <a:t>2014-04-14</a:t>
+              <a:t>2015-03-29</a:t>
             </a:fld>
             <a:endParaRPr lang="en-CA"/>
           </a:p>
@@ -956,7 +972,7 @@
             <a:fld id="{E843F943-FC4A-4610-812B-19459293E20B}" type="datetime1">
               <a:rPr lang="en-CA" smtClean="0"/>
               <a:pPr/>
-              <a:t>2014-04-14</a:t>
+              <a:t>2015-03-29</a:t>
             </a:fld>
             <a:endParaRPr lang="en-CA" dirty="0"/>
           </a:p>
@@ -1255,7 +1271,7 @@
             <a:fld id="{7EC20259-AFA4-42BB-B1F2-1723D3175E09}" type="datetime1">
               <a:rPr lang="en-CA" smtClean="0"/>
               <a:pPr/>
-              <a:t>2014-04-14</a:t>
+              <a:t>2015-03-29</a:t>
             </a:fld>
             <a:endParaRPr lang="en-CA"/>
           </a:p>
@@ -1459,7 +1475,7 @@
             <a:fld id="{7EC20259-AFA4-42BB-B1F2-1723D3175E09}" type="datetime1">
               <a:rPr lang="en-CA" smtClean="0"/>
               <a:pPr/>
-              <a:t>2014-04-14</a:t>
+              <a:t>2015-03-29</a:t>
             </a:fld>
             <a:endParaRPr lang="en-CA"/>
           </a:p>
@@ -1741,7 +1757,7 @@
             <a:fld id="{0B273A97-7724-4AE7-A6F1-5A1F5D1DB72A}" type="datetime1">
               <a:rPr lang="en-CA" smtClean="0"/>
               <a:pPr/>
-              <a:t>2014-04-14</a:t>
+              <a:t>2015-03-29</a:t>
             </a:fld>
             <a:endParaRPr lang="en-CA"/>
           </a:p>
@@ -4327,7 +4343,6 @@
               <a:rPr lang="en-US" sz="2800" dirty="0" smtClean="0"/>
               <a:t>GUI and console application</a:t>
             </a:r>
-            <a:endParaRPr lang="en-US" sz="2800" dirty="0" smtClean="0"/>
           </a:p>
           <a:p>
             <a:pPr>
@@ -4341,11 +4356,7 @@
             </a:pPr>
             <a:r>
               <a:rPr lang="en-US" dirty="0" smtClean="0"/>
-              <a:t>Typically runs on the </a:t>
-            </a:r>
-            <a:r>
-              <a:rPr lang="en-US" dirty="0" smtClean="0"/>
-              <a:t>data</a:t>
+              <a:t>Typically runs on the data</a:t>
             </a:r>
             <a:br>
               <a:rPr lang="en-US" dirty="0" smtClean="0"/>
@@ -4354,7 +4365,6 @@
               <a:rPr lang="en-US" dirty="0" smtClean="0"/>
               <a:t>collection computer</a:t>
             </a:r>
-            <a:endParaRPr lang="en-US" dirty="0" smtClean="0"/>
           </a:p>
           <a:p>
             <a:pPr>
@@ -4368,11 +4378,7 @@
             </a:pPr>
             <a:r>
               <a:rPr lang="en-US" dirty="0" smtClean="0"/>
-              <a:t>Broadcasts data </a:t>
-            </a:r>
-            <a:r>
-              <a:rPr lang="en-US" dirty="0" smtClean="0"/>
-              <a:t>through</a:t>
+              <a:t>Broadcasts data through</a:t>
             </a:r>
             <a:br>
               <a:rPr lang="en-US" dirty="0" smtClean="0"/>
@@ -4380,10 +4386,6 @@
             <a:r>
               <a:rPr lang="en-US" dirty="0" smtClean="0"/>
               <a:t>OpenIGTLink</a:t>
-            </a:r>
-            <a:r>
-              <a:rPr lang="en-US" dirty="0" smtClean="0"/>
-              <a:t/>
             </a:r>
             <a:br>
               <a:rPr lang="en-US" dirty="0" smtClean="0"/>
@@ -4443,11 +4445,7 @@
             </a:pPr>
             <a:r>
               <a:rPr lang="en-US" dirty="0" smtClean="0"/>
-              <a:t>Request </a:t>
-            </a:r>
-            <a:r>
-              <a:rPr lang="en-US" dirty="0" smtClean="0"/>
-              <a:t>volume</a:t>
+              <a:t>Request volume</a:t>
             </a:r>
             <a:br>
               <a:rPr lang="en-US" dirty="0" smtClean="0"/>
@@ -4456,7 +4454,6 @@
               <a:rPr lang="en-US" dirty="0" smtClean="0"/>
               <a:t>reconstruction</a:t>
             </a:r>
-            <a:endParaRPr lang="en-US" dirty="0" smtClean="0"/>
           </a:p>
           <a:p>
             <a:pPr lvl="1">
@@ -4470,11 +4467,7 @@
             </a:pPr>
             <a:r>
               <a:rPr lang="en-US" dirty="0" smtClean="0"/>
-              <a:t>Update </a:t>
-            </a:r>
-            <a:r>
-              <a:rPr lang="en-US" dirty="0" smtClean="0"/>
-              <a:t>transforms</a:t>
+              <a:t>Update transforms</a:t>
             </a:r>
           </a:p>
         </p:txBody>
@@ -4794,11 +4787,7 @@
             </a:r>
             <a:r>
               <a:rPr lang="en-US" dirty="0" smtClean="0"/>
-              <a:t>0.5mm </a:t>
-            </a:r>
-            <a:r>
-              <a:rPr lang="en-US" dirty="0" smtClean="0"/>
-              <a:t>(</a:t>
+              <a:t>0.5mm (</a:t>
             </a:r>
             <a:r>
               <a:rPr lang="en-US" dirty="0" err="1" smtClean="0"/>
@@ -4863,11 +4852,7 @@
             </a:pPr>
             <a:r>
               <a:rPr lang="en-US" dirty="0" smtClean="0"/>
-              <a:t>OpenIGTLink </a:t>
-            </a:r>
-            <a:r>
-              <a:rPr lang="en-US" dirty="0" smtClean="0"/>
-              <a:t>broadcasting and visualization in 3D Slicer at 10-30 fps, total system latency </a:t>
+              <a:t>OpenIGTLink broadcasting and visualization in 3D Slicer at 10-30 fps, total system latency </a:t>
             </a:r>
             <a:r>
               <a:rPr lang="en-US" dirty="0" smtClean="0">
@@ -13179,15 +13164,7 @@
             </a:r>
             <a:r>
               <a:rPr lang="en-US" sz="2400" dirty="0" smtClean="0"/>
-              <a:t>	Andras Lasso (</a:t>
-            </a:r>
-            <a:r>
-              <a:rPr lang="en-US" sz="2400" dirty="0" smtClean="0"/>
-              <a:t>lasso@queensu.ca</a:t>
-            </a:r>
-            <a:r>
-              <a:rPr lang="en-US" sz="2400" dirty="0" smtClean="0"/>
-              <a:t>)</a:t>
+              <a:t>	Andras Lasso (lasso@queensu.ca)</a:t>
             </a:r>
             <a:br>
               <a:rPr lang="en-US" sz="2400" dirty="0" smtClean="0"/>
@@ -14206,11 +14183,7 @@
             </a:pPr>
             <a:r>
               <a:rPr lang="en-US" dirty="0" smtClean="0"/>
-              <a:t>Medtroni</a:t>
-            </a:r>
-            <a:r>
-              <a:rPr lang="en-US" dirty="0" smtClean="0"/>
-              <a:t>c </a:t>
+              <a:t>Medtronic </a:t>
             </a:r>
             <a:r>
               <a:rPr lang="en-US" dirty="0" err="1" smtClean="0"/>
@@ -14237,11 +14210,7 @@
             </a:r>
             <a:r>
               <a:rPr lang="en-US" dirty="0" smtClean="0"/>
-              <a:t> </a:t>
-            </a:r>
-            <a:r>
-              <a:rPr lang="en-US" dirty="0" smtClean="0"/>
-              <a:t>inertial measurement device</a:t>
+              <a:t> inertial measurement device</a:t>
             </a:r>
           </a:p>
           <a:p>
@@ -14340,15 +14309,7 @@
             </a:r>
             <a:r>
               <a:rPr lang="en-US" dirty="0" smtClean="0"/>
-              <a:t>, and </a:t>
-            </a:r>
-            <a:r>
-              <a:rPr lang="en-US" dirty="0" smtClean="0"/>
-              <a:t>other compatible </a:t>
-            </a:r>
-            <a:r>
-              <a:rPr lang="en-US" dirty="0" smtClean="0"/>
-              <a:t>devices and software)</a:t>
+              <a:t>, and other compatible devices and software)</a:t>
             </a:r>
             <a:endParaRPr lang="en-US" dirty="0"/>
           </a:p>
@@ -14657,8 +14618,28 @@
             </a:pPr>
             <a:r>
               <a:rPr lang="en-US" sz="2400" dirty="0" smtClean="0"/>
-              <a:t>Microsoft Media Foundation compatible devices</a:t>
-            </a:r>
+              <a:t>Microsoft Media Foundation compatible </a:t>
+            </a:r>
+            <a:r>
+              <a:rPr lang="en-US" sz="2400" dirty="0" smtClean="0"/>
+              <a:t>devices</a:t>
+            </a:r>
+            <a:br>
+              <a:rPr lang="en-US" sz="2400" dirty="0" smtClean="0"/>
+            </a:br>
+            <a:r>
+              <a:rPr lang="en-US" sz="2400" dirty="0" smtClean="0"/>
+              <a:t>(surgical microscopes, endoscopes, </a:t>
+            </a:r>
+            <a:r>
+              <a:rPr lang="en-US" sz="2400" dirty="0" err="1" smtClean="0"/>
+              <a:t>framegrabbers</a:t>
+            </a:r>
+            <a:r>
+              <a:rPr lang="en-US" sz="2400" dirty="0" smtClean="0"/>
+              <a:t>)</a:t>
+            </a:r>
+            <a:endParaRPr lang="en-US" sz="2400" dirty="0" smtClean="0"/>
           </a:p>
           <a:p>
             <a:pPr>
@@ -14675,17 +14656,8 @@
             </a:pPr>
             <a:r>
               <a:rPr lang="en-US" sz="2400" dirty="0" smtClean="0"/>
-              <a:t>Video </a:t>
-            </a:r>
-            <a:r>
-              <a:rPr lang="en-US" sz="2400" dirty="0" smtClean="0"/>
-              <a:t>for Windows </a:t>
-            </a:r>
-            <a:r>
-              <a:rPr lang="en-US" sz="2400" dirty="0" smtClean="0"/>
-              <a:t>compatible devices</a:t>
-            </a:r>
-            <a:endParaRPr lang="en-US" sz="2400" dirty="0" smtClean="0"/>
+              <a:t>Video for Windows compatible devices</a:t>
+            </a:r>
           </a:p>
           <a:p>
             <a:pPr>
@@ -14702,15 +14674,7 @@
             </a:pPr>
             <a:r>
               <a:rPr lang="en-US" sz="2400" dirty="0" smtClean="0"/>
-              <a:t>OpenIGTLink (</a:t>
-            </a:r>
-            <a:r>
-              <a:rPr lang="en-US" sz="2400" dirty="0" smtClean="0"/>
-              <a:t>for Siemens </a:t>
-            </a:r>
-            <a:r>
-              <a:rPr lang="en-US" sz="2400" dirty="0" smtClean="0"/>
-              <a:t>MRI scanners, </a:t>
+              <a:t>OpenIGTLink (for Siemens MRI scanners, </a:t>
             </a:r>
             <a:r>
               <a:rPr lang="en-US" sz="2400" dirty="0" err="1" smtClean="0"/>
@@ -14726,13 +14690,8 @@
             </a:r>
             <a:r>
               <a:rPr lang="en-US" sz="2400" dirty="0" smtClean="0"/>
-              <a:t>other compatible </a:t>
-            </a:r>
-            <a:r>
-              <a:rPr lang="en-US" sz="2400" dirty="0" smtClean="0"/>
-              <a:t>devices &amp; software)</a:t>
-            </a:r>
-            <a:endParaRPr lang="en-US" sz="2400" dirty="0" smtClean="0"/>
+              <a:t>other compatible devices &amp; software)</a:t>
+            </a:r>
           </a:p>
           <a:p>
             <a:pPr>
@@ -14842,7 +14801,7 @@
         </p:blipFill>
         <p:spPr bwMode="auto">
           <a:xfrm>
-            <a:off x="4932040" y="836712"/>
+            <a:off x="4663961" y="833127"/>
             <a:ext cx="1904243" cy="3038686"/>
           </a:xfrm>
           <a:prstGeom prst="rect">
@@ -14990,8 +14949,8 @@
         </p:blipFill>
         <p:spPr bwMode="auto">
           <a:xfrm>
-            <a:off x="6967589" y="1370690"/>
-            <a:ext cx="1780875" cy="2634374"/>
+            <a:off x="7610609" y="588527"/>
+            <a:ext cx="1502200" cy="2222142"/>
           </a:xfrm>
           <a:prstGeom prst="rect">
             <a:avLst/>
@@ -15029,8 +14988,47 @@
         </p:blipFill>
         <p:spPr bwMode="auto">
           <a:xfrm>
-            <a:off x="6476293" y="4212877"/>
+            <a:off x="6296272" y="2028550"/>
             <a:ext cx="1192051" cy="944315"/>
+          </a:xfrm>
+          <a:prstGeom prst="rect">
+            <a:avLst/>
+          </a:prstGeom>
+          <a:noFill/>
+          <a:extLst>
+            <a:ext uri="{909E8E84-426E-40DD-AFC4-6F175D3DCCD1}">
+              <a14:hiddenFill xmlns:a14="http://schemas.microsoft.com/office/drawing/2010/main">
+                <a:solidFill>
+                  <a:srgbClr val="FFFFFF"/>
+                </a:solidFill>
+              </a14:hiddenFill>
+            </a:ext>
+          </a:extLst>
+        </p:spPr>
+      </p:pic>
+      <p:pic>
+        <p:nvPicPr>
+          <p:cNvPr id="1026" name="Picture 2" descr="http://www.sdeysjwk.com/xyfm/html/images/1364017362.jpg"/>
+          <p:cNvPicPr>
+            <a:picLocks noChangeAspect="1" noChangeArrowheads="1"/>
+          </p:cNvPicPr>
+          <p:nvPr/>
+        </p:nvPicPr>
+        <p:blipFill rotWithShape="1">
+          <a:blip r:embed="rId7">
+            <a:extLst>
+              <a:ext uri="{28A0092B-C50C-407E-A947-70E740481C1C}">
+                <a14:useLocalDpi xmlns:a14="http://schemas.microsoft.com/office/drawing/2010/main" val="0"/>
+              </a:ext>
+            </a:extLst>
+          </a:blip>
+          <a:srcRect l="15157" t="6249" r="23455" b="27196"/>
+          <a:stretch/>
+        </p:blipFill>
+        <p:spPr bwMode="auto">
+          <a:xfrm>
+            <a:off x="6816678" y="3140968"/>
+            <a:ext cx="2147810" cy="1551197"/>
           </a:xfrm>
           <a:prstGeom prst="rect">
             <a:avLst/>

</xml_diff>